<commit_message>
Presentation und ein paar Kommentare im Code
</commit_message>
<xml_diff>
--- a/Abgabe_09/Snake_overview.pptx
+++ b/Abgabe_09/Snake_overview.pptx
@@ -17,6 +17,10 @@
     <p:sldId id="265" r:id="rId11"/>
     <p:sldId id="264" r:id="rId12"/>
     <p:sldId id="266" r:id="rId13"/>
+    <p:sldId id="269" r:id="rId14"/>
+    <p:sldId id="268" r:id="rId15"/>
+    <p:sldId id="270" r:id="rId16"/>
+    <p:sldId id="271" r:id="rId17"/>
   </p:sldIdLst>
   <p:sldSz cx="9144000" cy="6858000" type="screen4x3"/>
   <p:notesSz cx="7559675" cy="10691813"/>
@@ -117,7 +121,7 @@
   </p:defaultTextStyle>
   <p:extLst>
     <p:ext uri="{EFAFB233-063F-42B5-8137-9DF3F51BA10A}">
-      <p15:sldGuideLst xmlns:p15="http://schemas.microsoft.com/office/powerpoint/2012/main">
+      <p15:sldGuideLst xmlns="" xmlns:p15="http://schemas.microsoft.com/office/powerpoint/2012/main">
         <p15:guide id="1" orient="horz" pos="2160">
           <p15:clr>
             <a:srgbClr val="A4A3A4"/>
@@ -644,7 +648,7 @@
           <p:nvPr/>
         </p:nvPicPr>
         <p:blipFill>
-          <a:blip r:embed="rId2"/>
+          <a:blip r:embed="rId2" cstate="print"/>
           <a:stretch/>
         </p:blipFill>
         <p:spPr>
@@ -667,7 +671,7 @@
           <p:nvPr/>
         </p:nvPicPr>
         <p:blipFill>
-          <a:blip r:embed="rId2"/>
+          <a:blip r:embed="rId2" cstate="print"/>
           <a:stretch/>
         </p:blipFill>
         <p:spPr>
@@ -2276,7 +2280,7 @@
           <p:nvPr/>
         </p:nvPicPr>
         <p:blipFill>
-          <a:blip r:embed="rId2"/>
+          <a:blip r:embed="rId2" cstate="print"/>
           <a:stretch/>
         </p:blipFill>
         <p:spPr>
@@ -2299,7 +2303,7 @@
           <p:nvPr/>
         </p:nvPicPr>
         <p:blipFill>
-          <a:blip r:embed="rId2"/>
+          <a:blip r:embed="rId2" cstate="print"/>
           <a:stretch/>
         </p:blipFill>
         <p:spPr>
@@ -3416,6 +3420,11 @@
                 </a:uFill>
                 <a:latin typeface="Calibri"/>
               </a:rPr>
+              <a:pPr algn="r">
+                <a:lnSpc>
+                  <a:spcPct val="100000"/>
+                </a:lnSpc>
+              </a:pPr>
               <a:t>‹Nr.›</a:t>
             </a:fld>
             <a:endParaRPr lang="de-DE" sz="1400" b="0" strike="noStrike" spc="-1">
@@ -4205,6 +4214,11 @@
                 </a:uFill>
                 <a:latin typeface="Calibri"/>
               </a:rPr>
+              <a:pPr algn="r">
+                <a:lnSpc>
+                  <a:spcPct val="100000"/>
+                </a:lnSpc>
+              </a:pPr>
               <a:t>‹Nr.›</a:t>
             </a:fld>
             <a:endParaRPr lang="de-DE" sz="1400" b="0" strike="noStrike" spc="-1">
@@ -4493,7 +4507,7 @@
           <p:nvPr/>
         </p:nvPicPr>
         <p:blipFill>
-          <a:blip r:embed="rId2"/>
+          <a:blip r:embed="rId2" cstate="print"/>
           <a:stretch/>
         </p:blipFill>
         <p:spPr>
@@ -4678,7 +4692,7 @@
           <p:cNvPr id="7" name="Titel 1">
             <a:extLst>
               <a:ext uri="{FF2B5EF4-FFF2-40B4-BE49-F238E27FC236}">
-                <a16:creationId xmlns:a16="http://schemas.microsoft.com/office/drawing/2014/main" id="{5E5EB1EA-266D-4CBF-B165-153D3814CE1A}"/>
+                <a16:creationId xmlns="" xmlns:a16="http://schemas.microsoft.com/office/drawing/2014/main" id="{5E5EB1EA-266D-4CBF-B165-153D3814CE1A}"/>
               </a:ext>
             </a:extLst>
           </p:cNvPr>
@@ -4732,7 +4746,7 @@
           <p:cNvPr id="4" name="Grafik 3" descr="Ein Bild, das Screenshot enthält.&#10;&#10;Mit hoher Zuverlässigkeit generierte Beschreibung">
             <a:extLst>
               <a:ext uri="{FF2B5EF4-FFF2-40B4-BE49-F238E27FC236}">
-                <a16:creationId xmlns:a16="http://schemas.microsoft.com/office/drawing/2014/main" id="{44D322A4-7616-4831-BF14-989ADB1D56A2}"/>
+                <a16:creationId xmlns="" xmlns:a16="http://schemas.microsoft.com/office/drawing/2014/main" id="{44D322A4-7616-4831-BF14-989ADB1D56A2}"/>
               </a:ext>
             </a:extLst>
           </p:cNvPr>
@@ -4742,10 +4756,10 @@
           <p:nvPr/>
         </p:nvPicPr>
         <p:blipFill>
-          <a:blip r:embed="rId2">
+          <a:blip r:embed="rId2" cstate="print">
             <a:extLst>
               <a:ext uri="{28A0092B-C50C-407E-A947-70E740481C1C}">
-                <a14:useLocalDpi xmlns:a14="http://schemas.microsoft.com/office/drawing/2010/main" val="0"/>
+                <a14:useLocalDpi xmlns="" xmlns:a14="http://schemas.microsoft.com/office/drawing/2010/main" val="0"/>
               </a:ext>
             </a:extLst>
           </a:blip>
@@ -4768,7 +4782,7 @@
           <p:cNvPr id="11" name="Grafik 10" descr="Ein Bild, das Screenshot enthält.&#10;&#10;Mit sehr hoher Zuverlässigkeit generierte Beschreibung">
             <a:extLst>
               <a:ext uri="{FF2B5EF4-FFF2-40B4-BE49-F238E27FC236}">
-                <a16:creationId xmlns:a16="http://schemas.microsoft.com/office/drawing/2014/main" id="{243C8C93-F2A9-4CCA-B379-54DCF9CB47BC}"/>
+                <a16:creationId xmlns="" xmlns:a16="http://schemas.microsoft.com/office/drawing/2014/main" id="{243C8C93-F2A9-4CCA-B379-54DCF9CB47BC}"/>
               </a:ext>
             </a:extLst>
           </p:cNvPr>
@@ -4778,10 +4792,10 @@
           <p:nvPr/>
         </p:nvPicPr>
         <p:blipFill>
-          <a:blip r:embed="rId3">
+          <a:blip r:embed="rId3" cstate="print">
             <a:extLst>
               <a:ext uri="{28A0092B-C50C-407E-A947-70E740481C1C}">
-                <a14:useLocalDpi xmlns:a14="http://schemas.microsoft.com/office/drawing/2010/main" val="0"/>
+                <a14:useLocalDpi xmlns="" xmlns:a14="http://schemas.microsoft.com/office/drawing/2010/main" val="0"/>
               </a:ext>
             </a:extLst>
           </a:blip>
@@ -4804,7 +4818,7 @@
           <p:cNvPr id="13" name="Grafik 12">
             <a:extLst>
               <a:ext uri="{FF2B5EF4-FFF2-40B4-BE49-F238E27FC236}">
-                <a16:creationId xmlns:a16="http://schemas.microsoft.com/office/drawing/2014/main" id="{46549DC5-31F9-45FF-93A0-23FDB372EBFB}"/>
+                <a16:creationId xmlns="" xmlns:a16="http://schemas.microsoft.com/office/drawing/2014/main" id="{46549DC5-31F9-45FF-93A0-23FDB372EBFB}"/>
               </a:ext>
             </a:extLst>
           </p:cNvPr>
@@ -4814,10 +4828,10 @@
           <p:nvPr/>
         </p:nvPicPr>
         <p:blipFill>
-          <a:blip r:embed="rId4">
+          <a:blip r:embed="rId4" cstate="print">
             <a:extLst>
               <a:ext uri="{28A0092B-C50C-407E-A947-70E740481C1C}">
-                <a14:useLocalDpi xmlns:a14="http://schemas.microsoft.com/office/drawing/2010/main" val="0"/>
+                <a14:useLocalDpi xmlns="" xmlns:a14="http://schemas.microsoft.com/office/drawing/2010/main" val="0"/>
               </a:ext>
             </a:extLst>
           </a:blip>
@@ -4840,7 +4854,7 @@
           <p:cNvPr id="14" name="Rechteck 13">
             <a:extLst>
               <a:ext uri="{FF2B5EF4-FFF2-40B4-BE49-F238E27FC236}">
-                <a16:creationId xmlns:a16="http://schemas.microsoft.com/office/drawing/2014/main" id="{76AFBC2E-7C00-4194-8ECC-60FE15AD473E}"/>
+                <a16:creationId xmlns="" xmlns:a16="http://schemas.microsoft.com/office/drawing/2014/main" id="{76AFBC2E-7C00-4194-8ECC-60FE15AD473E}"/>
               </a:ext>
             </a:extLst>
           </p:cNvPr>
@@ -4877,7 +4891,7 @@
           <p:cNvPr id="15" name="Rechteck 14">
             <a:extLst>
               <a:ext uri="{FF2B5EF4-FFF2-40B4-BE49-F238E27FC236}">
-                <a16:creationId xmlns:a16="http://schemas.microsoft.com/office/drawing/2014/main" id="{87B238F7-DF41-4F27-8FFE-DF453AB67C9D}"/>
+                <a16:creationId xmlns="" xmlns:a16="http://schemas.microsoft.com/office/drawing/2014/main" id="{87B238F7-DF41-4F27-8FFE-DF453AB67C9D}"/>
               </a:ext>
             </a:extLst>
           </p:cNvPr>
@@ -4914,7 +4928,7 @@
           <p:cNvPr id="16" name="Rechteck 15">
             <a:extLst>
               <a:ext uri="{FF2B5EF4-FFF2-40B4-BE49-F238E27FC236}">
-                <a16:creationId xmlns:a16="http://schemas.microsoft.com/office/drawing/2014/main" id="{E32CC02A-A315-4666-BD53-E69F8E34236E}"/>
+                <a16:creationId xmlns="" xmlns:a16="http://schemas.microsoft.com/office/drawing/2014/main" id="{E32CC02A-A315-4666-BD53-E69F8E34236E}"/>
               </a:ext>
             </a:extLst>
           </p:cNvPr>
@@ -4963,7 +4977,7 @@
           <p:cNvPr id="17" name="Rechteck 16">
             <a:extLst>
               <a:ext uri="{FF2B5EF4-FFF2-40B4-BE49-F238E27FC236}">
-                <a16:creationId xmlns:a16="http://schemas.microsoft.com/office/drawing/2014/main" id="{2C913AE0-CFC1-4E2B-BEB2-1D3DE13D33BF}"/>
+                <a16:creationId xmlns="" xmlns:a16="http://schemas.microsoft.com/office/drawing/2014/main" id="{2C913AE0-CFC1-4E2B-BEB2-1D3DE13D33BF}"/>
               </a:ext>
             </a:extLst>
           </p:cNvPr>
@@ -5065,7 +5079,7 @@
     </p:spTree>
     <p:extLst>
       <p:ext uri="{BB962C8B-B14F-4D97-AF65-F5344CB8AC3E}">
-        <p14:creationId xmlns:p14="http://schemas.microsoft.com/office/powerpoint/2010/main" val="4155365315"/>
+        <p14:creationId xmlns="" xmlns:p14="http://schemas.microsoft.com/office/powerpoint/2010/main" val="4155365315"/>
       </p:ext>
     </p:extLst>
   </p:cSld>
@@ -5180,7 +5194,7 @@
           <p:cNvPr id="7" name="Titel 1">
             <a:extLst>
               <a:ext uri="{FF2B5EF4-FFF2-40B4-BE49-F238E27FC236}">
-                <a16:creationId xmlns:a16="http://schemas.microsoft.com/office/drawing/2014/main" id="{5E5EB1EA-266D-4CBF-B165-153D3814CE1A}"/>
+                <a16:creationId xmlns="" xmlns:a16="http://schemas.microsoft.com/office/drawing/2014/main" id="{5E5EB1EA-266D-4CBF-B165-153D3814CE1A}"/>
               </a:ext>
             </a:extLst>
           </p:cNvPr>
@@ -5234,7 +5248,7 @@
           <p:cNvPr id="17" name="Rechteck 16">
             <a:extLst>
               <a:ext uri="{FF2B5EF4-FFF2-40B4-BE49-F238E27FC236}">
-                <a16:creationId xmlns:a16="http://schemas.microsoft.com/office/drawing/2014/main" id="{2C913AE0-CFC1-4E2B-BEB2-1D3DE13D33BF}"/>
+                <a16:creationId xmlns="" xmlns:a16="http://schemas.microsoft.com/office/drawing/2014/main" id="{2C913AE0-CFC1-4E2B-BEB2-1D3DE13D33BF}"/>
               </a:ext>
             </a:extLst>
           </p:cNvPr>
@@ -5369,7 +5383,7 @@
           <p:cNvPr id="12" name="Grafik 11" descr="Ein Bild, das Screenshot enthält.&#10;&#10;Mit hoher Zuverlässigkeit generierte Beschreibung">
             <a:extLst>
               <a:ext uri="{FF2B5EF4-FFF2-40B4-BE49-F238E27FC236}">
-                <a16:creationId xmlns:a16="http://schemas.microsoft.com/office/drawing/2014/main" id="{3DFA9294-F153-4A02-91A1-331EC174E76B}"/>
+                <a16:creationId xmlns="" xmlns:a16="http://schemas.microsoft.com/office/drawing/2014/main" id="{3DFA9294-F153-4A02-91A1-331EC174E76B}"/>
               </a:ext>
             </a:extLst>
           </p:cNvPr>
@@ -5379,10 +5393,10 @@
           <p:nvPr/>
         </p:nvPicPr>
         <p:blipFill>
-          <a:blip r:embed="rId2">
+          <a:blip r:embed="rId2" cstate="print">
             <a:extLst>
               <a:ext uri="{28A0092B-C50C-407E-A947-70E740481C1C}">
-                <a14:useLocalDpi xmlns:a14="http://schemas.microsoft.com/office/drawing/2010/main" val="0"/>
+                <a14:useLocalDpi xmlns="" xmlns:a14="http://schemas.microsoft.com/office/drawing/2010/main" val="0"/>
               </a:ext>
             </a:extLst>
           </a:blip>
@@ -5403,7 +5417,3258 @@
     </p:spTree>
     <p:extLst>
       <p:ext uri="{BB962C8B-B14F-4D97-AF65-F5344CB8AC3E}">
-        <p14:creationId xmlns:p14="http://schemas.microsoft.com/office/powerpoint/2010/main" val="1473716604"/>
+        <p14:creationId xmlns="" xmlns:p14="http://schemas.microsoft.com/office/powerpoint/2010/main" val="1473716604"/>
+      </p:ext>
+    </p:extLst>
+  </p:cSld>
+  <p:clrMapOvr>
+    <a:masterClrMapping/>
+  </p:clrMapOvr>
+  <p:timing>
+    <p:tnLst>
+      <p:par>
+        <p:cTn id="1" dur="indefinite" restart="never" nodeType="tmRoot">
+          <p:childTnLst>
+            <p:seq>
+              <p:cTn id="2" nodeType="mainSeq"/>
+              <p:prevCondLst>
+                <p:cond evt="onPrev" delay="0">
+                  <p:tgtEl>
+                    <p:sldTgt/>
+                  </p:tgtEl>
+                </p:cond>
+              </p:prevCondLst>
+              <p:nextCondLst>
+                <p:cond evt="onNext" delay="0">
+                  <p:tgtEl>
+                    <p:sldTgt/>
+                  </p:tgtEl>
+                </p:cond>
+              </p:nextCondLst>
+            </p:seq>
+          </p:childTnLst>
+        </p:cTn>
+      </p:par>
+    </p:tnLst>
+  </p:timing>
+</p:sld>
+</file>
+
+<file path=ppt/slides/slide12.xml><?xml version="1.0" encoding="utf-8"?>
+<p:sld xmlns:a="http://schemas.openxmlformats.org/drawingml/2006/main" xmlns:r="http://schemas.openxmlformats.org/officeDocument/2006/relationships" xmlns:p="http://schemas.openxmlformats.org/presentationml/2006/main">
+  <p:cSld>
+    <p:spTree>
+      <p:nvGrpSpPr>
+        <p:cNvPr id="1" name=""/>
+        <p:cNvGrpSpPr/>
+        <p:nvPr/>
+      </p:nvGrpSpPr>
+      <p:grpSpPr>
+        <a:xfrm>
+          <a:off x="0" y="0"/>
+          <a:ext cx="0" cy="0"/>
+          <a:chOff x="0" y="0"/>
+          <a:chExt cx="0" cy="0"/>
+        </a:xfrm>
+      </p:grpSpPr>
+      <p:sp>
+        <p:nvSpPr>
+          <p:cNvPr id="84" name="TextShape 1"/>
+          <p:cNvSpPr txBox="1"/>
+          <p:nvPr/>
+        </p:nvSpPr>
+        <p:spPr>
+          <a:xfrm>
+            <a:off x="628560" y="365040"/>
+            <a:ext cx="7886520" cy="1325160"/>
+          </a:xfrm>
+          <a:prstGeom prst="rect">
+            <a:avLst/>
+          </a:prstGeom>
+          <a:noFill/>
+          <a:ln>
+            <a:noFill/>
+          </a:ln>
+        </p:spPr>
+        <p:txBody>
+          <a:bodyPr anchor="ctr"/>
+          <a:lstStyle/>
+          <a:p>
+            <a:pPr>
+              <a:lnSpc>
+                <a:spcPct val="90000"/>
+              </a:lnSpc>
+            </a:pPr>
+            <a:r>
+              <a:rPr lang="en-US" sz="4400" b="0" strike="noStrike" spc="-1" dirty="0" smtClean="0">
+                <a:solidFill>
+                  <a:srgbClr val="000000"/>
+                </a:solidFill>
+                <a:uFill>
+                  <a:solidFill>
+                    <a:srgbClr val="FFFFFF"/>
+                  </a:solidFill>
+                </a:uFill>
+                <a:latin typeface="Calibri Light"/>
+              </a:rPr>
+              <a:t>Deep Q-Learning - Network </a:t>
+            </a:r>
+            <a:endParaRPr lang="en-US" sz="1800" b="0" strike="noStrike" spc="-1" dirty="0">
+              <a:solidFill>
+                <a:srgbClr val="000000"/>
+              </a:solidFill>
+              <a:uFill>
+                <a:solidFill>
+                  <a:srgbClr val="FFFFFF"/>
+                </a:solidFill>
+              </a:uFill>
+              <a:latin typeface="Calibri"/>
+            </a:endParaRPr>
+          </a:p>
+        </p:txBody>
+      </p:sp>
+      <p:sp>
+        <p:nvSpPr>
+          <p:cNvPr id="85" name="TextShape 2"/>
+          <p:cNvSpPr txBox="1"/>
+          <p:nvPr/>
+        </p:nvSpPr>
+        <p:spPr>
+          <a:xfrm>
+            <a:off x="628560" y="1825560"/>
+            <a:ext cx="7886520" cy="4350960"/>
+          </a:xfrm>
+          <a:prstGeom prst="rect">
+            <a:avLst/>
+          </a:prstGeom>
+          <a:noFill/>
+          <a:ln>
+            <a:noFill/>
+          </a:ln>
+        </p:spPr>
+        <p:txBody>
+          <a:bodyPr/>
+          <a:lstStyle/>
+          <a:p>
+            <a:r>
+              <a:rPr lang="de-DE" altLang="de-DE" sz="2800" dirty="0" err="1" smtClean="0">
+                <a:latin typeface="Calibri" panose="020F0502020204030204" pitchFamily="34" charset="0"/>
+                <a:cs typeface="Calibri" panose="020F0502020204030204" pitchFamily="34" charset="0"/>
+              </a:rPr>
+              <a:t>Using</a:t>
+            </a:r>
+            <a:r>
+              <a:rPr lang="de-DE" altLang="de-DE" sz="2800" dirty="0" smtClean="0">
+                <a:latin typeface="Calibri" panose="020F0502020204030204" pitchFamily="34" charset="0"/>
+                <a:cs typeface="Calibri" panose="020F0502020204030204" pitchFamily="34" charset="0"/>
+              </a:rPr>
+              <a:t> </a:t>
+            </a:r>
+            <a:r>
+              <a:rPr lang="de-DE" altLang="de-DE" sz="2800" dirty="0" err="1" smtClean="0">
+                <a:latin typeface="Calibri" panose="020F0502020204030204" pitchFamily="34" charset="0"/>
+                <a:cs typeface="Calibri" panose="020F0502020204030204" pitchFamily="34" charset="0"/>
+              </a:rPr>
+              <a:t>Convolutional</a:t>
+            </a:r>
+            <a:r>
+              <a:rPr lang="de-DE" altLang="de-DE" sz="2800" dirty="0" smtClean="0">
+                <a:latin typeface="Calibri" panose="020F0502020204030204" pitchFamily="34" charset="0"/>
+                <a:cs typeface="Calibri" panose="020F0502020204030204" pitchFamily="34" charset="0"/>
+              </a:rPr>
+              <a:t> Neutral Network (CNN):</a:t>
+            </a:r>
+          </a:p>
+          <a:p>
+            <a:r>
+              <a:rPr lang="de-DE" altLang="de-DE" sz="2800" dirty="0" smtClean="0">
+                <a:latin typeface="Calibri" panose="020F0502020204030204" pitchFamily="34" charset="0"/>
+                <a:cs typeface="Calibri" panose="020F0502020204030204" pitchFamily="34" charset="0"/>
+              </a:rPr>
+              <a:t>	</a:t>
+            </a:r>
+            <a:r>
+              <a:rPr lang="de-DE" altLang="de-DE" sz="2800" dirty="0" err="1" smtClean="0">
+                <a:latin typeface="Calibri" panose="020F0502020204030204" pitchFamily="34" charset="0"/>
+                <a:cs typeface="Calibri" panose="020F0502020204030204" pitchFamily="34" charset="0"/>
+              </a:rPr>
+              <a:t>Convolution</a:t>
+            </a:r>
+            <a:r>
+              <a:rPr lang="de-DE" altLang="de-DE" sz="2800" dirty="0" smtClean="0">
+                <a:latin typeface="Calibri" panose="020F0502020204030204" pitchFamily="34" charset="0"/>
+                <a:cs typeface="Calibri" panose="020F0502020204030204" pitchFamily="34" charset="0"/>
+              </a:rPr>
+              <a:t> </a:t>
+            </a:r>
+            <a:r>
+              <a:rPr lang="de-DE" altLang="de-DE" sz="2800" dirty="0" err="1" smtClean="0">
+                <a:latin typeface="Calibri" panose="020F0502020204030204" pitchFamily="34" charset="0"/>
+                <a:cs typeface="Calibri" panose="020F0502020204030204" pitchFamily="34" charset="0"/>
+              </a:rPr>
+              <a:t>leyer</a:t>
+            </a:r>
+            <a:r>
+              <a:rPr lang="de-DE" altLang="de-DE" sz="2800" dirty="0" smtClean="0">
+                <a:latin typeface="Calibri" panose="020F0502020204030204" pitchFamily="34" charset="0"/>
+                <a:cs typeface="Calibri" panose="020F0502020204030204" pitchFamily="34" charset="0"/>
+              </a:rPr>
+              <a:t> / </a:t>
+            </a:r>
+            <a:r>
+              <a:rPr lang="de-DE" altLang="de-DE" sz="2800" dirty="0" err="1" smtClean="0">
+                <a:latin typeface="Calibri" panose="020F0502020204030204" pitchFamily="34" charset="0"/>
+                <a:cs typeface="Calibri" panose="020F0502020204030204" pitchFamily="34" charset="0"/>
+              </a:rPr>
+              <a:t>Filtering</a:t>
+            </a:r>
+            <a:endParaRPr lang="de-DE" altLang="de-DE" sz="2800" dirty="0" smtClean="0">
+              <a:latin typeface="Calibri" panose="020F0502020204030204" pitchFamily="34" charset="0"/>
+              <a:cs typeface="Calibri" panose="020F0502020204030204" pitchFamily="34" charset="0"/>
+            </a:endParaRPr>
+          </a:p>
+          <a:p>
+            <a:r>
+              <a:rPr lang="de-DE" altLang="de-DE" sz="2800" dirty="0" smtClean="0">
+                <a:latin typeface="Calibri" panose="020F0502020204030204" pitchFamily="34" charset="0"/>
+                <a:cs typeface="Calibri" panose="020F0502020204030204" pitchFamily="34" charset="0"/>
+              </a:rPr>
+              <a:t>	Pooling / Subsampling</a:t>
+            </a:r>
+          </a:p>
+          <a:p>
+            <a:r>
+              <a:rPr lang="de-DE" altLang="de-DE" sz="2800" dirty="0" smtClean="0">
+                <a:latin typeface="Calibri" panose="020F0502020204030204" pitchFamily="34" charset="0"/>
+                <a:cs typeface="Calibri" panose="020F0502020204030204" pitchFamily="34" charset="0"/>
+              </a:rPr>
+              <a:t>	</a:t>
+            </a:r>
+            <a:r>
+              <a:rPr lang="de-DE" altLang="de-DE" sz="2800" dirty="0" err="1" smtClean="0">
+                <a:latin typeface="Calibri" panose="020F0502020204030204" pitchFamily="34" charset="0"/>
+                <a:cs typeface="Calibri" panose="020F0502020204030204" pitchFamily="34" charset="0"/>
+              </a:rPr>
+              <a:t>Normalization</a:t>
+            </a:r>
+            <a:endParaRPr lang="de-DE" altLang="de-DE" sz="2800" dirty="0" smtClean="0">
+              <a:latin typeface="Calibri" panose="020F0502020204030204" pitchFamily="34" charset="0"/>
+              <a:cs typeface="Calibri" panose="020F0502020204030204" pitchFamily="34" charset="0"/>
+            </a:endParaRPr>
+          </a:p>
+          <a:p>
+            <a:r>
+              <a:rPr lang="de-DE" altLang="de-DE" sz="2800" dirty="0" smtClean="0">
+                <a:latin typeface="Calibri" panose="020F0502020204030204" pitchFamily="34" charset="0"/>
+                <a:cs typeface="Calibri" panose="020F0502020204030204" pitchFamily="34" charset="0"/>
+              </a:rPr>
+              <a:t>	</a:t>
+            </a:r>
+            <a:r>
+              <a:rPr lang="de-DE" altLang="de-DE" sz="2800" dirty="0" err="1" smtClean="0">
+                <a:latin typeface="Calibri" panose="020F0502020204030204" pitchFamily="34" charset="0"/>
+                <a:cs typeface="Calibri" panose="020F0502020204030204" pitchFamily="34" charset="0"/>
+              </a:rPr>
+              <a:t>Fully</a:t>
+            </a:r>
+            <a:r>
+              <a:rPr lang="de-DE" altLang="de-DE" sz="2800" dirty="0" smtClean="0">
+                <a:latin typeface="Calibri" panose="020F0502020204030204" pitchFamily="34" charset="0"/>
+                <a:cs typeface="Calibri" panose="020F0502020204030204" pitchFamily="34" charset="0"/>
+              </a:rPr>
+              <a:t> </a:t>
+            </a:r>
+            <a:r>
+              <a:rPr lang="de-DE" altLang="de-DE" sz="2800" dirty="0" err="1" smtClean="0">
+                <a:latin typeface="Calibri" panose="020F0502020204030204" pitchFamily="34" charset="0"/>
+                <a:cs typeface="Calibri" panose="020F0502020204030204" pitchFamily="34" charset="0"/>
+              </a:rPr>
+              <a:t>connected</a:t>
+            </a:r>
+            <a:r>
+              <a:rPr lang="de-DE" altLang="de-DE" sz="2800" dirty="0" smtClean="0">
+                <a:latin typeface="Calibri" panose="020F0502020204030204" pitchFamily="34" charset="0"/>
+                <a:cs typeface="Calibri" panose="020F0502020204030204" pitchFamily="34" charset="0"/>
+              </a:rPr>
+              <a:t> </a:t>
+            </a:r>
+            <a:r>
+              <a:rPr lang="de-DE" altLang="de-DE" sz="2800" dirty="0" err="1" smtClean="0">
+                <a:latin typeface="Calibri" panose="020F0502020204030204" pitchFamily="34" charset="0"/>
+                <a:cs typeface="Calibri" panose="020F0502020204030204" pitchFamily="34" charset="0"/>
+              </a:rPr>
+              <a:t>leyer</a:t>
+            </a:r>
+            <a:endParaRPr lang="de-DE" altLang="de-DE" sz="2800" dirty="0" smtClean="0">
+              <a:latin typeface="Calibri" panose="020F0502020204030204" pitchFamily="34" charset="0"/>
+              <a:cs typeface="Calibri" panose="020F0502020204030204" pitchFamily="34" charset="0"/>
+            </a:endParaRPr>
+          </a:p>
+          <a:p>
+            <a:r>
+              <a:rPr lang="de-DE" altLang="de-DE" sz="2800" dirty="0" err="1" smtClean="0">
+                <a:latin typeface="Calibri" panose="020F0502020204030204" pitchFamily="34" charset="0"/>
+                <a:cs typeface="Calibri" panose="020F0502020204030204" pitchFamily="34" charset="0"/>
+              </a:rPr>
+              <a:t>Using</a:t>
+            </a:r>
+            <a:r>
+              <a:rPr lang="de-DE" altLang="de-DE" sz="2800" dirty="0" smtClean="0">
+                <a:latin typeface="Calibri" panose="020F0502020204030204" pitchFamily="34" charset="0"/>
+                <a:cs typeface="Calibri" panose="020F0502020204030204" pitchFamily="34" charset="0"/>
+              </a:rPr>
+              <a:t> </a:t>
+            </a:r>
+            <a:r>
+              <a:rPr lang="de-DE" altLang="de-DE" sz="2800" dirty="0" err="1" smtClean="0">
+                <a:latin typeface="Calibri" panose="020F0502020204030204" pitchFamily="34" charset="0"/>
+                <a:cs typeface="Calibri" panose="020F0502020204030204" pitchFamily="34" charset="0"/>
+              </a:rPr>
+              <a:t>TensorFlow</a:t>
+            </a:r>
+            <a:r>
+              <a:rPr lang="de-DE" altLang="de-DE" sz="2800" dirty="0" smtClean="0">
+                <a:latin typeface="Calibri" panose="020F0502020204030204" pitchFamily="34" charset="0"/>
+                <a:cs typeface="Calibri" panose="020F0502020204030204" pitchFamily="34" charset="0"/>
+              </a:rPr>
+              <a:t> (TF) </a:t>
+            </a:r>
+            <a:r>
+              <a:rPr lang="de-DE" altLang="de-DE" sz="2800" dirty="0" err="1" smtClean="0">
+                <a:latin typeface="Calibri" panose="020F0502020204030204" pitchFamily="34" charset="0"/>
+                <a:cs typeface="Calibri" panose="020F0502020204030204" pitchFamily="34" charset="0"/>
+              </a:rPr>
+              <a:t>libary</a:t>
+            </a:r>
+            <a:endParaRPr lang="de-DE" altLang="de-DE" sz="2800" dirty="0" smtClean="0">
+              <a:latin typeface="Calibri" panose="020F0502020204030204" pitchFamily="34" charset="0"/>
+              <a:cs typeface="Calibri" panose="020F0502020204030204" pitchFamily="34" charset="0"/>
+            </a:endParaRPr>
+          </a:p>
+          <a:p>
+            <a:pPr marL="0" lvl="1"/>
+            <a:r>
+              <a:rPr lang="de-DE" altLang="de-DE" sz="2800" dirty="0" smtClean="0">
+                <a:latin typeface="Calibri" panose="020F0502020204030204" pitchFamily="34" charset="0"/>
+                <a:cs typeface="Calibri" panose="020F0502020204030204" pitchFamily="34" charset="0"/>
+              </a:rPr>
+              <a:t>	</a:t>
+            </a:r>
+            <a:r>
+              <a:rPr lang="en-US" altLang="de-DE" sz="2800" dirty="0" smtClean="0">
+                <a:latin typeface="Calibri" panose="020F0502020204030204" pitchFamily="34" charset="0"/>
+                <a:cs typeface="Calibri" panose="020F0502020204030204" pitchFamily="34" charset="0"/>
+              </a:rPr>
+              <a:t>Detailed documentation</a:t>
+            </a:r>
+          </a:p>
+          <a:p>
+            <a:pPr marL="0" lvl="1"/>
+            <a:r>
+              <a:rPr lang="en-US" altLang="de-DE" sz="2800" dirty="0" smtClean="0">
+                <a:latin typeface="Calibri" panose="020F0502020204030204" pitchFamily="34" charset="0"/>
+                <a:cs typeface="Calibri" panose="020F0502020204030204" pitchFamily="34" charset="0"/>
+              </a:rPr>
+              <a:t>	Create layers</a:t>
+            </a:r>
+          </a:p>
+          <a:p>
+            <a:pPr marL="0" lvl="1"/>
+            <a:r>
+              <a:rPr lang="en-US" altLang="de-DE" sz="2800" dirty="0" smtClean="0">
+                <a:latin typeface="Calibri" panose="020F0502020204030204" pitchFamily="34" charset="0"/>
+                <a:cs typeface="Calibri" panose="020F0502020204030204" pitchFamily="34" charset="0"/>
+              </a:rPr>
+              <a:t>	Possibility of composite layers</a:t>
+            </a:r>
+            <a:endParaRPr lang="de-DE" altLang="de-DE" sz="2800" dirty="0" smtClean="0">
+              <a:latin typeface="Calibri" panose="020F0502020204030204" pitchFamily="34" charset="0"/>
+              <a:cs typeface="Calibri" panose="020F0502020204030204" pitchFamily="34" charset="0"/>
+            </a:endParaRPr>
+          </a:p>
+          <a:p>
+            <a:r>
+              <a:rPr lang="de-DE" altLang="de-DE" sz="2800" dirty="0" smtClean="0">
+                <a:latin typeface="Calibri" panose="020F0502020204030204" pitchFamily="34" charset="0"/>
+                <a:cs typeface="Calibri" panose="020F0502020204030204" pitchFamily="34" charset="0"/>
+              </a:rPr>
+              <a:t>	</a:t>
+            </a:r>
+          </a:p>
+          <a:p>
+            <a:endParaRPr lang="de-DE" altLang="de-DE" sz="2800" dirty="0" smtClean="0">
+              <a:latin typeface="Calibri" panose="020F0502020204030204" pitchFamily="34" charset="0"/>
+              <a:cs typeface="Calibri" panose="020F0502020204030204" pitchFamily="34" charset="0"/>
+            </a:endParaRPr>
+          </a:p>
+          <a:p>
+            <a:endParaRPr lang="en-US" sz="2800" spc="-1" dirty="0">
+              <a:solidFill>
+                <a:srgbClr val="000000"/>
+              </a:solidFill>
+              <a:uFill>
+                <a:solidFill>
+                  <a:srgbClr val="FFFFFF"/>
+                </a:solidFill>
+              </a:uFill>
+              <a:latin typeface="Calibri"/>
+              <a:sym typeface="Wingdings" panose="05000000000000000000" pitchFamily="2" charset="2"/>
+            </a:endParaRPr>
+          </a:p>
+        </p:txBody>
+      </p:sp>
+    </p:spTree>
+    <p:extLst>
+      <p:ext uri="{BB962C8B-B14F-4D97-AF65-F5344CB8AC3E}">
+        <p14:creationId xmlns="" xmlns:p14="http://schemas.microsoft.com/office/powerpoint/2010/main" val="3506178436"/>
+      </p:ext>
+    </p:extLst>
+  </p:cSld>
+  <p:clrMapOvr>
+    <a:masterClrMapping/>
+  </p:clrMapOvr>
+  <p:timing>
+    <p:tnLst>
+      <p:par>
+        <p:cTn id="1" dur="indefinite" restart="never" nodeType="tmRoot">
+          <p:childTnLst>
+            <p:seq>
+              <p:cTn id="2" nodeType="mainSeq"/>
+              <p:prevCondLst>
+                <p:cond evt="onPrev" delay="0">
+                  <p:tgtEl>
+                    <p:sldTgt/>
+                  </p:tgtEl>
+                </p:cond>
+              </p:prevCondLst>
+              <p:nextCondLst>
+                <p:cond evt="onNext" delay="0">
+                  <p:tgtEl>
+                    <p:sldTgt/>
+                  </p:tgtEl>
+                </p:cond>
+              </p:nextCondLst>
+            </p:seq>
+          </p:childTnLst>
+        </p:cTn>
+      </p:par>
+    </p:tnLst>
+  </p:timing>
+</p:sld>
+</file>
+
+<file path=ppt/slides/slide13.xml><?xml version="1.0" encoding="utf-8"?>
+<p:sld xmlns:a="http://schemas.openxmlformats.org/drawingml/2006/main" xmlns:r="http://schemas.openxmlformats.org/officeDocument/2006/relationships" xmlns:p="http://schemas.openxmlformats.org/presentationml/2006/main">
+  <p:cSld>
+    <p:spTree>
+      <p:nvGrpSpPr>
+        <p:cNvPr id="1" name=""/>
+        <p:cNvGrpSpPr/>
+        <p:nvPr/>
+      </p:nvGrpSpPr>
+      <p:grpSpPr>
+        <a:xfrm>
+          <a:off x="0" y="0"/>
+          <a:ext cx="0" cy="0"/>
+          <a:chOff x="0" y="0"/>
+          <a:chExt cx="0" cy="0"/>
+        </a:xfrm>
+      </p:grpSpPr>
+      <p:sp>
+        <p:nvSpPr>
+          <p:cNvPr id="84" name="TextShape 1"/>
+          <p:cNvSpPr txBox="1"/>
+          <p:nvPr/>
+        </p:nvSpPr>
+        <p:spPr>
+          <a:xfrm>
+            <a:off x="628560" y="365040"/>
+            <a:ext cx="7886520" cy="1325160"/>
+          </a:xfrm>
+          <a:prstGeom prst="rect">
+            <a:avLst/>
+          </a:prstGeom>
+          <a:noFill/>
+          <a:ln>
+            <a:noFill/>
+          </a:ln>
+        </p:spPr>
+        <p:txBody>
+          <a:bodyPr anchor="ctr"/>
+          <a:lstStyle/>
+          <a:p>
+            <a:pPr>
+              <a:lnSpc>
+                <a:spcPct val="90000"/>
+              </a:lnSpc>
+            </a:pPr>
+            <a:r>
+              <a:rPr lang="en-US" sz="4400" b="0" strike="noStrike" spc="-1" dirty="0" smtClean="0">
+                <a:solidFill>
+                  <a:srgbClr val="000000"/>
+                </a:solidFill>
+                <a:uFill>
+                  <a:solidFill>
+                    <a:srgbClr val="FFFFFF"/>
+                  </a:solidFill>
+                </a:uFill>
+                <a:latin typeface="Calibri Light"/>
+              </a:rPr>
+              <a:t>Deep Q-Learning – Algorithm </a:t>
+            </a:r>
+            <a:endParaRPr lang="en-US" sz="1800" b="0" strike="noStrike" spc="-1" dirty="0">
+              <a:solidFill>
+                <a:srgbClr val="000000"/>
+              </a:solidFill>
+              <a:uFill>
+                <a:solidFill>
+                  <a:srgbClr val="FFFFFF"/>
+                </a:solidFill>
+              </a:uFill>
+              <a:latin typeface="Calibri"/>
+            </a:endParaRPr>
+          </a:p>
+        </p:txBody>
+      </p:sp>
+      <p:sp>
+        <p:nvSpPr>
+          <p:cNvPr id="85" name="TextShape 2"/>
+          <p:cNvSpPr txBox="1"/>
+          <p:nvPr/>
+        </p:nvSpPr>
+        <p:spPr>
+          <a:xfrm>
+            <a:off x="628560" y="1825560"/>
+            <a:ext cx="7886520" cy="4350960"/>
+          </a:xfrm>
+          <a:prstGeom prst="rect">
+            <a:avLst/>
+          </a:prstGeom>
+          <a:noFill/>
+          <a:ln>
+            <a:noFill/>
+          </a:ln>
+        </p:spPr>
+        <p:txBody>
+          <a:bodyPr/>
+          <a:lstStyle/>
+          <a:p>
+            <a:r>
+              <a:rPr lang="de-DE" altLang="de-DE" sz="2800" dirty="0" err="1" smtClean="0">
+                <a:latin typeface="Calibri" panose="020F0502020204030204" pitchFamily="34" charset="0"/>
+                <a:cs typeface="Calibri" panose="020F0502020204030204" pitchFamily="34" charset="0"/>
+              </a:rPr>
+              <a:t>Algorithm</a:t>
+            </a:r>
+            <a:r>
+              <a:rPr lang="de-DE" altLang="de-DE" sz="2800" dirty="0" smtClean="0">
+                <a:latin typeface="Calibri" panose="020F0502020204030204" pitchFamily="34" charset="0"/>
+                <a:cs typeface="Calibri" panose="020F0502020204030204" pitchFamily="34" charset="0"/>
+              </a:rPr>
+              <a:t> </a:t>
+            </a:r>
+            <a:r>
+              <a:rPr lang="de-DE" altLang="de-DE" sz="2800" dirty="0" err="1" smtClean="0">
+                <a:latin typeface="Calibri" panose="020F0502020204030204" pitchFamily="34" charset="0"/>
+                <a:cs typeface="Calibri" panose="020F0502020204030204" pitchFamily="34" charset="0"/>
+              </a:rPr>
+              <a:t>from</a:t>
+            </a:r>
+            <a:r>
+              <a:rPr lang="de-DE" altLang="de-DE" sz="2800" dirty="0" smtClean="0">
+                <a:latin typeface="Calibri" panose="020F0502020204030204" pitchFamily="34" charset="0"/>
+                <a:cs typeface="Calibri" panose="020F0502020204030204" pitchFamily="34" charset="0"/>
+              </a:rPr>
+              <a:t> „</a:t>
+            </a:r>
+            <a:r>
+              <a:rPr lang="de-DE" altLang="de-DE" sz="2800" dirty="0" err="1" smtClean="0">
+                <a:latin typeface="Calibri" panose="020F0502020204030204" pitchFamily="34" charset="0"/>
+                <a:cs typeface="Calibri" panose="020F0502020204030204" pitchFamily="34" charset="0"/>
+              </a:rPr>
+              <a:t>Playing</a:t>
+            </a:r>
+            <a:r>
+              <a:rPr lang="de-DE" altLang="de-DE" sz="2800" dirty="0" smtClean="0">
+                <a:latin typeface="Calibri" panose="020F0502020204030204" pitchFamily="34" charset="0"/>
+                <a:cs typeface="Calibri" panose="020F0502020204030204" pitchFamily="34" charset="0"/>
+              </a:rPr>
+              <a:t> Atari </a:t>
+            </a:r>
+            <a:r>
+              <a:rPr lang="de-DE" altLang="de-DE" sz="2800" dirty="0" err="1" smtClean="0">
+                <a:latin typeface="Calibri" panose="020F0502020204030204" pitchFamily="34" charset="0"/>
+                <a:cs typeface="Calibri" panose="020F0502020204030204" pitchFamily="34" charset="0"/>
+              </a:rPr>
+              <a:t>with</a:t>
+            </a:r>
+            <a:r>
+              <a:rPr lang="de-DE" altLang="de-DE" sz="2800" dirty="0" smtClean="0">
+                <a:latin typeface="Calibri" panose="020F0502020204030204" pitchFamily="34" charset="0"/>
+                <a:cs typeface="Calibri" panose="020F0502020204030204" pitchFamily="34" charset="0"/>
+              </a:rPr>
+              <a:t> </a:t>
+            </a:r>
+            <a:r>
+              <a:rPr lang="de-DE" altLang="de-DE" sz="2800" dirty="0" err="1" smtClean="0">
+                <a:latin typeface="Calibri" panose="020F0502020204030204" pitchFamily="34" charset="0"/>
+                <a:cs typeface="Calibri" panose="020F0502020204030204" pitchFamily="34" charset="0"/>
+              </a:rPr>
+              <a:t>Deep</a:t>
+            </a:r>
+            <a:r>
+              <a:rPr lang="de-DE" altLang="de-DE" sz="2800" dirty="0" smtClean="0">
+                <a:latin typeface="Calibri" panose="020F0502020204030204" pitchFamily="34" charset="0"/>
+                <a:cs typeface="Calibri" panose="020F0502020204030204" pitchFamily="34" charset="0"/>
+              </a:rPr>
+              <a:t> Reinforcement Learning“:</a:t>
+            </a:r>
+          </a:p>
+          <a:p>
+            <a:endParaRPr lang="de-DE" altLang="de-DE" sz="2800" dirty="0" smtClean="0">
+              <a:latin typeface="Calibri" panose="020F0502020204030204" pitchFamily="34" charset="0"/>
+              <a:cs typeface="Calibri" panose="020F0502020204030204" pitchFamily="34" charset="0"/>
+            </a:endParaRPr>
+          </a:p>
+          <a:p>
+            <a:endParaRPr lang="en-US" sz="2800" spc="-1" dirty="0">
+              <a:solidFill>
+                <a:srgbClr val="000000"/>
+              </a:solidFill>
+              <a:uFill>
+                <a:solidFill>
+                  <a:srgbClr val="FFFFFF"/>
+                </a:solidFill>
+              </a:uFill>
+              <a:latin typeface="Calibri"/>
+              <a:sym typeface="Wingdings" panose="05000000000000000000" pitchFamily="2" charset="2"/>
+            </a:endParaRPr>
+          </a:p>
+        </p:txBody>
+      </p:sp>
+      <p:pic>
+        <p:nvPicPr>
+          <p:cNvPr id="1027" name="Picture 3"/>
+          <p:cNvPicPr>
+            <a:picLocks noChangeAspect="1" noChangeArrowheads="1"/>
+          </p:cNvPicPr>
+          <p:nvPr/>
+        </p:nvPicPr>
+        <p:blipFill>
+          <a:blip r:embed="rId2" cstate="print"/>
+          <a:srcRect/>
+          <a:stretch>
+            <a:fillRect/>
+          </a:stretch>
+        </p:blipFill>
+        <p:spPr bwMode="auto">
+          <a:xfrm>
+            <a:off x="644525" y="2740868"/>
+            <a:ext cx="7854950" cy="4000500"/>
+          </a:xfrm>
+          <a:prstGeom prst="rect">
+            <a:avLst/>
+          </a:prstGeom>
+          <a:noFill/>
+          <a:ln w="9525">
+            <a:noFill/>
+            <a:miter lim="800000"/>
+            <a:headEnd/>
+            <a:tailEnd/>
+          </a:ln>
+        </p:spPr>
+      </p:pic>
+    </p:spTree>
+    <p:extLst>
+      <p:ext uri="{BB962C8B-B14F-4D97-AF65-F5344CB8AC3E}">
+        <p14:creationId xmlns="" xmlns:p14="http://schemas.microsoft.com/office/powerpoint/2010/main" val="3506178436"/>
+      </p:ext>
+    </p:extLst>
+  </p:cSld>
+  <p:clrMapOvr>
+    <a:masterClrMapping/>
+  </p:clrMapOvr>
+  <p:timing>
+    <p:tnLst>
+      <p:par>
+        <p:cTn id="1" dur="indefinite" restart="never" nodeType="tmRoot">
+          <p:childTnLst>
+            <p:seq>
+              <p:cTn id="2" nodeType="mainSeq"/>
+              <p:prevCondLst>
+                <p:cond evt="onPrev" delay="0">
+                  <p:tgtEl>
+                    <p:sldTgt/>
+                  </p:tgtEl>
+                </p:cond>
+              </p:prevCondLst>
+              <p:nextCondLst>
+                <p:cond evt="onNext" delay="0">
+                  <p:tgtEl>
+                    <p:sldTgt/>
+                  </p:tgtEl>
+                </p:cond>
+              </p:nextCondLst>
+            </p:seq>
+          </p:childTnLst>
+        </p:cTn>
+      </p:par>
+    </p:tnLst>
+  </p:timing>
+</p:sld>
+</file>
+
+<file path=ppt/slides/slide14.xml><?xml version="1.0" encoding="utf-8"?>
+<p:sld xmlns:a="http://schemas.openxmlformats.org/drawingml/2006/main" xmlns:r="http://schemas.openxmlformats.org/officeDocument/2006/relationships" xmlns:p="http://schemas.openxmlformats.org/presentationml/2006/main">
+  <p:cSld>
+    <p:spTree>
+      <p:nvGrpSpPr>
+        <p:cNvPr id="1" name=""/>
+        <p:cNvGrpSpPr/>
+        <p:nvPr/>
+      </p:nvGrpSpPr>
+      <p:grpSpPr>
+        <a:xfrm>
+          <a:off x="0" y="0"/>
+          <a:ext cx="0" cy="0"/>
+          <a:chOff x="0" y="0"/>
+          <a:chExt cx="0" cy="0"/>
+        </a:xfrm>
+      </p:grpSpPr>
+      <p:sp>
+        <p:nvSpPr>
+          <p:cNvPr id="84" name="TextShape 1"/>
+          <p:cNvSpPr txBox="1"/>
+          <p:nvPr/>
+        </p:nvSpPr>
+        <p:spPr>
+          <a:xfrm>
+            <a:off x="628560" y="365040"/>
+            <a:ext cx="8407936" cy="1325160"/>
+          </a:xfrm>
+          <a:prstGeom prst="rect">
+            <a:avLst/>
+          </a:prstGeom>
+          <a:noFill/>
+          <a:ln>
+            <a:noFill/>
+          </a:ln>
+        </p:spPr>
+        <p:txBody>
+          <a:bodyPr anchor="ctr"/>
+          <a:lstStyle/>
+          <a:p>
+            <a:pPr>
+              <a:lnSpc>
+                <a:spcPct val="90000"/>
+              </a:lnSpc>
+            </a:pPr>
+            <a:r>
+              <a:rPr lang="en-US" sz="4400" b="0" strike="noStrike" spc="-1" dirty="0" smtClean="0">
+                <a:solidFill>
+                  <a:srgbClr val="000000"/>
+                </a:solidFill>
+                <a:uFill>
+                  <a:solidFill>
+                    <a:srgbClr val="FFFFFF"/>
+                  </a:solidFill>
+                </a:uFill>
+                <a:latin typeface="Calibri Light"/>
+              </a:rPr>
+              <a:t>Deep Q-Learning - Implementation</a:t>
+            </a:r>
+            <a:endParaRPr lang="en-US" sz="1800" b="0" strike="noStrike" spc="-1" dirty="0">
+              <a:solidFill>
+                <a:srgbClr val="000000"/>
+              </a:solidFill>
+              <a:uFill>
+                <a:solidFill>
+                  <a:srgbClr val="FFFFFF"/>
+                </a:solidFill>
+              </a:uFill>
+              <a:latin typeface="Calibri"/>
+            </a:endParaRPr>
+          </a:p>
+        </p:txBody>
+      </p:sp>
+      <p:sp>
+        <p:nvSpPr>
+          <p:cNvPr id="85" name="TextShape 2"/>
+          <p:cNvSpPr txBox="1"/>
+          <p:nvPr/>
+        </p:nvSpPr>
+        <p:spPr>
+          <a:xfrm>
+            <a:off x="628560" y="1825560"/>
+            <a:ext cx="7886520" cy="4350960"/>
+          </a:xfrm>
+          <a:prstGeom prst="rect">
+            <a:avLst/>
+          </a:prstGeom>
+          <a:noFill/>
+          <a:ln>
+            <a:noFill/>
+          </a:ln>
+        </p:spPr>
+        <p:txBody>
+          <a:bodyPr/>
+          <a:lstStyle/>
+          <a:p>
+            <a:endParaRPr lang="de-DE" altLang="de-DE" sz="2800" dirty="0" smtClean="0">
+              <a:latin typeface="Calibri" panose="020F0502020204030204" pitchFamily="34" charset="0"/>
+              <a:cs typeface="Calibri" panose="020F0502020204030204" pitchFamily="34" charset="0"/>
+            </a:endParaRPr>
+          </a:p>
+          <a:p>
+            <a:endParaRPr lang="de-DE" altLang="de-DE" sz="2800" dirty="0" smtClean="0">
+              <a:latin typeface="Calibri" panose="020F0502020204030204" pitchFamily="34" charset="0"/>
+              <a:cs typeface="Calibri" panose="020F0502020204030204" pitchFamily="34" charset="0"/>
+            </a:endParaRPr>
+          </a:p>
+          <a:p>
+            <a:endParaRPr lang="en-US" sz="2800" spc="-1" dirty="0">
+              <a:solidFill>
+                <a:srgbClr val="000000"/>
+              </a:solidFill>
+              <a:uFill>
+                <a:solidFill>
+                  <a:srgbClr val="FFFFFF"/>
+                </a:solidFill>
+              </a:uFill>
+              <a:latin typeface="Calibri"/>
+              <a:sym typeface="Wingdings" panose="05000000000000000000" pitchFamily="2" charset="2"/>
+            </a:endParaRPr>
+          </a:p>
+        </p:txBody>
+      </p:sp>
+      <p:sp>
+        <p:nvSpPr>
+          <p:cNvPr id="7" name="Rad 6"/>
+          <p:cNvSpPr/>
+          <p:nvPr/>
+        </p:nvSpPr>
+        <p:spPr>
+          <a:xfrm>
+            <a:off x="8482136" y="5454352"/>
+            <a:ext cx="554360" cy="554360"/>
+          </a:xfrm>
+          <a:prstGeom prst="donut">
+            <a:avLst/>
+          </a:prstGeom>
+        </p:spPr>
+        <p:style>
+          <a:lnRef idx="2">
+            <a:schemeClr val="accent1">
+              <a:shade val="50000"/>
+            </a:schemeClr>
+          </a:lnRef>
+          <a:fillRef idx="1">
+            <a:schemeClr val="accent1"/>
+          </a:fillRef>
+          <a:effectRef idx="0">
+            <a:schemeClr val="accent1"/>
+          </a:effectRef>
+          <a:fontRef idx="minor">
+            <a:schemeClr val="lt1"/>
+          </a:fontRef>
+        </p:style>
+        <p:txBody>
+          <a:bodyPr rtlCol="0" anchor="ctr"/>
+          <a:lstStyle/>
+          <a:p>
+            <a:pPr algn="ctr"/>
+            <a:endParaRPr lang="en-GB">
+              <a:solidFill>
+                <a:schemeClr val="tx1"/>
+              </a:solidFill>
+            </a:endParaRPr>
+          </a:p>
+        </p:txBody>
+      </p:sp>
+      <p:sp>
+        <p:nvSpPr>
+          <p:cNvPr id="8" name="Flussdiagramm: Verzweigung 7"/>
+          <p:cNvSpPr/>
+          <p:nvPr/>
+        </p:nvSpPr>
+        <p:spPr>
+          <a:xfrm>
+            <a:off x="6660232" y="2204864"/>
+            <a:ext cx="914400" cy="612648"/>
+          </a:xfrm>
+          <a:prstGeom prst="flowChartDecision">
+            <a:avLst/>
+          </a:prstGeom>
+        </p:spPr>
+        <p:style>
+          <a:lnRef idx="2">
+            <a:schemeClr val="accent1">
+              <a:shade val="50000"/>
+            </a:schemeClr>
+          </a:lnRef>
+          <a:fillRef idx="1">
+            <a:schemeClr val="accent1"/>
+          </a:fillRef>
+          <a:effectRef idx="0">
+            <a:schemeClr val="accent1"/>
+          </a:effectRef>
+          <a:fontRef idx="minor">
+            <a:schemeClr val="lt1"/>
+          </a:fontRef>
+        </p:style>
+        <p:txBody>
+          <a:bodyPr rtlCol="0" anchor="ctr"/>
+          <a:lstStyle/>
+          <a:p>
+            <a:pPr algn="ctr"/>
+            <a:endParaRPr lang="en-GB"/>
+          </a:p>
+        </p:txBody>
+      </p:sp>
+      <p:sp>
+        <p:nvSpPr>
+          <p:cNvPr id="9" name="Flussdiagramm: Alternativer Prozess 8"/>
+          <p:cNvSpPr/>
+          <p:nvPr/>
+        </p:nvSpPr>
+        <p:spPr>
+          <a:xfrm>
+            <a:off x="1187624" y="2204864"/>
+            <a:ext cx="914400" cy="612648"/>
+          </a:xfrm>
+          <a:prstGeom prst="flowChartAlternateProcess">
+            <a:avLst/>
+          </a:prstGeom>
+        </p:spPr>
+        <p:style>
+          <a:lnRef idx="2">
+            <a:schemeClr val="accent1">
+              <a:shade val="50000"/>
+            </a:schemeClr>
+          </a:lnRef>
+          <a:fillRef idx="1">
+            <a:schemeClr val="accent1"/>
+          </a:fillRef>
+          <a:effectRef idx="0">
+            <a:schemeClr val="accent1"/>
+          </a:effectRef>
+          <a:fontRef idx="minor">
+            <a:schemeClr val="lt1"/>
+          </a:fontRef>
+        </p:style>
+        <p:txBody>
+          <a:bodyPr rtlCol="0" anchor="ctr"/>
+          <a:lstStyle/>
+          <a:p>
+            <a:pPr algn="ctr"/>
+            <a:r>
+              <a:rPr lang="en-GB" sz="1000" dirty="0" smtClean="0"/>
+              <a:t>Init.  </a:t>
+            </a:r>
+            <a:r>
+              <a:rPr lang="en-GB" sz="1000" dirty="0" err="1" smtClean="0"/>
+              <a:t>PyGame</a:t>
+            </a:r>
+            <a:r>
+              <a:rPr lang="en-GB" sz="1000" dirty="0" smtClean="0"/>
+              <a:t> Learning </a:t>
+            </a:r>
+            <a:r>
+              <a:rPr lang="en-GB" sz="1000" dirty="0" err="1" smtClean="0"/>
+              <a:t>Environm</a:t>
+            </a:r>
+            <a:r>
+              <a:rPr lang="en-GB" sz="1000" dirty="0" smtClean="0"/>
+              <a:t>.</a:t>
+            </a:r>
+            <a:endParaRPr lang="en-GB" sz="1000" dirty="0"/>
+          </a:p>
+        </p:txBody>
+      </p:sp>
+      <p:sp>
+        <p:nvSpPr>
+          <p:cNvPr id="10" name="Flussdiagramm: Verbindungsstelle 9"/>
+          <p:cNvSpPr/>
+          <p:nvPr/>
+        </p:nvSpPr>
+        <p:spPr>
+          <a:xfrm>
+            <a:off x="107504" y="2276872"/>
+            <a:ext cx="457200" cy="457200"/>
+          </a:xfrm>
+          <a:prstGeom prst="flowChartConnector">
+            <a:avLst/>
+          </a:prstGeom>
+        </p:spPr>
+        <p:style>
+          <a:lnRef idx="2">
+            <a:schemeClr val="accent1">
+              <a:shade val="50000"/>
+            </a:schemeClr>
+          </a:lnRef>
+          <a:fillRef idx="1">
+            <a:schemeClr val="accent1"/>
+          </a:fillRef>
+          <a:effectRef idx="0">
+            <a:schemeClr val="accent1"/>
+          </a:effectRef>
+          <a:fontRef idx="minor">
+            <a:schemeClr val="lt1"/>
+          </a:fontRef>
+        </p:style>
+        <p:txBody>
+          <a:bodyPr rtlCol="0" anchor="ctr"/>
+          <a:lstStyle/>
+          <a:p>
+            <a:pPr algn="ctr"/>
+            <a:r>
+              <a:rPr lang="en-GB" dirty="0" smtClean="0"/>
+              <a:t>S</a:t>
+            </a:r>
+            <a:endParaRPr lang="en-GB" dirty="0"/>
+          </a:p>
+        </p:txBody>
+      </p:sp>
+      <p:sp>
+        <p:nvSpPr>
+          <p:cNvPr id="11" name="Flussdiagramm: Alternativer Prozess 10"/>
+          <p:cNvSpPr/>
+          <p:nvPr/>
+        </p:nvSpPr>
+        <p:spPr>
+          <a:xfrm>
+            <a:off x="2627784" y="2204864"/>
+            <a:ext cx="914400" cy="612648"/>
+          </a:xfrm>
+          <a:prstGeom prst="flowChartAlternateProcess">
+            <a:avLst/>
+          </a:prstGeom>
+        </p:spPr>
+        <p:style>
+          <a:lnRef idx="2">
+            <a:schemeClr val="accent1">
+              <a:shade val="50000"/>
+            </a:schemeClr>
+          </a:lnRef>
+          <a:fillRef idx="1">
+            <a:schemeClr val="accent1"/>
+          </a:fillRef>
+          <a:effectRef idx="0">
+            <a:schemeClr val="accent1"/>
+          </a:effectRef>
+          <a:fontRef idx="minor">
+            <a:schemeClr val="lt1"/>
+          </a:fontRef>
+        </p:style>
+        <p:txBody>
+          <a:bodyPr rtlCol="0" anchor="ctr"/>
+          <a:lstStyle/>
+          <a:p>
+            <a:pPr algn="ctr"/>
+            <a:r>
+              <a:rPr lang="en-GB" sz="1000" dirty="0" smtClean="0"/>
+              <a:t>Init. Neural Network and start TF Session</a:t>
+            </a:r>
+            <a:endParaRPr lang="en-GB" sz="1000" dirty="0"/>
+          </a:p>
+        </p:txBody>
+      </p:sp>
+      <p:sp>
+        <p:nvSpPr>
+          <p:cNvPr id="12" name="Flussdiagramm: Alternativer Prozess 11"/>
+          <p:cNvSpPr/>
+          <p:nvPr/>
+        </p:nvSpPr>
+        <p:spPr>
+          <a:xfrm>
+            <a:off x="4067944" y="2204864"/>
+            <a:ext cx="914400" cy="612648"/>
+          </a:xfrm>
+          <a:prstGeom prst="flowChartAlternateProcess">
+            <a:avLst/>
+          </a:prstGeom>
+        </p:spPr>
+        <p:style>
+          <a:lnRef idx="2">
+            <a:schemeClr val="accent1">
+              <a:shade val="50000"/>
+            </a:schemeClr>
+          </a:lnRef>
+          <a:fillRef idx="1">
+            <a:schemeClr val="accent1"/>
+          </a:fillRef>
+          <a:effectRef idx="0">
+            <a:schemeClr val="accent1"/>
+          </a:effectRef>
+          <a:fontRef idx="minor">
+            <a:schemeClr val="lt1"/>
+          </a:fontRef>
+        </p:style>
+        <p:txBody>
+          <a:bodyPr rtlCol="0" anchor="ctr"/>
+          <a:lstStyle/>
+          <a:p>
+            <a:pPr algn="ctr"/>
+            <a:r>
+              <a:rPr lang="en-GB" sz="1000" dirty="0" smtClean="0"/>
+              <a:t>Init. Phi </a:t>
+            </a:r>
+            <a:r>
+              <a:rPr lang="en-GB" sz="1000" dirty="0" smtClean="0"/>
+              <a:t>f</a:t>
+            </a:r>
+            <a:r>
+              <a:rPr lang="en-GB" sz="1000" dirty="0" smtClean="0"/>
+              <a:t>unction</a:t>
+            </a:r>
+            <a:endParaRPr lang="en-GB" sz="1000" dirty="0"/>
+          </a:p>
+        </p:txBody>
+      </p:sp>
+      <p:sp>
+        <p:nvSpPr>
+          <p:cNvPr id="13" name="Flussdiagramm: Alternativer Prozess 12"/>
+          <p:cNvSpPr/>
+          <p:nvPr/>
+        </p:nvSpPr>
+        <p:spPr>
+          <a:xfrm>
+            <a:off x="5457800" y="2204864"/>
+            <a:ext cx="914400" cy="612648"/>
+          </a:xfrm>
+          <a:prstGeom prst="flowChartAlternateProcess">
+            <a:avLst/>
+          </a:prstGeom>
+        </p:spPr>
+        <p:style>
+          <a:lnRef idx="2">
+            <a:schemeClr val="accent1">
+              <a:shade val="50000"/>
+            </a:schemeClr>
+          </a:lnRef>
+          <a:fillRef idx="1">
+            <a:schemeClr val="accent1"/>
+          </a:fillRef>
+          <a:effectRef idx="0">
+            <a:schemeClr val="accent1"/>
+          </a:effectRef>
+          <a:fontRef idx="minor">
+            <a:schemeClr val="lt1"/>
+          </a:fontRef>
+        </p:style>
+        <p:txBody>
+          <a:bodyPr rtlCol="0" anchor="ctr"/>
+          <a:lstStyle/>
+          <a:p>
+            <a:pPr algn="ctr"/>
+            <a:r>
+              <a:rPr lang="en-GB" sz="1000" dirty="0" smtClean="0"/>
+              <a:t>Start learning</a:t>
+            </a:r>
+            <a:endParaRPr lang="en-GB" sz="1000" dirty="0"/>
+          </a:p>
+        </p:txBody>
+      </p:sp>
+      <p:sp>
+        <p:nvSpPr>
+          <p:cNvPr id="14" name="Flussdiagramm: Alternativer Prozess 13"/>
+          <p:cNvSpPr/>
+          <p:nvPr/>
+        </p:nvSpPr>
+        <p:spPr>
+          <a:xfrm>
+            <a:off x="7978080" y="2204864"/>
+            <a:ext cx="914400" cy="612648"/>
+          </a:xfrm>
+          <a:prstGeom prst="flowChartAlternateProcess">
+            <a:avLst/>
+          </a:prstGeom>
+        </p:spPr>
+        <p:style>
+          <a:lnRef idx="2">
+            <a:schemeClr val="accent1">
+              <a:shade val="50000"/>
+            </a:schemeClr>
+          </a:lnRef>
+          <a:fillRef idx="1">
+            <a:schemeClr val="accent1"/>
+          </a:fillRef>
+          <a:effectRef idx="0">
+            <a:schemeClr val="accent1"/>
+          </a:effectRef>
+          <a:fontRef idx="minor">
+            <a:schemeClr val="lt1"/>
+          </a:fontRef>
+        </p:style>
+        <p:txBody>
+          <a:bodyPr rtlCol="0" anchor="ctr"/>
+          <a:lstStyle/>
+          <a:p>
+            <a:pPr algn="ctr"/>
+            <a:r>
+              <a:rPr lang="en-GB" sz="1000" dirty="0" smtClean="0"/>
+              <a:t>Restart </a:t>
+            </a:r>
+            <a:r>
+              <a:rPr lang="en-GB" sz="1000" dirty="0" smtClean="0"/>
+              <a:t>Game</a:t>
+            </a:r>
+            <a:endParaRPr lang="en-GB" sz="1000" dirty="0"/>
+          </a:p>
+        </p:txBody>
+      </p:sp>
+      <p:sp>
+        <p:nvSpPr>
+          <p:cNvPr id="15" name="Flussdiagramm: Verzweigung 14"/>
+          <p:cNvSpPr/>
+          <p:nvPr/>
+        </p:nvSpPr>
+        <p:spPr>
+          <a:xfrm>
+            <a:off x="6660232" y="3284984"/>
+            <a:ext cx="914400" cy="612648"/>
+          </a:xfrm>
+          <a:prstGeom prst="flowChartDecision">
+            <a:avLst/>
+          </a:prstGeom>
+        </p:spPr>
+        <p:style>
+          <a:lnRef idx="2">
+            <a:schemeClr val="accent1">
+              <a:shade val="50000"/>
+            </a:schemeClr>
+          </a:lnRef>
+          <a:fillRef idx="1">
+            <a:schemeClr val="accent1"/>
+          </a:fillRef>
+          <a:effectRef idx="0">
+            <a:schemeClr val="accent1"/>
+          </a:effectRef>
+          <a:fontRef idx="minor">
+            <a:schemeClr val="lt1"/>
+          </a:fontRef>
+        </p:style>
+        <p:txBody>
+          <a:bodyPr rtlCol="0" anchor="ctr"/>
+          <a:lstStyle/>
+          <a:p>
+            <a:pPr algn="ctr"/>
+            <a:endParaRPr lang="en-GB"/>
+          </a:p>
+        </p:txBody>
+      </p:sp>
+      <p:sp>
+        <p:nvSpPr>
+          <p:cNvPr id="16" name="Flussdiagramm: Verzweigung 15"/>
+          <p:cNvSpPr/>
+          <p:nvPr/>
+        </p:nvSpPr>
+        <p:spPr>
+          <a:xfrm>
+            <a:off x="4211960" y="3861048"/>
+            <a:ext cx="914400" cy="612648"/>
+          </a:xfrm>
+          <a:prstGeom prst="flowChartDecision">
+            <a:avLst/>
+          </a:prstGeom>
+        </p:spPr>
+        <p:style>
+          <a:lnRef idx="2">
+            <a:schemeClr val="accent1">
+              <a:shade val="50000"/>
+            </a:schemeClr>
+          </a:lnRef>
+          <a:fillRef idx="1">
+            <a:schemeClr val="accent1"/>
+          </a:fillRef>
+          <a:effectRef idx="0">
+            <a:schemeClr val="accent1"/>
+          </a:effectRef>
+          <a:fontRef idx="minor">
+            <a:schemeClr val="lt1"/>
+          </a:fontRef>
+        </p:style>
+        <p:txBody>
+          <a:bodyPr rtlCol="0" anchor="ctr"/>
+          <a:lstStyle/>
+          <a:p>
+            <a:pPr algn="ctr"/>
+            <a:endParaRPr lang="en-GB"/>
+          </a:p>
+        </p:txBody>
+      </p:sp>
+      <p:sp>
+        <p:nvSpPr>
+          <p:cNvPr id="17" name="Flussdiagramm: Alternativer Prozess 16"/>
+          <p:cNvSpPr/>
+          <p:nvPr/>
+        </p:nvSpPr>
+        <p:spPr>
+          <a:xfrm>
+            <a:off x="5436096" y="3284984"/>
+            <a:ext cx="914400" cy="612648"/>
+          </a:xfrm>
+          <a:prstGeom prst="flowChartAlternateProcess">
+            <a:avLst/>
+          </a:prstGeom>
+        </p:spPr>
+        <p:style>
+          <a:lnRef idx="2">
+            <a:schemeClr val="accent1">
+              <a:shade val="50000"/>
+            </a:schemeClr>
+          </a:lnRef>
+          <a:fillRef idx="1">
+            <a:schemeClr val="accent1"/>
+          </a:fillRef>
+          <a:effectRef idx="0">
+            <a:schemeClr val="accent1"/>
+          </a:effectRef>
+          <a:fontRef idx="minor">
+            <a:schemeClr val="lt1"/>
+          </a:fontRef>
+        </p:style>
+        <p:txBody>
+          <a:bodyPr rtlCol="0" anchor="ctr"/>
+          <a:lstStyle/>
+          <a:p>
+            <a:pPr algn="ctr"/>
+            <a:r>
+              <a:rPr lang="en-GB" sz="1000" dirty="0" smtClean="0"/>
+              <a:t>Choose random action</a:t>
+            </a:r>
+            <a:endParaRPr lang="en-GB" sz="1000" dirty="0"/>
+          </a:p>
+        </p:txBody>
+      </p:sp>
+      <p:sp>
+        <p:nvSpPr>
+          <p:cNvPr id="18" name="Flussdiagramm: Alternativer Prozess 17"/>
+          <p:cNvSpPr/>
+          <p:nvPr/>
+        </p:nvSpPr>
+        <p:spPr>
+          <a:xfrm>
+            <a:off x="5436096" y="4365104"/>
+            <a:ext cx="914400" cy="612648"/>
+          </a:xfrm>
+          <a:prstGeom prst="flowChartAlternateProcess">
+            <a:avLst/>
+          </a:prstGeom>
+        </p:spPr>
+        <p:style>
+          <a:lnRef idx="2">
+            <a:schemeClr val="accent1">
+              <a:shade val="50000"/>
+            </a:schemeClr>
+          </a:lnRef>
+          <a:fillRef idx="1">
+            <a:schemeClr val="accent1"/>
+          </a:fillRef>
+          <a:effectRef idx="0">
+            <a:schemeClr val="accent1"/>
+          </a:effectRef>
+          <a:fontRef idx="minor">
+            <a:schemeClr val="lt1"/>
+          </a:fontRef>
+        </p:style>
+        <p:txBody>
+          <a:bodyPr rtlCol="0" anchor="ctr"/>
+          <a:lstStyle/>
+          <a:p>
+            <a:pPr algn="ctr"/>
+            <a:r>
+              <a:rPr lang="en-GB" sz="1000" dirty="0" smtClean="0"/>
+              <a:t>Choose best action</a:t>
+            </a:r>
+            <a:endParaRPr lang="en-GB" sz="1000" dirty="0"/>
+          </a:p>
+        </p:txBody>
+      </p:sp>
+      <p:sp>
+        <p:nvSpPr>
+          <p:cNvPr id="19" name="Flussdiagramm: Alternativer Prozess 18"/>
+          <p:cNvSpPr/>
+          <p:nvPr/>
+        </p:nvSpPr>
+        <p:spPr>
+          <a:xfrm>
+            <a:off x="2627784" y="3861048"/>
+            <a:ext cx="914400" cy="612648"/>
+          </a:xfrm>
+          <a:prstGeom prst="flowChartAlternateProcess">
+            <a:avLst/>
+          </a:prstGeom>
+        </p:spPr>
+        <p:style>
+          <a:lnRef idx="2">
+            <a:schemeClr val="accent1">
+              <a:shade val="50000"/>
+            </a:schemeClr>
+          </a:lnRef>
+          <a:fillRef idx="1">
+            <a:schemeClr val="accent1"/>
+          </a:fillRef>
+          <a:effectRef idx="0">
+            <a:schemeClr val="accent1"/>
+          </a:effectRef>
+          <a:fontRef idx="minor">
+            <a:schemeClr val="lt1"/>
+          </a:fontRef>
+        </p:style>
+        <p:txBody>
+          <a:bodyPr rtlCol="0" anchor="ctr"/>
+          <a:lstStyle/>
+          <a:p>
+            <a:pPr algn="ctr"/>
+            <a:r>
+              <a:rPr lang="en-GB" sz="1000" dirty="0" smtClean="0"/>
+              <a:t>Make movement</a:t>
+            </a:r>
+            <a:endParaRPr lang="en-GB" sz="1000" dirty="0"/>
+          </a:p>
+        </p:txBody>
+      </p:sp>
+      <p:sp>
+        <p:nvSpPr>
+          <p:cNvPr id="20" name="Flussdiagramm: Alternativer Prozess 19"/>
+          <p:cNvSpPr/>
+          <p:nvPr/>
+        </p:nvSpPr>
+        <p:spPr>
+          <a:xfrm>
+            <a:off x="1187624" y="3861048"/>
+            <a:ext cx="914400" cy="612648"/>
+          </a:xfrm>
+          <a:prstGeom prst="flowChartAlternateProcess">
+            <a:avLst/>
+          </a:prstGeom>
+        </p:spPr>
+        <p:style>
+          <a:lnRef idx="2">
+            <a:schemeClr val="accent1">
+              <a:shade val="50000"/>
+            </a:schemeClr>
+          </a:lnRef>
+          <a:fillRef idx="1">
+            <a:schemeClr val="accent1"/>
+          </a:fillRef>
+          <a:effectRef idx="0">
+            <a:schemeClr val="accent1"/>
+          </a:effectRef>
+          <a:fontRef idx="minor">
+            <a:schemeClr val="lt1"/>
+          </a:fontRef>
+        </p:style>
+        <p:txBody>
+          <a:bodyPr rtlCol="0" anchor="ctr"/>
+          <a:lstStyle/>
+          <a:p>
+            <a:pPr algn="ctr"/>
+            <a:r>
+              <a:rPr lang="en-GB" sz="1000" dirty="0" smtClean="0"/>
+              <a:t>Update state based values</a:t>
+            </a:r>
+            <a:endParaRPr lang="en-GB" sz="1000" dirty="0"/>
+          </a:p>
+        </p:txBody>
+      </p:sp>
+      <p:sp>
+        <p:nvSpPr>
+          <p:cNvPr id="21" name="Flussdiagramm: Alternativer Prozess 20"/>
+          <p:cNvSpPr/>
+          <p:nvPr/>
+        </p:nvSpPr>
+        <p:spPr>
+          <a:xfrm>
+            <a:off x="1187624" y="5432648"/>
+            <a:ext cx="914400" cy="612648"/>
+          </a:xfrm>
+          <a:prstGeom prst="flowChartAlternateProcess">
+            <a:avLst/>
+          </a:prstGeom>
+        </p:spPr>
+        <p:style>
+          <a:lnRef idx="2">
+            <a:schemeClr val="accent1">
+              <a:shade val="50000"/>
+            </a:schemeClr>
+          </a:lnRef>
+          <a:fillRef idx="1">
+            <a:schemeClr val="accent1"/>
+          </a:fillRef>
+          <a:effectRef idx="0">
+            <a:schemeClr val="accent1"/>
+          </a:effectRef>
+          <a:fontRef idx="minor">
+            <a:schemeClr val="lt1"/>
+          </a:fontRef>
+        </p:style>
+        <p:txBody>
+          <a:bodyPr rtlCol="0" anchor="ctr"/>
+          <a:lstStyle/>
+          <a:p>
+            <a:pPr algn="ctr"/>
+            <a:r>
+              <a:rPr lang="en-GB" sz="1000" dirty="0" smtClean="0"/>
+              <a:t>Calculate  reward</a:t>
+            </a:r>
+            <a:endParaRPr lang="en-GB" sz="1000" dirty="0"/>
+          </a:p>
+        </p:txBody>
+      </p:sp>
+      <p:sp>
+        <p:nvSpPr>
+          <p:cNvPr id="22" name="Flussdiagramm: Alternativer Prozess 21"/>
+          <p:cNvSpPr/>
+          <p:nvPr/>
+        </p:nvSpPr>
+        <p:spPr>
+          <a:xfrm>
+            <a:off x="2627784" y="5432648"/>
+            <a:ext cx="914400" cy="612648"/>
+          </a:xfrm>
+          <a:prstGeom prst="flowChartAlternateProcess">
+            <a:avLst/>
+          </a:prstGeom>
+        </p:spPr>
+        <p:style>
+          <a:lnRef idx="2">
+            <a:schemeClr val="accent1">
+              <a:shade val="50000"/>
+            </a:schemeClr>
+          </a:lnRef>
+          <a:fillRef idx="1">
+            <a:schemeClr val="accent1"/>
+          </a:fillRef>
+          <a:effectRef idx="0">
+            <a:schemeClr val="accent1"/>
+          </a:effectRef>
+          <a:fontRef idx="minor">
+            <a:schemeClr val="lt1"/>
+          </a:fontRef>
+        </p:style>
+        <p:txBody>
+          <a:bodyPr rtlCol="0" anchor="ctr"/>
+          <a:lstStyle/>
+          <a:p>
+            <a:pPr algn="ctr"/>
+            <a:r>
+              <a:rPr lang="en-GB" sz="1000" dirty="0" smtClean="0"/>
+              <a:t>Update replay memory</a:t>
+            </a:r>
+            <a:endParaRPr lang="en-GB" sz="1000" dirty="0"/>
+          </a:p>
+        </p:txBody>
+      </p:sp>
+      <p:sp>
+        <p:nvSpPr>
+          <p:cNvPr id="23" name="Flussdiagramm: Alternativer Prozess 22"/>
+          <p:cNvSpPr/>
+          <p:nvPr/>
+        </p:nvSpPr>
+        <p:spPr>
+          <a:xfrm>
+            <a:off x="4067944" y="5432648"/>
+            <a:ext cx="914400" cy="612648"/>
+          </a:xfrm>
+          <a:prstGeom prst="flowChartAlternateProcess">
+            <a:avLst/>
+          </a:prstGeom>
+        </p:spPr>
+        <p:style>
+          <a:lnRef idx="2">
+            <a:schemeClr val="accent1">
+              <a:shade val="50000"/>
+            </a:schemeClr>
+          </a:lnRef>
+          <a:fillRef idx="1">
+            <a:schemeClr val="accent1"/>
+          </a:fillRef>
+          <a:effectRef idx="0">
+            <a:schemeClr val="accent1"/>
+          </a:effectRef>
+          <a:fontRef idx="minor">
+            <a:schemeClr val="lt1"/>
+          </a:fontRef>
+        </p:style>
+        <p:txBody>
+          <a:bodyPr rtlCol="0" anchor="ctr"/>
+          <a:lstStyle/>
+          <a:p>
+            <a:pPr algn="ctr"/>
+            <a:r>
+              <a:rPr lang="en-GB" sz="1000" dirty="0" smtClean="0"/>
+              <a:t>Gradient descent</a:t>
+            </a:r>
+            <a:endParaRPr lang="en-GB" sz="1000" dirty="0"/>
+          </a:p>
+        </p:txBody>
+      </p:sp>
+      <p:sp>
+        <p:nvSpPr>
+          <p:cNvPr id="24" name="Flussdiagramm: Alternativer Prozess 23"/>
+          <p:cNvSpPr/>
+          <p:nvPr/>
+        </p:nvSpPr>
+        <p:spPr>
+          <a:xfrm>
+            <a:off x="5436096" y="5432648"/>
+            <a:ext cx="914400" cy="612648"/>
+          </a:xfrm>
+          <a:prstGeom prst="flowChartAlternateProcess">
+            <a:avLst/>
+          </a:prstGeom>
+        </p:spPr>
+        <p:style>
+          <a:lnRef idx="2">
+            <a:schemeClr val="accent1">
+              <a:shade val="50000"/>
+            </a:schemeClr>
+          </a:lnRef>
+          <a:fillRef idx="1">
+            <a:schemeClr val="accent1"/>
+          </a:fillRef>
+          <a:effectRef idx="0">
+            <a:schemeClr val="accent1"/>
+          </a:effectRef>
+          <a:fontRef idx="minor">
+            <a:schemeClr val="lt1"/>
+          </a:fontRef>
+        </p:style>
+        <p:txBody>
+          <a:bodyPr rtlCol="0" anchor="ctr"/>
+          <a:lstStyle/>
+          <a:p>
+            <a:pPr algn="ctr"/>
+            <a:r>
+              <a:rPr lang="en-GB" sz="1000" dirty="0" smtClean="0"/>
+              <a:t>Update state based values</a:t>
+            </a:r>
+            <a:endParaRPr lang="en-GB" sz="1000" dirty="0"/>
+          </a:p>
+        </p:txBody>
+      </p:sp>
+      <p:sp>
+        <p:nvSpPr>
+          <p:cNvPr id="25" name="Flussdiagramm: Verzweigung 24"/>
+          <p:cNvSpPr/>
+          <p:nvPr/>
+        </p:nvSpPr>
+        <p:spPr>
+          <a:xfrm>
+            <a:off x="7380312" y="5432648"/>
+            <a:ext cx="914400" cy="612648"/>
+          </a:xfrm>
+          <a:prstGeom prst="flowChartDecision">
+            <a:avLst/>
+          </a:prstGeom>
+        </p:spPr>
+        <p:style>
+          <a:lnRef idx="2">
+            <a:schemeClr val="accent1">
+              <a:shade val="50000"/>
+            </a:schemeClr>
+          </a:lnRef>
+          <a:fillRef idx="1">
+            <a:schemeClr val="accent1"/>
+          </a:fillRef>
+          <a:effectRef idx="0">
+            <a:schemeClr val="accent1"/>
+          </a:effectRef>
+          <a:fontRef idx="minor">
+            <a:schemeClr val="lt1"/>
+          </a:fontRef>
+        </p:style>
+        <p:txBody>
+          <a:bodyPr rtlCol="0" anchor="ctr"/>
+          <a:lstStyle/>
+          <a:p>
+            <a:pPr algn="ctr"/>
+            <a:endParaRPr lang="en-GB"/>
+          </a:p>
+        </p:txBody>
+      </p:sp>
+      <p:cxnSp>
+        <p:nvCxnSpPr>
+          <p:cNvPr id="27" name="Gerade Verbindung mit Pfeil 26"/>
+          <p:cNvCxnSpPr>
+            <a:stCxn id="10" idx="6"/>
+            <a:endCxn id="9" idx="1"/>
+          </p:cNvCxnSpPr>
+          <p:nvPr/>
+        </p:nvCxnSpPr>
+        <p:spPr>
+          <a:xfrm>
+            <a:off x="564704" y="2505472"/>
+            <a:ext cx="622920" cy="5716"/>
+          </a:xfrm>
+          <a:prstGeom prst="straightConnector1">
+            <a:avLst/>
+          </a:prstGeom>
+          <a:ln>
+            <a:tailEnd type="arrow"/>
+          </a:ln>
+        </p:spPr>
+        <p:style>
+          <a:lnRef idx="1">
+            <a:schemeClr val="accent1"/>
+          </a:lnRef>
+          <a:fillRef idx="0">
+            <a:schemeClr val="accent1"/>
+          </a:fillRef>
+          <a:effectRef idx="0">
+            <a:schemeClr val="accent1"/>
+          </a:effectRef>
+          <a:fontRef idx="minor">
+            <a:schemeClr val="tx1"/>
+          </a:fontRef>
+        </p:style>
+      </p:cxnSp>
+      <p:cxnSp>
+        <p:nvCxnSpPr>
+          <p:cNvPr id="29" name="Gerade Verbindung mit Pfeil 28"/>
+          <p:cNvCxnSpPr>
+            <a:stCxn id="9" idx="3"/>
+            <a:endCxn id="11" idx="1"/>
+          </p:cNvCxnSpPr>
+          <p:nvPr/>
+        </p:nvCxnSpPr>
+        <p:spPr>
+          <a:xfrm>
+            <a:off x="2102024" y="2511188"/>
+            <a:ext cx="525760" cy="0"/>
+          </a:xfrm>
+          <a:prstGeom prst="straightConnector1">
+            <a:avLst/>
+          </a:prstGeom>
+          <a:ln>
+            <a:tailEnd type="arrow"/>
+          </a:ln>
+        </p:spPr>
+        <p:style>
+          <a:lnRef idx="1">
+            <a:schemeClr val="accent1"/>
+          </a:lnRef>
+          <a:fillRef idx="0">
+            <a:schemeClr val="accent1"/>
+          </a:fillRef>
+          <a:effectRef idx="0">
+            <a:schemeClr val="accent1"/>
+          </a:effectRef>
+          <a:fontRef idx="minor">
+            <a:schemeClr val="tx1"/>
+          </a:fontRef>
+        </p:style>
+      </p:cxnSp>
+      <p:cxnSp>
+        <p:nvCxnSpPr>
+          <p:cNvPr id="31" name="Gerade Verbindung mit Pfeil 30"/>
+          <p:cNvCxnSpPr>
+            <a:stCxn id="11" idx="3"/>
+            <a:endCxn id="12" idx="1"/>
+          </p:cNvCxnSpPr>
+          <p:nvPr/>
+        </p:nvCxnSpPr>
+        <p:spPr>
+          <a:xfrm>
+            <a:off x="3542184" y="2511188"/>
+            <a:ext cx="525760" cy="0"/>
+          </a:xfrm>
+          <a:prstGeom prst="straightConnector1">
+            <a:avLst/>
+          </a:prstGeom>
+          <a:ln>
+            <a:tailEnd type="arrow"/>
+          </a:ln>
+        </p:spPr>
+        <p:style>
+          <a:lnRef idx="1">
+            <a:schemeClr val="accent1"/>
+          </a:lnRef>
+          <a:fillRef idx="0">
+            <a:schemeClr val="accent1"/>
+          </a:fillRef>
+          <a:effectRef idx="0">
+            <a:schemeClr val="accent1"/>
+          </a:effectRef>
+          <a:fontRef idx="minor">
+            <a:schemeClr val="tx1"/>
+          </a:fontRef>
+        </p:style>
+      </p:cxnSp>
+      <p:cxnSp>
+        <p:nvCxnSpPr>
+          <p:cNvPr id="33" name="Gerade Verbindung mit Pfeil 32"/>
+          <p:cNvCxnSpPr>
+            <a:stCxn id="12" idx="3"/>
+            <a:endCxn id="13" idx="1"/>
+          </p:cNvCxnSpPr>
+          <p:nvPr/>
+        </p:nvCxnSpPr>
+        <p:spPr>
+          <a:xfrm>
+            <a:off x="4982344" y="2511188"/>
+            <a:ext cx="475456" cy="0"/>
+          </a:xfrm>
+          <a:prstGeom prst="straightConnector1">
+            <a:avLst/>
+          </a:prstGeom>
+          <a:ln>
+            <a:tailEnd type="arrow"/>
+          </a:ln>
+        </p:spPr>
+        <p:style>
+          <a:lnRef idx="1">
+            <a:schemeClr val="accent1"/>
+          </a:lnRef>
+          <a:fillRef idx="0">
+            <a:schemeClr val="accent1"/>
+          </a:fillRef>
+          <a:effectRef idx="0">
+            <a:schemeClr val="accent1"/>
+          </a:effectRef>
+          <a:fontRef idx="minor">
+            <a:schemeClr val="tx1"/>
+          </a:fontRef>
+        </p:style>
+      </p:cxnSp>
+      <p:cxnSp>
+        <p:nvCxnSpPr>
+          <p:cNvPr id="35" name="Gerade Verbindung mit Pfeil 34"/>
+          <p:cNvCxnSpPr>
+            <a:stCxn id="13" idx="3"/>
+            <a:endCxn id="8" idx="1"/>
+          </p:cNvCxnSpPr>
+          <p:nvPr/>
+        </p:nvCxnSpPr>
+        <p:spPr>
+          <a:xfrm>
+            <a:off x="6372200" y="2511188"/>
+            <a:ext cx="288032" cy="0"/>
+          </a:xfrm>
+          <a:prstGeom prst="straightConnector1">
+            <a:avLst/>
+          </a:prstGeom>
+          <a:ln>
+            <a:tailEnd type="arrow"/>
+          </a:ln>
+        </p:spPr>
+        <p:style>
+          <a:lnRef idx="1">
+            <a:schemeClr val="accent1"/>
+          </a:lnRef>
+          <a:fillRef idx="0">
+            <a:schemeClr val="accent1"/>
+          </a:fillRef>
+          <a:effectRef idx="0">
+            <a:schemeClr val="accent1"/>
+          </a:effectRef>
+          <a:fontRef idx="minor">
+            <a:schemeClr val="tx1"/>
+          </a:fontRef>
+        </p:style>
+      </p:cxnSp>
+      <p:cxnSp>
+        <p:nvCxnSpPr>
+          <p:cNvPr id="41" name="Gerade Verbindung mit Pfeil 40"/>
+          <p:cNvCxnSpPr>
+            <a:stCxn id="8" idx="2"/>
+            <a:endCxn id="15" idx="0"/>
+          </p:cNvCxnSpPr>
+          <p:nvPr/>
+        </p:nvCxnSpPr>
+        <p:spPr>
+          <a:xfrm>
+            <a:off x="7117432" y="2817512"/>
+            <a:ext cx="0" cy="467472"/>
+          </a:xfrm>
+          <a:prstGeom prst="straightConnector1">
+            <a:avLst/>
+          </a:prstGeom>
+          <a:ln>
+            <a:tailEnd type="arrow"/>
+          </a:ln>
+        </p:spPr>
+        <p:style>
+          <a:lnRef idx="1">
+            <a:schemeClr val="accent1"/>
+          </a:lnRef>
+          <a:fillRef idx="0">
+            <a:schemeClr val="accent1"/>
+          </a:fillRef>
+          <a:effectRef idx="0">
+            <a:schemeClr val="accent1"/>
+          </a:effectRef>
+          <a:fontRef idx="minor">
+            <a:schemeClr val="tx1"/>
+          </a:fontRef>
+        </p:style>
+      </p:cxnSp>
+      <p:cxnSp>
+        <p:nvCxnSpPr>
+          <p:cNvPr id="51" name="Gerade Verbindung mit Pfeil 50"/>
+          <p:cNvCxnSpPr>
+            <a:stCxn id="16" idx="1"/>
+            <a:endCxn id="19" idx="3"/>
+          </p:cNvCxnSpPr>
+          <p:nvPr/>
+        </p:nvCxnSpPr>
+        <p:spPr>
+          <a:xfrm flipH="1">
+            <a:off x="3542184" y="4167372"/>
+            <a:ext cx="669776" cy="0"/>
+          </a:xfrm>
+          <a:prstGeom prst="straightConnector1">
+            <a:avLst/>
+          </a:prstGeom>
+          <a:ln>
+            <a:tailEnd type="arrow"/>
+          </a:ln>
+        </p:spPr>
+        <p:style>
+          <a:lnRef idx="1">
+            <a:schemeClr val="accent1"/>
+          </a:lnRef>
+          <a:fillRef idx="0">
+            <a:schemeClr val="accent1"/>
+          </a:fillRef>
+          <a:effectRef idx="0">
+            <a:schemeClr val="accent1"/>
+          </a:effectRef>
+          <a:fontRef idx="minor">
+            <a:schemeClr val="tx1"/>
+          </a:fontRef>
+        </p:style>
+      </p:cxnSp>
+      <p:cxnSp>
+        <p:nvCxnSpPr>
+          <p:cNvPr id="53" name="Gerade Verbindung mit Pfeil 52"/>
+          <p:cNvCxnSpPr>
+            <a:stCxn id="19" idx="1"/>
+            <a:endCxn id="20" idx="3"/>
+          </p:cNvCxnSpPr>
+          <p:nvPr/>
+        </p:nvCxnSpPr>
+        <p:spPr>
+          <a:xfrm flipH="1">
+            <a:off x="2102024" y="4167372"/>
+            <a:ext cx="525760" cy="0"/>
+          </a:xfrm>
+          <a:prstGeom prst="straightConnector1">
+            <a:avLst/>
+          </a:prstGeom>
+          <a:ln>
+            <a:tailEnd type="arrow"/>
+          </a:ln>
+        </p:spPr>
+        <p:style>
+          <a:lnRef idx="1">
+            <a:schemeClr val="accent1"/>
+          </a:lnRef>
+          <a:fillRef idx="0">
+            <a:schemeClr val="accent1"/>
+          </a:fillRef>
+          <a:effectRef idx="0">
+            <a:schemeClr val="accent1"/>
+          </a:effectRef>
+          <a:fontRef idx="minor">
+            <a:schemeClr val="tx1"/>
+          </a:fontRef>
+        </p:style>
+      </p:cxnSp>
+      <p:cxnSp>
+        <p:nvCxnSpPr>
+          <p:cNvPr id="55" name="Gerade Verbindung mit Pfeil 54"/>
+          <p:cNvCxnSpPr>
+            <a:stCxn id="20" idx="2"/>
+            <a:endCxn id="21" idx="0"/>
+          </p:cNvCxnSpPr>
+          <p:nvPr/>
+        </p:nvCxnSpPr>
+        <p:spPr>
+          <a:xfrm>
+            <a:off x="1644824" y="4473696"/>
+            <a:ext cx="0" cy="958952"/>
+          </a:xfrm>
+          <a:prstGeom prst="straightConnector1">
+            <a:avLst/>
+          </a:prstGeom>
+          <a:ln>
+            <a:tailEnd type="arrow"/>
+          </a:ln>
+        </p:spPr>
+        <p:style>
+          <a:lnRef idx="1">
+            <a:schemeClr val="accent1"/>
+          </a:lnRef>
+          <a:fillRef idx="0">
+            <a:schemeClr val="accent1"/>
+          </a:fillRef>
+          <a:effectRef idx="0">
+            <a:schemeClr val="accent1"/>
+          </a:effectRef>
+          <a:fontRef idx="minor">
+            <a:schemeClr val="tx1"/>
+          </a:fontRef>
+        </p:style>
+      </p:cxnSp>
+      <p:cxnSp>
+        <p:nvCxnSpPr>
+          <p:cNvPr id="57" name="Gerade Verbindung mit Pfeil 56"/>
+          <p:cNvCxnSpPr>
+            <a:stCxn id="21" idx="3"/>
+            <a:endCxn id="22" idx="1"/>
+          </p:cNvCxnSpPr>
+          <p:nvPr/>
+        </p:nvCxnSpPr>
+        <p:spPr>
+          <a:xfrm>
+            <a:off x="2102024" y="5738972"/>
+            <a:ext cx="525760" cy="0"/>
+          </a:xfrm>
+          <a:prstGeom prst="straightConnector1">
+            <a:avLst/>
+          </a:prstGeom>
+          <a:ln>
+            <a:tailEnd type="arrow"/>
+          </a:ln>
+        </p:spPr>
+        <p:style>
+          <a:lnRef idx="1">
+            <a:schemeClr val="accent1"/>
+          </a:lnRef>
+          <a:fillRef idx="0">
+            <a:schemeClr val="accent1"/>
+          </a:fillRef>
+          <a:effectRef idx="0">
+            <a:schemeClr val="accent1"/>
+          </a:effectRef>
+          <a:fontRef idx="minor">
+            <a:schemeClr val="tx1"/>
+          </a:fontRef>
+        </p:style>
+      </p:cxnSp>
+      <p:cxnSp>
+        <p:nvCxnSpPr>
+          <p:cNvPr id="59" name="Gerade Verbindung mit Pfeil 58"/>
+          <p:cNvCxnSpPr>
+            <a:stCxn id="22" idx="3"/>
+            <a:endCxn id="23" idx="1"/>
+          </p:cNvCxnSpPr>
+          <p:nvPr/>
+        </p:nvCxnSpPr>
+        <p:spPr>
+          <a:xfrm>
+            <a:off x="3542184" y="5738972"/>
+            <a:ext cx="525760" cy="0"/>
+          </a:xfrm>
+          <a:prstGeom prst="straightConnector1">
+            <a:avLst/>
+          </a:prstGeom>
+          <a:ln>
+            <a:tailEnd type="arrow"/>
+          </a:ln>
+        </p:spPr>
+        <p:style>
+          <a:lnRef idx="1">
+            <a:schemeClr val="accent1"/>
+          </a:lnRef>
+          <a:fillRef idx="0">
+            <a:schemeClr val="accent1"/>
+          </a:fillRef>
+          <a:effectRef idx="0">
+            <a:schemeClr val="accent1"/>
+          </a:effectRef>
+          <a:fontRef idx="minor">
+            <a:schemeClr val="tx1"/>
+          </a:fontRef>
+        </p:style>
+      </p:cxnSp>
+      <p:cxnSp>
+        <p:nvCxnSpPr>
+          <p:cNvPr id="63" name="Gerade Verbindung mit Pfeil 62"/>
+          <p:cNvCxnSpPr>
+            <a:stCxn id="23" idx="3"/>
+            <a:endCxn id="24" idx="1"/>
+          </p:cNvCxnSpPr>
+          <p:nvPr/>
+        </p:nvCxnSpPr>
+        <p:spPr>
+          <a:xfrm>
+            <a:off x="4982344" y="5738972"/>
+            <a:ext cx="453752" cy="0"/>
+          </a:xfrm>
+          <a:prstGeom prst="straightConnector1">
+            <a:avLst/>
+          </a:prstGeom>
+          <a:ln>
+            <a:tailEnd type="arrow"/>
+          </a:ln>
+        </p:spPr>
+        <p:style>
+          <a:lnRef idx="1">
+            <a:schemeClr val="accent1"/>
+          </a:lnRef>
+          <a:fillRef idx="0">
+            <a:schemeClr val="accent1"/>
+          </a:fillRef>
+          <a:effectRef idx="0">
+            <a:schemeClr val="accent1"/>
+          </a:effectRef>
+          <a:fontRef idx="minor">
+            <a:schemeClr val="tx1"/>
+          </a:fontRef>
+        </p:style>
+      </p:cxnSp>
+      <p:cxnSp>
+        <p:nvCxnSpPr>
+          <p:cNvPr id="65" name="Gerade Verbindung mit Pfeil 64"/>
+          <p:cNvCxnSpPr>
+            <a:stCxn id="24" idx="3"/>
+            <a:endCxn id="25" idx="1"/>
+          </p:cNvCxnSpPr>
+          <p:nvPr/>
+        </p:nvCxnSpPr>
+        <p:spPr>
+          <a:xfrm>
+            <a:off x="6350496" y="5738972"/>
+            <a:ext cx="1029816" cy="0"/>
+          </a:xfrm>
+          <a:prstGeom prst="straightConnector1">
+            <a:avLst/>
+          </a:prstGeom>
+          <a:ln>
+            <a:tailEnd type="arrow"/>
+          </a:ln>
+        </p:spPr>
+        <p:style>
+          <a:lnRef idx="1">
+            <a:schemeClr val="accent1"/>
+          </a:lnRef>
+          <a:fillRef idx="0">
+            <a:schemeClr val="accent1"/>
+          </a:fillRef>
+          <a:effectRef idx="0">
+            <a:schemeClr val="accent1"/>
+          </a:effectRef>
+          <a:fontRef idx="minor">
+            <a:schemeClr val="tx1"/>
+          </a:fontRef>
+        </p:style>
+      </p:cxnSp>
+      <p:cxnSp>
+        <p:nvCxnSpPr>
+          <p:cNvPr id="73" name="Gerade Verbindung mit Pfeil 72"/>
+          <p:cNvCxnSpPr>
+            <a:stCxn id="25" idx="3"/>
+            <a:endCxn id="7" idx="2"/>
+          </p:cNvCxnSpPr>
+          <p:nvPr/>
+        </p:nvCxnSpPr>
+        <p:spPr>
+          <a:xfrm flipV="1">
+            <a:off x="8294712" y="5731532"/>
+            <a:ext cx="187424" cy="7440"/>
+          </a:xfrm>
+          <a:prstGeom prst="straightConnector1">
+            <a:avLst/>
+          </a:prstGeom>
+          <a:ln>
+            <a:tailEnd type="arrow"/>
+          </a:ln>
+        </p:spPr>
+        <p:style>
+          <a:lnRef idx="1">
+            <a:schemeClr val="accent1"/>
+          </a:lnRef>
+          <a:fillRef idx="0">
+            <a:schemeClr val="accent1"/>
+          </a:fillRef>
+          <a:effectRef idx="0">
+            <a:schemeClr val="accent1"/>
+          </a:effectRef>
+          <a:fontRef idx="minor">
+            <a:schemeClr val="tx1"/>
+          </a:fontRef>
+        </p:style>
+      </p:cxnSp>
+      <p:cxnSp>
+        <p:nvCxnSpPr>
+          <p:cNvPr id="75" name="Gewinkelte Verbindung 74"/>
+          <p:cNvCxnSpPr>
+            <a:stCxn id="8" idx="0"/>
+            <a:endCxn id="14" idx="0"/>
+          </p:cNvCxnSpPr>
+          <p:nvPr/>
+        </p:nvCxnSpPr>
+        <p:spPr>
+          <a:xfrm rot="5400000" flipH="1" flipV="1">
+            <a:off x="7776356" y="1545940"/>
+            <a:ext cx="12700" cy="1317848"/>
+          </a:xfrm>
+          <a:prstGeom prst="bentConnector3">
+            <a:avLst>
+              <a:gd name="adj1" fmla="val 1800000"/>
+            </a:avLst>
+          </a:prstGeom>
+          <a:ln>
+            <a:tailEnd type="arrow"/>
+          </a:ln>
+        </p:spPr>
+        <p:style>
+          <a:lnRef idx="1">
+            <a:schemeClr val="accent1"/>
+          </a:lnRef>
+          <a:fillRef idx="0">
+            <a:schemeClr val="accent1"/>
+          </a:fillRef>
+          <a:effectRef idx="0">
+            <a:schemeClr val="accent1"/>
+          </a:effectRef>
+          <a:fontRef idx="minor">
+            <a:schemeClr val="tx1"/>
+          </a:fontRef>
+        </p:style>
+      </p:cxnSp>
+      <p:cxnSp>
+        <p:nvCxnSpPr>
+          <p:cNvPr id="78" name="Gerade Verbindung mit Pfeil 77"/>
+          <p:cNvCxnSpPr>
+            <a:stCxn id="15" idx="1"/>
+            <a:endCxn id="17" idx="3"/>
+          </p:cNvCxnSpPr>
+          <p:nvPr/>
+        </p:nvCxnSpPr>
+        <p:spPr>
+          <a:xfrm flipH="1">
+            <a:off x="6350496" y="3591308"/>
+            <a:ext cx="309736" cy="0"/>
+          </a:xfrm>
+          <a:prstGeom prst="straightConnector1">
+            <a:avLst/>
+          </a:prstGeom>
+          <a:ln>
+            <a:tailEnd type="arrow"/>
+          </a:ln>
+        </p:spPr>
+        <p:style>
+          <a:lnRef idx="1">
+            <a:schemeClr val="accent1"/>
+          </a:lnRef>
+          <a:fillRef idx="0">
+            <a:schemeClr val="accent1"/>
+          </a:fillRef>
+          <a:effectRef idx="0">
+            <a:schemeClr val="accent1"/>
+          </a:effectRef>
+          <a:fontRef idx="minor">
+            <a:schemeClr val="tx1"/>
+          </a:fontRef>
+        </p:style>
+      </p:cxnSp>
+      <p:cxnSp>
+        <p:nvCxnSpPr>
+          <p:cNvPr id="80" name="Gewinkelte Verbindung 79"/>
+          <p:cNvCxnSpPr>
+            <a:stCxn id="15" idx="2"/>
+            <a:endCxn id="18" idx="3"/>
+          </p:cNvCxnSpPr>
+          <p:nvPr/>
+        </p:nvCxnSpPr>
+        <p:spPr>
+          <a:xfrm rot="5400000">
+            <a:off x="6347066" y="3901062"/>
+            <a:ext cx="773796" cy="766936"/>
+          </a:xfrm>
+          <a:prstGeom prst="bentConnector2">
+            <a:avLst/>
+          </a:prstGeom>
+          <a:ln>
+            <a:tailEnd type="arrow"/>
+          </a:ln>
+        </p:spPr>
+        <p:style>
+          <a:lnRef idx="1">
+            <a:schemeClr val="accent1"/>
+          </a:lnRef>
+          <a:fillRef idx="0">
+            <a:schemeClr val="accent1"/>
+          </a:fillRef>
+          <a:effectRef idx="0">
+            <a:schemeClr val="accent1"/>
+          </a:effectRef>
+          <a:fontRef idx="minor">
+            <a:schemeClr val="tx1"/>
+          </a:fontRef>
+        </p:style>
+      </p:cxnSp>
+      <p:cxnSp>
+        <p:nvCxnSpPr>
+          <p:cNvPr id="83" name="Form 82"/>
+          <p:cNvCxnSpPr>
+            <a:stCxn id="14" idx="2"/>
+            <a:endCxn id="15" idx="3"/>
+          </p:cNvCxnSpPr>
+          <p:nvPr/>
+        </p:nvCxnSpPr>
+        <p:spPr>
+          <a:xfrm rot="5400000">
+            <a:off x="7618058" y="2774086"/>
+            <a:ext cx="773796" cy="860648"/>
+          </a:xfrm>
+          <a:prstGeom prst="bentConnector2">
+            <a:avLst/>
+          </a:prstGeom>
+          <a:ln>
+            <a:tailEnd type="arrow"/>
+          </a:ln>
+        </p:spPr>
+        <p:style>
+          <a:lnRef idx="1">
+            <a:schemeClr val="accent1"/>
+          </a:lnRef>
+          <a:fillRef idx="0">
+            <a:schemeClr val="accent1"/>
+          </a:fillRef>
+          <a:effectRef idx="0">
+            <a:schemeClr val="accent1"/>
+          </a:effectRef>
+          <a:fontRef idx="minor">
+            <a:schemeClr val="tx1"/>
+          </a:fontRef>
+        </p:style>
+      </p:cxnSp>
+      <p:cxnSp>
+        <p:nvCxnSpPr>
+          <p:cNvPr id="87" name="Form 86"/>
+          <p:cNvCxnSpPr>
+            <a:stCxn id="17" idx="1"/>
+            <a:endCxn id="16" idx="0"/>
+          </p:cNvCxnSpPr>
+          <p:nvPr/>
+        </p:nvCxnSpPr>
+        <p:spPr>
+          <a:xfrm rot="10800000" flipV="1">
+            <a:off x="4669160" y="3591308"/>
+            <a:ext cx="766936" cy="269740"/>
+          </a:xfrm>
+          <a:prstGeom prst="bentConnector2">
+            <a:avLst/>
+          </a:prstGeom>
+          <a:ln>
+            <a:tailEnd type="arrow"/>
+          </a:ln>
+        </p:spPr>
+        <p:style>
+          <a:lnRef idx="1">
+            <a:schemeClr val="accent1"/>
+          </a:lnRef>
+          <a:fillRef idx="0">
+            <a:schemeClr val="accent1"/>
+          </a:fillRef>
+          <a:effectRef idx="0">
+            <a:schemeClr val="accent1"/>
+          </a:effectRef>
+          <a:fontRef idx="minor">
+            <a:schemeClr val="tx1"/>
+          </a:fontRef>
+        </p:style>
+      </p:cxnSp>
+      <p:cxnSp>
+        <p:nvCxnSpPr>
+          <p:cNvPr id="89" name="Form 88"/>
+          <p:cNvCxnSpPr>
+            <a:stCxn id="18" idx="1"/>
+            <a:endCxn id="16" idx="2"/>
+          </p:cNvCxnSpPr>
+          <p:nvPr/>
+        </p:nvCxnSpPr>
+        <p:spPr>
+          <a:xfrm rot="10800000">
+            <a:off x="4669160" y="4473696"/>
+            <a:ext cx="766936" cy="197732"/>
+          </a:xfrm>
+          <a:prstGeom prst="bentConnector2">
+            <a:avLst/>
+          </a:prstGeom>
+          <a:ln>
+            <a:tailEnd type="arrow"/>
+          </a:ln>
+        </p:spPr>
+        <p:style>
+          <a:lnRef idx="1">
+            <a:schemeClr val="accent1"/>
+          </a:lnRef>
+          <a:fillRef idx="0">
+            <a:schemeClr val="accent1"/>
+          </a:fillRef>
+          <a:effectRef idx="0">
+            <a:schemeClr val="accent1"/>
+          </a:effectRef>
+          <a:fontRef idx="minor">
+            <a:schemeClr val="tx1"/>
+          </a:fontRef>
+        </p:style>
+      </p:cxnSp>
+      <p:cxnSp>
+        <p:nvCxnSpPr>
+          <p:cNvPr id="91" name="Form 90"/>
+          <p:cNvCxnSpPr>
+            <a:stCxn id="25" idx="0"/>
+            <a:endCxn id="8" idx="3"/>
+          </p:cNvCxnSpPr>
+          <p:nvPr/>
+        </p:nvCxnSpPr>
+        <p:spPr>
+          <a:xfrm rot="16200000" flipV="1">
+            <a:off x="6245342" y="3840478"/>
+            <a:ext cx="2921460" cy="262880"/>
+          </a:xfrm>
+          <a:prstGeom prst="bentConnector2">
+            <a:avLst/>
+          </a:prstGeom>
+          <a:ln>
+            <a:tailEnd type="arrow"/>
+          </a:ln>
+        </p:spPr>
+        <p:style>
+          <a:lnRef idx="1">
+            <a:schemeClr val="accent1"/>
+          </a:lnRef>
+          <a:fillRef idx="0">
+            <a:schemeClr val="accent1"/>
+          </a:fillRef>
+          <a:effectRef idx="0">
+            <a:schemeClr val="accent1"/>
+          </a:effectRef>
+          <a:fontRef idx="minor">
+            <a:schemeClr val="tx1"/>
+          </a:fontRef>
+        </p:style>
+      </p:cxnSp>
+      <p:sp>
+        <p:nvSpPr>
+          <p:cNvPr id="92" name="Textfeld 91"/>
+          <p:cNvSpPr txBox="1"/>
+          <p:nvPr/>
+        </p:nvSpPr>
+        <p:spPr>
+          <a:xfrm>
+            <a:off x="35496" y="1556792"/>
+            <a:ext cx="2505814" cy="369332"/>
+          </a:xfrm>
+          <a:prstGeom prst="rect">
+            <a:avLst/>
+          </a:prstGeom>
+          <a:noFill/>
+        </p:spPr>
+        <p:txBody>
+          <a:bodyPr wrap="none" rtlCol="0">
+            <a:spAutoFit/>
+          </a:bodyPr>
+          <a:lstStyle/>
+          <a:p>
+            <a:r>
+              <a:rPr lang="en-GB" dirty="0" smtClean="0"/>
+              <a:t>Agent training method:</a:t>
+            </a:r>
+            <a:endParaRPr lang="en-GB" dirty="0"/>
+          </a:p>
+        </p:txBody>
+      </p:sp>
+    </p:spTree>
+    <p:extLst>
+      <p:ext uri="{BB962C8B-B14F-4D97-AF65-F5344CB8AC3E}">
+        <p14:creationId xmlns="" xmlns:p14="http://schemas.microsoft.com/office/powerpoint/2010/main" val="3506178436"/>
+      </p:ext>
+    </p:extLst>
+  </p:cSld>
+  <p:clrMapOvr>
+    <a:masterClrMapping/>
+  </p:clrMapOvr>
+  <p:timing>
+    <p:tnLst>
+      <p:par>
+        <p:cTn id="1" dur="indefinite" restart="never" nodeType="tmRoot">
+          <p:childTnLst>
+            <p:seq>
+              <p:cTn id="2" nodeType="mainSeq">
+                <p:childTnLst>
+                  <p:par>
+                    <p:cTn id="3" fill="hold">
+                      <p:stCondLst>
+                        <p:cond delay="indefinite"/>
+                      </p:stCondLst>
+                      <p:childTnLst>
+                        <p:par>
+                          <p:cTn id="4" fill="hold">
+                            <p:stCondLst>
+                              <p:cond delay="0"/>
+                            </p:stCondLst>
+                            <p:childTnLst>
+                              <p:par>
+                                <p:cTn id="5" presetID="6" presetClass="emph" presetSubtype="0" fill="hold" grpId="0" nodeType="clickEffect">
+                                  <p:stCondLst>
+                                    <p:cond delay="0"/>
+                                  </p:stCondLst>
+                                  <p:childTnLst>
+                                    <p:animScale>
+                                      <p:cBhvr>
+                                        <p:cTn id="6" dur="2000" fill="hold"/>
+                                        <p:tgtEl>
+                                          <p:spTgt spid="9"/>
+                                        </p:tgtEl>
+                                      </p:cBhvr>
+                                      <p:by x="150000" y="150000"/>
+                                    </p:animScale>
+                                  </p:childTnLst>
+                                </p:cTn>
+                              </p:par>
+                            </p:childTnLst>
+                          </p:cTn>
+                        </p:par>
+                      </p:childTnLst>
+                    </p:cTn>
+                  </p:par>
+                  <p:par>
+                    <p:cTn id="7" fill="hold">
+                      <p:stCondLst>
+                        <p:cond delay="indefinite"/>
+                      </p:stCondLst>
+                      <p:childTnLst>
+                        <p:par>
+                          <p:cTn id="8" fill="hold">
+                            <p:stCondLst>
+                              <p:cond delay="0"/>
+                            </p:stCondLst>
+                            <p:childTnLst>
+                              <p:par>
+                                <p:cTn id="9" presetID="6" presetClass="emph" presetSubtype="0" fill="hold" grpId="0" nodeType="clickEffect">
+                                  <p:stCondLst>
+                                    <p:cond delay="0"/>
+                                  </p:stCondLst>
+                                  <p:childTnLst>
+                                    <p:animScale>
+                                      <p:cBhvr>
+                                        <p:cTn id="10" dur="2000" fill="hold"/>
+                                        <p:tgtEl>
+                                          <p:spTgt spid="11"/>
+                                        </p:tgtEl>
+                                      </p:cBhvr>
+                                      <p:by x="150000" y="150000"/>
+                                    </p:animScale>
+                                  </p:childTnLst>
+                                </p:cTn>
+                              </p:par>
+                            </p:childTnLst>
+                          </p:cTn>
+                        </p:par>
+                      </p:childTnLst>
+                    </p:cTn>
+                  </p:par>
+                  <p:par>
+                    <p:cTn id="11" fill="hold">
+                      <p:stCondLst>
+                        <p:cond delay="indefinite"/>
+                      </p:stCondLst>
+                      <p:childTnLst>
+                        <p:par>
+                          <p:cTn id="12" fill="hold">
+                            <p:stCondLst>
+                              <p:cond delay="0"/>
+                            </p:stCondLst>
+                            <p:childTnLst>
+                              <p:par>
+                                <p:cTn id="13" presetID="6" presetClass="emph" presetSubtype="0" fill="hold" grpId="0" nodeType="clickEffect">
+                                  <p:stCondLst>
+                                    <p:cond delay="0"/>
+                                  </p:stCondLst>
+                                  <p:childTnLst>
+                                    <p:animScale>
+                                      <p:cBhvr>
+                                        <p:cTn id="14" dur="2000" fill="hold"/>
+                                        <p:tgtEl>
+                                          <p:spTgt spid="12"/>
+                                        </p:tgtEl>
+                                      </p:cBhvr>
+                                      <p:by x="150000" y="150000"/>
+                                    </p:animScale>
+                                  </p:childTnLst>
+                                </p:cTn>
+                              </p:par>
+                            </p:childTnLst>
+                          </p:cTn>
+                        </p:par>
+                      </p:childTnLst>
+                    </p:cTn>
+                  </p:par>
+                  <p:par>
+                    <p:cTn id="15" fill="hold">
+                      <p:stCondLst>
+                        <p:cond delay="indefinite"/>
+                      </p:stCondLst>
+                      <p:childTnLst>
+                        <p:par>
+                          <p:cTn id="16" fill="hold">
+                            <p:stCondLst>
+                              <p:cond delay="0"/>
+                            </p:stCondLst>
+                            <p:childTnLst>
+                              <p:par>
+                                <p:cTn id="17" presetID="6" presetClass="emph" presetSubtype="0" fill="hold" grpId="0" nodeType="clickEffect">
+                                  <p:stCondLst>
+                                    <p:cond delay="0"/>
+                                  </p:stCondLst>
+                                  <p:childTnLst>
+                                    <p:animScale>
+                                      <p:cBhvr>
+                                        <p:cTn id="18" dur="2000" fill="hold"/>
+                                        <p:tgtEl>
+                                          <p:spTgt spid="13"/>
+                                        </p:tgtEl>
+                                      </p:cBhvr>
+                                      <p:by x="150000" y="150000"/>
+                                    </p:animScale>
+                                  </p:childTnLst>
+                                </p:cTn>
+                              </p:par>
+                            </p:childTnLst>
+                          </p:cTn>
+                        </p:par>
+                      </p:childTnLst>
+                    </p:cTn>
+                  </p:par>
+                  <p:par>
+                    <p:cTn id="19" fill="hold">
+                      <p:stCondLst>
+                        <p:cond delay="indefinite"/>
+                      </p:stCondLst>
+                      <p:childTnLst>
+                        <p:par>
+                          <p:cTn id="20" fill="hold">
+                            <p:stCondLst>
+                              <p:cond delay="0"/>
+                            </p:stCondLst>
+                            <p:childTnLst>
+                              <p:par>
+                                <p:cTn id="21" presetID="6" presetClass="emph" presetSubtype="0" fill="hold" grpId="0" nodeType="clickEffect">
+                                  <p:stCondLst>
+                                    <p:cond delay="0"/>
+                                  </p:stCondLst>
+                                  <p:childTnLst>
+                                    <p:animScale>
+                                      <p:cBhvr>
+                                        <p:cTn id="22" dur="2000" fill="hold"/>
+                                        <p:tgtEl>
+                                          <p:spTgt spid="14"/>
+                                        </p:tgtEl>
+                                      </p:cBhvr>
+                                      <p:by x="150000" y="150000"/>
+                                    </p:animScale>
+                                  </p:childTnLst>
+                                </p:cTn>
+                              </p:par>
+                            </p:childTnLst>
+                          </p:cTn>
+                        </p:par>
+                      </p:childTnLst>
+                    </p:cTn>
+                  </p:par>
+                  <p:par>
+                    <p:cTn id="23" fill="hold">
+                      <p:stCondLst>
+                        <p:cond delay="indefinite"/>
+                      </p:stCondLst>
+                      <p:childTnLst>
+                        <p:par>
+                          <p:cTn id="24" fill="hold">
+                            <p:stCondLst>
+                              <p:cond delay="0"/>
+                            </p:stCondLst>
+                            <p:childTnLst>
+                              <p:par>
+                                <p:cTn id="25" presetID="6" presetClass="emph" presetSubtype="0" fill="hold" grpId="0" nodeType="clickEffect">
+                                  <p:stCondLst>
+                                    <p:cond delay="0"/>
+                                  </p:stCondLst>
+                                  <p:childTnLst>
+                                    <p:animScale>
+                                      <p:cBhvr>
+                                        <p:cTn id="26" dur="2000" fill="hold"/>
+                                        <p:tgtEl>
+                                          <p:spTgt spid="17"/>
+                                        </p:tgtEl>
+                                      </p:cBhvr>
+                                      <p:by x="150000" y="150000"/>
+                                    </p:animScale>
+                                  </p:childTnLst>
+                                </p:cTn>
+                              </p:par>
+                            </p:childTnLst>
+                          </p:cTn>
+                        </p:par>
+                      </p:childTnLst>
+                    </p:cTn>
+                  </p:par>
+                  <p:par>
+                    <p:cTn id="27" fill="hold">
+                      <p:stCondLst>
+                        <p:cond delay="indefinite"/>
+                      </p:stCondLst>
+                      <p:childTnLst>
+                        <p:par>
+                          <p:cTn id="28" fill="hold">
+                            <p:stCondLst>
+                              <p:cond delay="0"/>
+                            </p:stCondLst>
+                            <p:childTnLst>
+                              <p:par>
+                                <p:cTn id="29" presetID="6" presetClass="emph" presetSubtype="0" fill="hold" grpId="0" nodeType="clickEffect">
+                                  <p:stCondLst>
+                                    <p:cond delay="0"/>
+                                  </p:stCondLst>
+                                  <p:childTnLst>
+                                    <p:animScale>
+                                      <p:cBhvr>
+                                        <p:cTn id="30" dur="2000" fill="hold"/>
+                                        <p:tgtEl>
+                                          <p:spTgt spid="18"/>
+                                        </p:tgtEl>
+                                      </p:cBhvr>
+                                      <p:by x="150000" y="150000"/>
+                                    </p:animScale>
+                                  </p:childTnLst>
+                                </p:cTn>
+                              </p:par>
+                            </p:childTnLst>
+                          </p:cTn>
+                        </p:par>
+                      </p:childTnLst>
+                    </p:cTn>
+                  </p:par>
+                  <p:par>
+                    <p:cTn id="31" fill="hold">
+                      <p:stCondLst>
+                        <p:cond delay="indefinite"/>
+                      </p:stCondLst>
+                      <p:childTnLst>
+                        <p:par>
+                          <p:cTn id="32" fill="hold">
+                            <p:stCondLst>
+                              <p:cond delay="0"/>
+                            </p:stCondLst>
+                            <p:childTnLst>
+                              <p:par>
+                                <p:cTn id="33" presetID="6" presetClass="emph" presetSubtype="0" fill="hold" grpId="0" nodeType="clickEffect">
+                                  <p:stCondLst>
+                                    <p:cond delay="0"/>
+                                  </p:stCondLst>
+                                  <p:childTnLst>
+                                    <p:animScale>
+                                      <p:cBhvr>
+                                        <p:cTn id="34" dur="2000" fill="hold"/>
+                                        <p:tgtEl>
+                                          <p:spTgt spid="19"/>
+                                        </p:tgtEl>
+                                      </p:cBhvr>
+                                      <p:by x="150000" y="150000"/>
+                                    </p:animScale>
+                                  </p:childTnLst>
+                                </p:cTn>
+                              </p:par>
+                            </p:childTnLst>
+                          </p:cTn>
+                        </p:par>
+                      </p:childTnLst>
+                    </p:cTn>
+                  </p:par>
+                  <p:par>
+                    <p:cTn id="35" fill="hold">
+                      <p:stCondLst>
+                        <p:cond delay="indefinite"/>
+                      </p:stCondLst>
+                      <p:childTnLst>
+                        <p:par>
+                          <p:cTn id="36" fill="hold">
+                            <p:stCondLst>
+                              <p:cond delay="0"/>
+                            </p:stCondLst>
+                            <p:childTnLst>
+                              <p:par>
+                                <p:cTn id="37" presetID="6" presetClass="emph" presetSubtype="0" fill="hold" grpId="0" nodeType="clickEffect">
+                                  <p:stCondLst>
+                                    <p:cond delay="0"/>
+                                  </p:stCondLst>
+                                  <p:childTnLst>
+                                    <p:animScale>
+                                      <p:cBhvr>
+                                        <p:cTn id="38" dur="2000" fill="hold"/>
+                                        <p:tgtEl>
+                                          <p:spTgt spid="20"/>
+                                        </p:tgtEl>
+                                      </p:cBhvr>
+                                      <p:by x="150000" y="150000"/>
+                                    </p:animScale>
+                                  </p:childTnLst>
+                                </p:cTn>
+                              </p:par>
+                            </p:childTnLst>
+                          </p:cTn>
+                        </p:par>
+                      </p:childTnLst>
+                    </p:cTn>
+                  </p:par>
+                  <p:par>
+                    <p:cTn id="39" fill="hold">
+                      <p:stCondLst>
+                        <p:cond delay="indefinite"/>
+                      </p:stCondLst>
+                      <p:childTnLst>
+                        <p:par>
+                          <p:cTn id="40" fill="hold">
+                            <p:stCondLst>
+                              <p:cond delay="0"/>
+                            </p:stCondLst>
+                            <p:childTnLst>
+                              <p:par>
+                                <p:cTn id="41" presetID="6" presetClass="emph" presetSubtype="0" fill="hold" grpId="0" nodeType="clickEffect">
+                                  <p:stCondLst>
+                                    <p:cond delay="0"/>
+                                  </p:stCondLst>
+                                  <p:childTnLst>
+                                    <p:animScale>
+                                      <p:cBhvr>
+                                        <p:cTn id="42" dur="2000" fill="hold"/>
+                                        <p:tgtEl>
+                                          <p:spTgt spid="21"/>
+                                        </p:tgtEl>
+                                      </p:cBhvr>
+                                      <p:by x="150000" y="150000"/>
+                                    </p:animScale>
+                                  </p:childTnLst>
+                                </p:cTn>
+                              </p:par>
+                            </p:childTnLst>
+                          </p:cTn>
+                        </p:par>
+                      </p:childTnLst>
+                    </p:cTn>
+                  </p:par>
+                  <p:par>
+                    <p:cTn id="43" fill="hold">
+                      <p:stCondLst>
+                        <p:cond delay="indefinite"/>
+                      </p:stCondLst>
+                      <p:childTnLst>
+                        <p:par>
+                          <p:cTn id="44" fill="hold">
+                            <p:stCondLst>
+                              <p:cond delay="0"/>
+                            </p:stCondLst>
+                            <p:childTnLst>
+                              <p:par>
+                                <p:cTn id="45" presetID="6" presetClass="emph" presetSubtype="0" fill="hold" grpId="0" nodeType="clickEffect">
+                                  <p:stCondLst>
+                                    <p:cond delay="0"/>
+                                  </p:stCondLst>
+                                  <p:childTnLst>
+                                    <p:animScale>
+                                      <p:cBhvr>
+                                        <p:cTn id="46" dur="2000" fill="hold"/>
+                                        <p:tgtEl>
+                                          <p:spTgt spid="22"/>
+                                        </p:tgtEl>
+                                      </p:cBhvr>
+                                      <p:by x="150000" y="150000"/>
+                                    </p:animScale>
+                                  </p:childTnLst>
+                                </p:cTn>
+                              </p:par>
+                            </p:childTnLst>
+                          </p:cTn>
+                        </p:par>
+                      </p:childTnLst>
+                    </p:cTn>
+                  </p:par>
+                  <p:par>
+                    <p:cTn id="47" fill="hold">
+                      <p:stCondLst>
+                        <p:cond delay="indefinite"/>
+                      </p:stCondLst>
+                      <p:childTnLst>
+                        <p:par>
+                          <p:cTn id="48" fill="hold">
+                            <p:stCondLst>
+                              <p:cond delay="0"/>
+                            </p:stCondLst>
+                            <p:childTnLst>
+                              <p:par>
+                                <p:cTn id="49" presetID="6" presetClass="emph" presetSubtype="0" fill="hold" grpId="0" nodeType="clickEffect">
+                                  <p:stCondLst>
+                                    <p:cond delay="0"/>
+                                  </p:stCondLst>
+                                  <p:childTnLst>
+                                    <p:animScale>
+                                      <p:cBhvr>
+                                        <p:cTn id="50" dur="2000" fill="hold"/>
+                                        <p:tgtEl>
+                                          <p:spTgt spid="23"/>
+                                        </p:tgtEl>
+                                      </p:cBhvr>
+                                      <p:by x="150000" y="150000"/>
+                                    </p:animScale>
+                                  </p:childTnLst>
+                                </p:cTn>
+                              </p:par>
+                            </p:childTnLst>
+                          </p:cTn>
+                        </p:par>
+                      </p:childTnLst>
+                    </p:cTn>
+                  </p:par>
+                  <p:par>
+                    <p:cTn id="51" fill="hold">
+                      <p:stCondLst>
+                        <p:cond delay="indefinite"/>
+                      </p:stCondLst>
+                      <p:childTnLst>
+                        <p:par>
+                          <p:cTn id="52" fill="hold">
+                            <p:stCondLst>
+                              <p:cond delay="0"/>
+                            </p:stCondLst>
+                            <p:childTnLst>
+                              <p:par>
+                                <p:cTn id="53" presetID="6" presetClass="emph" presetSubtype="0" fill="hold" grpId="0" nodeType="clickEffect">
+                                  <p:stCondLst>
+                                    <p:cond delay="0"/>
+                                  </p:stCondLst>
+                                  <p:childTnLst>
+                                    <p:animScale>
+                                      <p:cBhvr>
+                                        <p:cTn id="54" dur="2000" fill="hold"/>
+                                        <p:tgtEl>
+                                          <p:spTgt spid="24"/>
+                                        </p:tgtEl>
+                                      </p:cBhvr>
+                                      <p:by x="150000" y="150000"/>
+                                    </p:animScale>
+                                  </p:childTnLst>
+                                </p:cTn>
+                              </p:par>
+                            </p:childTnLst>
+                          </p:cTn>
+                        </p:par>
+                      </p:childTnLst>
+                    </p:cTn>
+                  </p:par>
+                  <p:par>
+                    <p:cTn id="55" fill="hold">
+                      <p:stCondLst>
+                        <p:cond delay="indefinite"/>
+                      </p:stCondLst>
+                      <p:childTnLst>
+                        <p:par>
+                          <p:cTn id="56" fill="hold">
+                            <p:stCondLst>
+                              <p:cond delay="0"/>
+                            </p:stCondLst>
+                            <p:childTnLst>
+                              <p:par>
+                                <p:cTn id="57" presetID="6" presetClass="emph" presetSubtype="0" fill="hold" grpId="0" nodeType="clickEffect">
+                                  <p:stCondLst>
+                                    <p:cond delay="0"/>
+                                  </p:stCondLst>
+                                  <p:childTnLst>
+                                    <p:animScale>
+                                      <p:cBhvr>
+                                        <p:cTn id="58" dur="2000" fill="hold"/>
+                                        <p:tgtEl>
+                                          <p:spTgt spid="25"/>
+                                        </p:tgtEl>
+                                      </p:cBhvr>
+                                      <p:by x="150000" y="150000"/>
+                                    </p:animScale>
+                                  </p:childTnLst>
+                                </p:cTn>
+                              </p:par>
+                            </p:childTnLst>
+                          </p:cTn>
+                        </p:par>
+                      </p:childTnLst>
+                    </p:cTn>
+                  </p:par>
+                  <p:par>
+                    <p:cTn id="59" fill="hold">
+                      <p:stCondLst>
+                        <p:cond delay="indefinite"/>
+                      </p:stCondLst>
+                      <p:childTnLst>
+                        <p:par>
+                          <p:cTn id="60" fill="hold">
+                            <p:stCondLst>
+                              <p:cond delay="0"/>
+                            </p:stCondLst>
+                            <p:childTnLst>
+                              <p:par>
+                                <p:cTn id="61" presetID="6" presetClass="emph" presetSubtype="0" fill="hold" grpId="0" nodeType="clickEffect">
+                                  <p:stCondLst>
+                                    <p:cond delay="0"/>
+                                  </p:stCondLst>
+                                  <p:childTnLst>
+                                    <p:animScale>
+                                      <p:cBhvr>
+                                        <p:cTn id="62" dur="2000" fill="hold"/>
+                                        <p:tgtEl>
+                                          <p:spTgt spid="7"/>
+                                        </p:tgtEl>
+                                      </p:cBhvr>
+                                      <p:by x="150000" y="150000"/>
+                                    </p:animScale>
+                                  </p:childTnLst>
+                                </p:cTn>
+                              </p:par>
+                            </p:childTnLst>
+                          </p:cTn>
+                        </p:par>
+                      </p:childTnLst>
+                    </p:cTn>
+                  </p:par>
+                </p:childTnLst>
+              </p:cTn>
+              <p:prevCondLst>
+                <p:cond evt="onPrev" delay="0">
+                  <p:tgtEl>
+                    <p:sldTgt/>
+                  </p:tgtEl>
+                </p:cond>
+              </p:prevCondLst>
+              <p:nextCondLst>
+                <p:cond evt="onNext" delay="0">
+                  <p:tgtEl>
+                    <p:sldTgt/>
+                  </p:tgtEl>
+                </p:cond>
+              </p:nextCondLst>
+            </p:seq>
+          </p:childTnLst>
+        </p:cTn>
+      </p:par>
+    </p:tnLst>
+    <p:bldLst>
+      <p:bldP spid="7" grpId="0" animBg="1"/>
+      <p:bldP spid="9" grpId="0" animBg="1"/>
+      <p:bldP spid="12" grpId="0" animBg="1"/>
+      <p:bldP spid="13" grpId="0" animBg="1"/>
+      <p:bldP spid="14" grpId="0" animBg="1"/>
+      <p:bldP spid="17" grpId="0" animBg="1"/>
+      <p:bldP spid="18" grpId="0" animBg="1"/>
+      <p:bldP spid="19" grpId="0" animBg="1"/>
+      <p:bldP spid="20" grpId="0" animBg="1"/>
+      <p:bldP spid="21" grpId="0" animBg="1"/>
+      <p:bldP spid="22" grpId="0" animBg="1"/>
+      <p:bldP spid="23" grpId="0" animBg="1"/>
+      <p:bldP spid="24" grpId="0" animBg="1"/>
+      <p:bldP spid="25" grpId="0" animBg="1"/>
+    </p:bldLst>
+  </p:timing>
+</p:sld>
+</file>
+
+<file path=ppt/slides/slide15.xml><?xml version="1.0" encoding="utf-8"?>
+<p:sld xmlns:a="http://schemas.openxmlformats.org/drawingml/2006/main" xmlns:r="http://schemas.openxmlformats.org/officeDocument/2006/relationships" xmlns:p="http://schemas.openxmlformats.org/presentationml/2006/main">
+  <p:cSld>
+    <p:spTree>
+      <p:nvGrpSpPr>
+        <p:cNvPr id="1" name=""/>
+        <p:cNvGrpSpPr/>
+        <p:nvPr/>
+      </p:nvGrpSpPr>
+      <p:grpSpPr>
+        <a:xfrm>
+          <a:off x="0" y="0"/>
+          <a:ext cx="0" cy="0"/>
+          <a:chOff x="0" y="0"/>
+          <a:chExt cx="0" cy="0"/>
+        </a:xfrm>
+      </p:grpSpPr>
+      <p:sp>
+        <p:nvSpPr>
+          <p:cNvPr id="84" name="TextShape 1"/>
+          <p:cNvSpPr txBox="1"/>
+          <p:nvPr/>
+        </p:nvSpPr>
+        <p:spPr>
+          <a:xfrm>
+            <a:off x="628560" y="365040"/>
+            <a:ext cx="7886520" cy="1325160"/>
+          </a:xfrm>
+          <a:prstGeom prst="rect">
+            <a:avLst/>
+          </a:prstGeom>
+          <a:noFill/>
+          <a:ln>
+            <a:noFill/>
+          </a:ln>
+        </p:spPr>
+        <p:txBody>
+          <a:bodyPr anchor="ctr"/>
+          <a:lstStyle/>
+          <a:p>
+            <a:pPr>
+              <a:lnSpc>
+                <a:spcPct val="90000"/>
+              </a:lnSpc>
+            </a:pPr>
+            <a:r>
+              <a:rPr lang="en-US" sz="4400" b="0" strike="noStrike" spc="-1" dirty="0" smtClean="0">
+                <a:solidFill>
+                  <a:srgbClr val="000000"/>
+                </a:solidFill>
+                <a:uFill>
+                  <a:solidFill>
+                    <a:srgbClr val="FFFFFF"/>
+                  </a:solidFill>
+                </a:uFill>
+                <a:latin typeface="Calibri Light"/>
+              </a:rPr>
+              <a:t>Deep Q-Learning – First results</a:t>
+            </a:r>
+            <a:endParaRPr lang="en-US" sz="1800" b="0" strike="noStrike" spc="-1" dirty="0">
+              <a:solidFill>
+                <a:srgbClr val="000000"/>
+              </a:solidFill>
+              <a:uFill>
+                <a:solidFill>
+                  <a:srgbClr val="FFFFFF"/>
+                </a:solidFill>
+              </a:uFill>
+              <a:latin typeface="Calibri"/>
+            </a:endParaRPr>
+          </a:p>
+        </p:txBody>
+      </p:sp>
+      <p:sp>
+        <p:nvSpPr>
+          <p:cNvPr id="85" name="TextShape 2"/>
+          <p:cNvSpPr txBox="1"/>
+          <p:nvPr/>
+        </p:nvSpPr>
+        <p:spPr>
+          <a:xfrm>
+            <a:off x="628560" y="1825560"/>
+            <a:ext cx="7886520" cy="4350960"/>
+          </a:xfrm>
+          <a:prstGeom prst="rect">
+            <a:avLst/>
+          </a:prstGeom>
+          <a:noFill/>
+          <a:ln>
+            <a:noFill/>
+          </a:ln>
+        </p:spPr>
+        <p:txBody>
+          <a:bodyPr/>
+          <a:lstStyle/>
+          <a:p>
+            <a:r>
+              <a:rPr lang="de-DE" altLang="de-DE" sz="2800" dirty="0" err="1" smtClean="0">
+                <a:latin typeface="Calibri" panose="020F0502020204030204" pitchFamily="34" charset="0"/>
+                <a:cs typeface="Calibri" panose="020F0502020204030204" pitchFamily="34" charset="0"/>
+              </a:rPr>
+              <a:t>Algorithm</a:t>
+            </a:r>
+            <a:r>
+              <a:rPr lang="de-DE" altLang="de-DE" sz="2800" dirty="0" smtClean="0">
+                <a:latin typeface="Calibri" panose="020F0502020204030204" pitchFamily="34" charset="0"/>
+                <a:cs typeface="Calibri" panose="020F0502020204030204" pitchFamily="34" charset="0"/>
+              </a:rPr>
+              <a:t> </a:t>
+            </a:r>
+            <a:r>
+              <a:rPr lang="de-DE" altLang="de-DE" sz="2800" dirty="0" err="1" smtClean="0">
+                <a:latin typeface="Calibri" panose="020F0502020204030204" pitchFamily="34" charset="0"/>
+                <a:cs typeface="Calibri" panose="020F0502020204030204" pitchFamily="34" charset="0"/>
+              </a:rPr>
+              <a:t>from</a:t>
+            </a:r>
+            <a:r>
+              <a:rPr lang="de-DE" altLang="de-DE" sz="2800" dirty="0" smtClean="0">
+                <a:latin typeface="Calibri" panose="020F0502020204030204" pitchFamily="34" charset="0"/>
+                <a:cs typeface="Calibri" panose="020F0502020204030204" pitchFamily="34" charset="0"/>
+              </a:rPr>
+              <a:t> „</a:t>
+            </a:r>
+            <a:r>
+              <a:rPr lang="de-DE" altLang="de-DE" sz="2800" dirty="0" err="1" smtClean="0">
+                <a:latin typeface="Calibri" panose="020F0502020204030204" pitchFamily="34" charset="0"/>
+                <a:cs typeface="Calibri" panose="020F0502020204030204" pitchFamily="34" charset="0"/>
+              </a:rPr>
+              <a:t>Playing</a:t>
+            </a:r>
+            <a:r>
+              <a:rPr lang="de-DE" altLang="de-DE" sz="2800" dirty="0" smtClean="0">
+                <a:latin typeface="Calibri" panose="020F0502020204030204" pitchFamily="34" charset="0"/>
+                <a:cs typeface="Calibri" panose="020F0502020204030204" pitchFamily="34" charset="0"/>
+              </a:rPr>
+              <a:t> Atari </a:t>
+            </a:r>
+            <a:r>
+              <a:rPr lang="de-DE" altLang="de-DE" sz="2800" dirty="0" err="1" smtClean="0">
+                <a:latin typeface="Calibri" panose="020F0502020204030204" pitchFamily="34" charset="0"/>
+                <a:cs typeface="Calibri" panose="020F0502020204030204" pitchFamily="34" charset="0"/>
+              </a:rPr>
+              <a:t>with</a:t>
+            </a:r>
+            <a:r>
+              <a:rPr lang="de-DE" altLang="de-DE" sz="2800" dirty="0" smtClean="0">
+                <a:latin typeface="Calibri" panose="020F0502020204030204" pitchFamily="34" charset="0"/>
+                <a:cs typeface="Calibri" panose="020F0502020204030204" pitchFamily="34" charset="0"/>
+              </a:rPr>
+              <a:t> </a:t>
+            </a:r>
+            <a:r>
+              <a:rPr lang="de-DE" altLang="de-DE" sz="2800" dirty="0" err="1" smtClean="0">
+                <a:latin typeface="Calibri" panose="020F0502020204030204" pitchFamily="34" charset="0"/>
+                <a:cs typeface="Calibri" panose="020F0502020204030204" pitchFamily="34" charset="0"/>
+              </a:rPr>
+              <a:t>Deep</a:t>
+            </a:r>
+            <a:r>
+              <a:rPr lang="de-DE" altLang="de-DE" sz="2800" dirty="0" smtClean="0">
+                <a:latin typeface="Calibri" panose="020F0502020204030204" pitchFamily="34" charset="0"/>
+                <a:cs typeface="Calibri" panose="020F0502020204030204" pitchFamily="34" charset="0"/>
+              </a:rPr>
+              <a:t> Reinforcement Learning“:</a:t>
+            </a:r>
+          </a:p>
+          <a:p>
+            <a:endParaRPr lang="de-DE" altLang="de-DE" sz="2800" dirty="0" smtClean="0">
+              <a:latin typeface="Calibri" panose="020F0502020204030204" pitchFamily="34" charset="0"/>
+              <a:cs typeface="Calibri" panose="020F0502020204030204" pitchFamily="34" charset="0"/>
+            </a:endParaRPr>
+          </a:p>
+          <a:p>
+            <a:endParaRPr lang="en-US" sz="2800" spc="-1" dirty="0">
+              <a:solidFill>
+                <a:srgbClr val="000000"/>
+              </a:solidFill>
+              <a:uFill>
+                <a:solidFill>
+                  <a:srgbClr val="FFFFFF"/>
+                </a:solidFill>
+              </a:uFill>
+              <a:latin typeface="Calibri"/>
+              <a:sym typeface="Wingdings" panose="05000000000000000000" pitchFamily="2" charset="2"/>
+            </a:endParaRPr>
+          </a:p>
+        </p:txBody>
+      </p:sp>
+    </p:spTree>
+    <p:extLst>
+      <p:ext uri="{BB962C8B-B14F-4D97-AF65-F5344CB8AC3E}">
+        <p14:creationId xmlns="" xmlns:p14="http://schemas.microsoft.com/office/powerpoint/2010/main" val="3506178436"/>
       </p:ext>
     </p:extLst>
   </p:cSld>
@@ -5731,10 +8996,10 @@
           <p:nvPr/>
         </p:nvPicPr>
         <p:blipFill>
-          <a:blip r:embed="rId2">
+          <a:blip r:embed="rId2" cstate="print">
             <a:extLst>
               <a:ext uri="{28A0092B-C50C-407E-A947-70E740481C1C}">
-                <a14:useLocalDpi xmlns:a14="http://schemas.microsoft.com/office/drawing/2010/main" val="0"/>
+                <a14:useLocalDpi xmlns="" xmlns:a14="http://schemas.microsoft.com/office/drawing/2010/main" val="0"/>
               </a:ext>
             </a:extLst>
           </a:blip>
@@ -5754,7 +9019,7 @@
           <a:noFill/>
           <a:extLst>
             <a:ext uri="{909E8E84-426E-40DD-AFC4-6F175D3DCCD1}">
-              <a14:hiddenFill xmlns:a14="http://schemas.microsoft.com/office/drawing/2010/main">
+              <a14:hiddenFill xmlns="" xmlns:a14="http://schemas.microsoft.com/office/drawing/2010/main">
                 <a:solidFill>
                   <a:srgbClr val="FFFFFF"/>
                 </a:solidFill>
@@ -6062,7 +9327,7 @@
     </p:spTree>
     <p:extLst>
       <p:ext uri="{BB962C8B-B14F-4D97-AF65-F5344CB8AC3E}">
-        <p14:creationId xmlns:p14="http://schemas.microsoft.com/office/powerpoint/2010/main" val="3375196515"/>
+        <p14:creationId xmlns="" xmlns:p14="http://schemas.microsoft.com/office/powerpoint/2010/main" val="3375196515"/>
       </p:ext>
     </p:extLst>
   </p:cSld>
@@ -6252,7 +9517,7 @@
     </p:spTree>
     <p:extLst>
       <p:ext uri="{BB962C8B-B14F-4D97-AF65-F5344CB8AC3E}">
-        <p14:creationId xmlns:p14="http://schemas.microsoft.com/office/powerpoint/2010/main" val="688754933"/>
+        <p14:creationId xmlns="" xmlns:p14="http://schemas.microsoft.com/office/powerpoint/2010/main" val="688754933"/>
       </p:ext>
     </p:extLst>
   </p:cSld>
@@ -6409,7 +9674,7 @@
           <p:nvPr>
             <p:extLst>
               <p:ext uri="{D42A27DB-BD31-4B8C-83A1-F6EECF244321}">
-                <p14:modId xmlns:p14="http://schemas.microsoft.com/office/powerpoint/2010/main" val="2511782518"/>
+                <p14:modId xmlns="" xmlns:p14="http://schemas.microsoft.com/office/powerpoint/2010/main" val="2511782518"/>
               </p:ext>
             </p:extLst>
           </p:nvPr>
@@ -6428,14 +9693,14 @@
                 <a:gridCol w="3780420">
                   <a:extLst>
                     <a:ext uri="{9D8B030D-6E8A-4147-A177-3AD203B41FA5}">
-                      <a16:colId xmlns:a16="http://schemas.microsoft.com/office/drawing/2014/main" val="20000"/>
+                      <a16:colId xmlns="" xmlns:a16="http://schemas.microsoft.com/office/drawing/2014/main" val="20000"/>
                     </a:ext>
                   </a:extLst>
                 </a:gridCol>
                 <a:gridCol w="3780420">
                   <a:extLst>
                     <a:ext uri="{9D8B030D-6E8A-4147-A177-3AD203B41FA5}">
-                      <a16:colId xmlns:a16="http://schemas.microsoft.com/office/drawing/2014/main" val="20001"/>
+                      <a16:colId xmlns="" xmlns:a16="http://schemas.microsoft.com/office/drawing/2014/main" val="20001"/>
                     </a:ext>
                   </a:extLst>
                 </a:gridCol>
@@ -6471,7 +9736,7 @@
                 </a:tc>
                 <a:extLst>
                   <a:ext uri="{0D108BD9-81ED-4DB2-BD59-A6C34878D82A}">
-                    <a16:rowId xmlns:a16="http://schemas.microsoft.com/office/drawing/2014/main" val="10000"/>
+                    <a16:rowId xmlns="" xmlns:a16="http://schemas.microsoft.com/office/drawing/2014/main" val="10000"/>
                   </a:ext>
                 </a:extLst>
               </a:tr>
@@ -6522,7 +9787,7 @@
                 </a:tc>
                 <a:extLst>
                   <a:ext uri="{0D108BD9-81ED-4DB2-BD59-A6C34878D82A}">
-                    <a16:rowId xmlns:a16="http://schemas.microsoft.com/office/drawing/2014/main" val="10001"/>
+                    <a16:rowId xmlns="" xmlns:a16="http://schemas.microsoft.com/office/drawing/2014/main" val="10001"/>
                   </a:ext>
                 </a:extLst>
               </a:tr>
@@ -6569,7 +9834,7 @@
                 </a:tc>
                 <a:extLst>
                   <a:ext uri="{0D108BD9-81ED-4DB2-BD59-A6C34878D82A}">
-                    <a16:rowId xmlns:a16="http://schemas.microsoft.com/office/drawing/2014/main" val="10002"/>
+                    <a16:rowId xmlns="" xmlns:a16="http://schemas.microsoft.com/office/drawing/2014/main" val="10002"/>
                   </a:ext>
                 </a:extLst>
               </a:tr>
@@ -6672,7 +9937,7 @@
                 </a:tc>
                 <a:extLst>
                   <a:ext uri="{0D108BD9-81ED-4DB2-BD59-A6C34878D82A}">
-                    <a16:rowId xmlns:a16="http://schemas.microsoft.com/office/drawing/2014/main" val="10003"/>
+                    <a16:rowId xmlns="" xmlns:a16="http://schemas.microsoft.com/office/drawing/2014/main" val="10003"/>
                   </a:ext>
                 </a:extLst>
               </a:tr>
@@ -6683,7 +9948,7 @@
     </p:spTree>
     <p:extLst>
       <p:ext uri="{BB962C8B-B14F-4D97-AF65-F5344CB8AC3E}">
-        <p14:creationId xmlns:p14="http://schemas.microsoft.com/office/powerpoint/2010/main" val="332059057"/>
+        <p14:creationId xmlns="" xmlns:p14="http://schemas.microsoft.com/office/powerpoint/2010/main" val="332059057"/>
       </p:ext>
     </p:extLst>
   </p:cSld>
@@ -6794,7 +10059,7 @@
         </p:txBody>
       </p:sp>
       <mc:AlternateContent xmlns:mc="http://schemas.openxmlformats.org/markup-compatibility/2006">
-        <mc:Choice xmlns:a14="http://schemas.microsoft.com/office/drawing/2010/main" Requires="a14">
+        <mc:Choice xmlns="" xmlns:a14="http://schemas.microsoft.com/office/drawing/2010/main" Requires="a14">
           <p:sp>
             <p:nvSpPr>
               <p:cNvPr id="85" name="TextShape 2"/>
@@ -6954,7 +10219,7 @@
                 <a:avLst/>
               </a:prstGeom>
               <a:blipFill>
-                <a:blip r:embed="rId2"/>
+                <a:blip r:embed="rId2" cstate="print"/>
                 <a:stretch>
                   <a:fillRect l="-1546" t="-1203"/>
                 </a:stretch>
@@ -6981,7 +10246,7 @@
     </p:spTree>
     <p:extLst>
       <p:ext uri="{BB962C8B-B14F-4D97-AF65-F5344CB8AC3E}">
-        <p14:creationId xmlns:p14="http://schemas.microsoft.com/office/powerpoint/2010/main" val="643261103"/>
+        <p14:creationId xmlns="" xmlns:p14="http://schemas.microsoft.com/office/powerpoint/2010/main" val="643261103"/>
       </p:ext>
     </p:extLst>
   </p:cSld>
@@ -7096,7 +10361,7 @@
           <p:cNvPr id="5" name="Grafik 4" descr="Ein Bild, das Screenshot enthält.&#10;&#10;Mit sehr hoher Zuverlässigkeit generierte Beschreibung">
             <a:extLst>
               <a:ext uri="{FF2B5EF4-FFF2-40B4-BE49-F238E27FC236}">
-                <a16:creationId xmlns:a16="http://schemas.microsoft.com/office/drawing/2014/main" id="{8A1DF966-2EA8-4EAA-8ECB-8A6905B839CC}"/>
+                <a16:creationId xmlns="" xmlns:a16="http://schemas.microsoft.com/office/drawing/2014/main" id="{8A1DF966-2EA8-4EAA-8ECB-8A6905B839CC}"/>
               </a:ext>
             </a:extLst>
           </p:cNvPr>
@@ -7106,10 +10371,10 @@
           <p:nvPr/>
         </p:nvPicPr>
         <p:blipFill>
-          <a:blip r:embed="rId2">
+          <a:blip r:embed="rId2" cstate="print">
             <a:extLst>
               <a:ext uri="{28A0092B-C50C-407E-A947-70E740481C1C}">
-                <a14:useLocalDpi xmlns:a14="http://schemas.microsoft.com/office/drawing/2010/main" val="0"/>
+                <a14:useLocalDpi xmlns="" xmlns:a14="http://schemas.microsoft.com/office/drawing/2010/main" val="0"/>
               </a:ext>
             </a:extLst>
           </a:blip>
@@ -7132,7 +10397,7 @@
           <p:cNvPr id="6" name="Grafik 5" descr="Ein Bild, das Screenshot enthält.&#10;&#10;Mit hoher Zuverlässigkeit generierte Beschreibung">
             <a:extLst>
               <a:ext uri="{FF2B5EF4-FFF2-40B4-BE49-F238E27FC236}">
-                <a16:creationId xmlns:a16="http://schemas.microsoft.com/office/drawing/2014/main" id="{57E97D56-AE28-4097-9F7E-0D8AD4A5A9B7}"/>
+                <a16:creationId xmlns="" xmlns:a16="http://schemas.microsoft.com/office/drawing/2014/main" id="{57E97D56-AE28-4097-9F7E-0D8AD4A5A9B7}"/>
               </a:ext>
             </a:extLst>
           </p:cNvPr>
@@ -7142,10 +10407,10 @@
           <p:nvPr/>
         </p:nvPicPr>
         <p:blipFill>
-          <a:blip r:embed="rId3">
+          <a:blip r:embed="rId3" cstate="print">
             <a:extLst>
               <a:ext uri="{28A0092B-C50C-407E-A947-70E740481C1C}">
-                <a14:useLocalDpi xmlns:a14="http://schemas.microsoft.com/office/drawing/2010/main" val="0"/>
+                <a14:useLocalDpi xmlns="" xmlns:a14="http://schemas.microsoft.com/office/drawing/2010/main" val="0"/>
               </a:ext>
             </a:extLst>
           </a:blip>
@@ -7168,7 +10433,7 @@
           <p:cNvPr id="7" name="Titel 1">
             <a:extLst>
               <a:ext uri="{FF2B5EF4-FFF2-40B4-BE49-F238E27FC236}">
-                <a16:creationId xmlns:a16="http://schemas.microsoft.com/office/drawing/2014/main" id="{5E5EB1EA-266D-4CBF-B165-153D3814CE1A}"/>
+                <a16:creationId xmlns="" xmlns:a16="http://schemas.microsoft.com/office/drawing/2014/main" id="{5E5EB1EA-266D-4CBF-B165-153D3814CE1A}"/>
               </a:ext>
             </a:extLst>
           </p:cNvPr>
@@ -7296,7 +10561,7 @@
           <p:cNvPr id="8" name="Titel 1">
             <a:extLst>
               <a:ext uri="{FF2B5EF4-FFF2-40B4-BE49-F238E27FC236}">
-                <a16:creationId xmlns:a16="http://schemas.microsoft.com/office/drawing/2014/main" id="{CEE7DEA1-52C9-4392-A200-7484F55E92BA}"/>
+                <a16:creationId xmlns="" xmlns:a16="http://schemas.microsoft.com/office/drawing/2014/main" id="{CEE7DEA1-52C9-4392-A200-7484F55E92BA}"/>
               </a:ext>
             </a:extLst>
           </p:cNvPr>
@@ -7361,7 +10626,7 @@
           <p:cNvPr id="9" name="Titel 1">
             <a:extLst>
               <a:ext uri="{FF2B5EF4-FFF2-40B4-BE49-F238E27FC236}">
-                <a16:creationId xmlns:a16="http://schemas.microsoft.com/office/drawing/2014/main" id="{3FAF8113-C12D-42B5-99BC-E7C70AD0DE41}"/>
+                <a16:creationId xmlns="" xmlns:a16="http://schemas.microsoft.com/office/drawing/2014/main" id="{3FAF8113-C12D-42B5-99BC-E7C70AD0DE41}"/>
               </a:ext>
             </a:extLst>
           </p:cNvPr>
@@ -7430,7 +10695,7 @@
     </p:spTree>
     <p:extLst>
       <p:ext uri="{BB962C8B-B14F-4D97-AF65-F5344CB8AC3E}">
-        <p14:creationId xmlns:p14="http://schemas.microsoft.com/office/powerpoint/2010/main" val="552063840"/>
+        <p14:creationId xmlns="" xmlns:p14="http://schemas.microsoft.com/office/powerpoint/2010/main" val="552063840"/>
       </p:ext>
     </p:extLst>
   </p:cSld>
@@ -7762,7 +11027,7 @@
     </p:spTree>
     <p:extLst>
       <p:ext uri="{BB962C8B-B14F-4D97-AF65-F5344CB8AC3E}">
-        <p14:creationId xmlns:p14="http://schemas.microsoft.com/office/powerpoint/2010/main" val="2149808218"/>
+        <p14:creationId xmlns="" xmlns:p14="http://schemas.microsoft.com/office/powerpoint/2010/main" val="2149808218"/>
       </p:ext>
     </p:extLst>
   </p:cSld>
@@ -8181,7 +11446,7 @@
     </p:spTree>
     <p:extLst>
       <p:ext uri="{BB962C8B-B14F-4D97-AF65-F5344CB8AC3E}">
-        <p14:creationId xmlns:p14="http://schemas.microsoft.com/office/powerpoint/2010/main" val="3506178436"/>
+        <p14:creationId xmlns="" xmlns:p14="http://schemas.microsoft.com/office/powerpoint/2010/main" val="3506178436"/>
       </p:ext>
     </p:extLst>
   </p:cSld>

</xml_diff>

<commit_message>
Letzte Version der letzten Presentation! Und Ein paar Kommentare im Code
</commit_message>
<xml_diff>
--- a/Abgabe_09/Snake_overview.pptx
+++ b/Abgabe_09/Snake_overview.pptx
@@ -5551,252 +5551,152 @@
           <a:lstStyle/>
           <a:p>
             <a:r>
-              <a:rPr lang="de-DE" altLang="de-DE" sz="2800" dirty="0" err="1" smtClean="0">
-                <a:latin typeface="Calibri" panose="020F0502020204030204" pitchFamily="34" charset="0"/>
-                <a:cs typeface="Calibri" panose="020F0502020204030204" pitchFamily="34" charset="0"/>
-              </a:rPr>
-              <a:t>Using</a:t>
-            </a:r>
-            <a:r>
-              <a:rPr lang="de-DE" altLang="de-DE" sz="2800" dirty="0" smtClean="0">
-                <a:latin typeface="Calibri" panose="020F0502020204030204" pitchFamily="34" charset="0"/>
-                <a:cs typeface="Calibri" panose="020F0502020204030204" pitchFamily="34" charset="0"/>
-              </a:rPr>
-              <a:t> </a:t>
-            </a:r>
-            <a:r>
-              <a:rPr lang="de-DE" altLang="de-DE" sz="2800" dirty="0" err="1" smtClean="0">
+              <a:rPr lang="en-US" altLang="de-DE" sz="2800" dirty="0" smtClean="0">
+                <a:latin typeface="Calibri" panose="020F0502020204030204" pitchFamily="34" charset="0"/>
+                <a:cs typeface="Calibri" panose="020F0502020204030204" pitchFamily="34" charset="0"/>
+              </a:rPr>
+              <a:t>Using </a:t>
+            </a:r>
+            <a:r>
+              <a:rPr lang="en-US" altLang="de-DE" sz="2800" dirty="0" err="1" smtClean="0">
                 <a:latin typeface="Calibri" panose="020F0502020204030204" pitchFamily="34" charset="0"/>
                 <a:cs typeface="Calibri" panose="020F0502020204030204" pitchFamily="34" charset="0"/>
               </a:rPr>
               <a:t>Convolutional</a:t>
             </a:r>
             <a:r>
-              <a:rPr lang="de-DE" altLang="de-DE" sz="2800" dirty="0" smtClean="0">
-                <a:latin typeface="Calibri" panose="020F0502020204030204" pitchFamily="34" charset="0"/>
-                <a:cs typeface="Calibri" panose="020F0502020204030204" pitchFamily="34" charset="0"/>
-              </a:rPr>
-              <a:t> Neutral Network (CNN):</a:t>
-            </a:r>
-          </a:p>
-          <a:p>
-            <a:r>
-              <a:rPr lang="de-DE" altLang="de-DE" sz="2800" dirty="0" smtClean="0">
-                <a:latin typeface="Calibri" panose="020F0502020204030204" pitchFamily="34" charset="0"/>
-                <a:cs typeface="Calibri" panose="020F0502020204030204" pitchFamily="34" charset="0"/>
-              </a:rPr>
-              <a:t>	</a:t>
-            </a:r>
-            <a:r>
-              <a:rPr lang="de-DE" altLang="de-DE" sz="2800" dirty="0" err="1" smtClean="0">
-                <a:latin typeface="Calibri" panose="020F0502020204030204" pitchFamily="34" charset="0"/>
-                <a:cs typeface="Calibri" panose="020F0502020204030204" pitchFamily="34" charset="0"/>
-              </a:rPr>
-              <a:t>Convolution</a:t>
-            </a:r>
-            <a:r>
-              <a:rPr lang="de-DE" altLang="de-DE" sz="2800" dirty="0" smtClean="0">
-                <a:latin typeface="Calibri" panose="020F0502020204030204" pitchFamily="34" charset="0"/>
-                <a:cs typeface="Calibri" panose="020F0502020204030204" pitchFamily="34" charset="0"/>
-              </a:rPr>
-              <a:t> </a:t>
-            </a:r>
-            <a:r>
-              <a:rPr lang="de-DE" altLang="de-DE" sz="2800" dirty="0" err="1" smtClean="0">
-                <a:latin typeface="Calibri" panose="020F0502020204030204" pitchFamily="34" charset="0"/>
-                <a:cs typeface="Calibri" panose="020F0502020204030204" pitchFamily="34" charset="0"/>
-              </a:rPr>
-              <a:t>leyer</a:t>
-            </a:r>
-            <a:r>
-              <a:rPr lang="de-DE" altLang="de-DE" sz="2800" dirty="0" smtClean="0">
-                <a:latin typeface="Calibri" panose="020F0502020204030204" pitchFamily="34" charset="0"/>
-                <a:cs typeface="Calibri" panose="020F0502020204030204" pitchFamily="34" charset="0"/>
-              </a:rPr>
-              <a:t> / </a:t>
-            </a:r>
-            <a:r>
-              <a:rPr lang="de-DE" altLang="de-DE" sz="2800" dirty="0" err="1" smtClean="0">
-                <a:latin typeface="Calibri" panose="020F0502020204030204" pitchFamily="34" charset="0"/>
-                <a:cs typeface="Calibri" panose="020F0502020204030204" pitchFamily="34" charset="0"/>
-              </a:rPr>
-              <a:t>Filtering</a:t>
-            </a:r>
-            <a:endParaRPr lang="de-DE" altLang="de-DE" sz="2800" dirty="0" smtClean="0">
+              <a:rPr lang="en-US" altLang="de-DE" sz="2800" dirty="0" smtClean="0">
+                <a:latin typeface="Calibri" panose="020F0502020204030204" pitchFamily="34" charset="0"/>
+                <a:cs typeface="Calibri" panose="020F0502020204030204" pitchFamily="34" charset="0"/>
+              </a:rPr>
+              <a:t> Neural Network (CNN):</a:t>
+            </a:r>
+          </a:p>
+          <a:p>
+            <a:r>
+              <a:rPr lang="en-US" altLang="de-DE" sz="2800" dirty="0" smtClean="0">
+                <a:latin typeface="Calibri" panose="020F0502020204030204" pitchFamily="34" charset="0"/>
+                <a:cs typeface="Calibri" panose="020F0502020204030204" pitchFamily="34" charset="0"/>
+              </a:rPr>
+              <a:t>	Convolution layer / Filtering</a:t>
+            </a:r>
+          </a:p>
+          <a:p>
+            <a:r>
+              <a:rPr lang="en-US" altLang="de-DE" sz="2800" dirty="0" smtClean="0">
+                <a:latin typeface="Calibri" panose="020F0502020204030204" pitchFamily="34" charset="0"/>
+                <a:cs typeface="Calibri" panose="020F0502020204030204" pitchFamily="34" charset="0"/>
+              </a:rPr>
+              <a:t>	Pooling / </a:t>
+            </a:r>
+            <a:r>
+              <a:rPr lang="en-US" altLang="de-DE" sz="2800" dirty="0" err="1" smtClean="0">
+                <a:latin typeface="Calibri" panose="020F0502020204030204" pitchFamily="34" charset="0"/>
+                <a:cs typeface="Calibri" panose="020F0502020204030204" pitchFamily="34" charset="0"/>
+              </a:rPr>
+              <a:t>Subsampling</a:t>
+            </a:r>
+            <a:endParaRPr lang="en-US" altLang="de-DE" sz="2800" dirty="0" smtClean="0">
               <a:latin typeface="Calibri" panose="020F0502020204030204" pitchFamily="34" charset="0"/>
               <a:cs typeface="Calibri" panose="020F0502020204030204" pitchFamily="34" charset="0"/>
             </a:endParaRPr>
           </a:p>
           <a:p>
             <a:r>
-              <a:rPr lang="de-DE" altLang="de-DE" sz="2800" dirty="0" smtClean="0">
-                <a:latin typeface="Calibri" panose="020F0502020204030204" pitchFamily="34" charset="0"/>
-                <a:cs typeface="Calibri" panose="020F0502020204030204" pitchFamily="34" charset="0"/>
-              </a:rPr>
-              <a:t>	Pooling / Subsampling</a:t>
-            </a:r>
-          </a:p>
-          <a:p>
-            <a:r>
-              <a:rPr lang="de-DE" altLang="de-DE" sz="2800" dirty="0" smtClean="0">
+              <a:rPr lang="en-US" altLang="de-DE" sz="2800" dirty="0" smtClean="0">
+                <a:latin typeface="Calibri" panose="020F0502020204030204" pitchFamily="34" charset="0"/>
+                <a:cs typeface="Calibri" panose="020F0502020204030204" pitchFamily="34" charset="0"/>
+              </a:rPr>
+              <a:t>	Normalization</a:t>
+            </a:r>
+          </a:p>
+          <a:p>
+            <a:r>
+              <a:rPr lang="en-US" altLang="de-DE" sz="2800" dirty="0" smtClean="0">
+                <a:latin typeface="Calibri" panose="020F0502020204030204" pitchFamily="34" charset="0"/>
+                <a:cs typeface="Calibri" panose="020F0502020204030204" pitchFamily="34" charset="0"/>
+              </a:rPr>
+              <a:t>	Fully connected layer</a:t>
+            </a:r>
+          </a:p>
+          <a:p>
+            <a:r>
+              <a:rPr lang="en-US" altLang="de-DE" sz="2800" dirty="0" smtClean="0">
+                <a:latin typeface="Calibri" panose="020F0502020204030204" pitchFamily="34" charset="0"/>
+                <a:cs typeface="Calibri" panose="020F0502020204030204" pitchFamily="34" charset="0"/>
+              </a:rPr>
+              <a:t>Using </a:t>
+            </a:r>
+            <a:r>
+              <a:rPr lang="en-US" altLang="de-DE" sz="2800" dirty="0" err="1" smtClean="0">
+                <a:latin typeface="Calibri" panose="020F0502020204030204" pitchFamily="34" charset="0"/>
+                <a:cs typeface="Calibri" panose="020F0502020204030204" pitchFamily="34" charset="0"/>
+              </a:rPr>
+              <a:t>TensorFlow</a:t>
+            </a:r>
+            <a:r>
+              <a:rPr lang="en-US" altLang="de-DE" sz="2800" dirty="0" smtClean="0">
+                <a:latin typeface="Calibri" panose="020F0502020204030204" pitchFamily="34" charset="0"/>
+                <a:cs typeface="Calibri" panose="020F0502020204030204" pitchFamily="34" charset="0"/>
+              </a:rPr>
+              <a:t> (TF) library</a:t>
+            </a:r>
+          </a:p>
+          <a:p>
+            <a:pPr marL="0" lvl="1"/>
+            <a:r>
+              <a:rPr lang="en-US" altLang="de-DE" sz="2800" dirty="0" smtClean="0">
+                <a:latin typeface="Calibri" panose="020F0502020204030204" pitchFamily="34" charset="0"/>
+                <a:cs typeface="Calibri" panose="020F0502020204030204" pitchFamily="34" charset="0"/>
+              </a:rPr>
+              <a:t>	Detailed </a:t>
+            </a:r>
+            <a:r>
+              <a:rPr lang="en-US" altLang="de-DE" sz="2800" dirty="0" smtClean="0">
+                <a:latin typeface="Calibri" panose="020F0502020204030204" pitchFamily="34" charset="0"/>
+                <a:cs typeface="Calibri" panose="020F0502020204030204" pitchFamily="34" charset="0"/>
+              </a:rPr>
+              <a:t>documentation</a:t>
+            </a:r>
+          </a:p>
+          <a:p>
+            <a:pPr marL="0" lvl="1"/>
+            <a:r>
+              <a:rPr lang="en-US" altLang="de-DE" sz="2800" dirty="0" smtClean="0">
+                <a:latin typeface="Calibri" panose="020F0502020204030204" pitchFamily="34" charset="0"/>
+                <a:cs typeface="Calibri" panose="020F0502020204030204" pitchFamily="34" charset="0"/>
+              </a:rPr>
+              <a:t>	Create layers</a:t>
+            </a:r>
+          </a:p>
+          <a:p>
+            <a:pPr marL="0" lvl="1"/>
+            <a:r>
+              <a:rPr lang="en-US" altLang="de-DE" sz="2800" dirty="0" smtClean="0">
+                <a:latin typeface="Calibri" panose="020F0502020204030204" pitchFamily="34" charset="0"/>
+                <a:cs typeface="Calibri" panose="020F0502020204030204" pitchFamily="34" charset="0"/>
+              </a:rPr>
+              <a:t>	Possibility of composite </a:t>
+            </a:r>
+            <a:r>
+              <a:rPr lang="en-US" altLang="de-DE" sz="2800" dirty="0" smtClean="0">
+                <a:latin typeface="Calibri" panose="020F0502020204030204" pitchFamily="34" charset="0"/>
+                <a:cs typeface="Calibri" panose="020F0502020204030204" pitchFamily="34" charset="0"/>
+              </a:rPr>
+              <a:t>layers</a:t>
+            </a:r>
+          </a:p>
+          <a:p>
+            <a:r>
+              <a:rPr lang="en-US" altLang="de-DE" sz="2800" dirty="0" smtClean="0">
                 <a:latin typeface="Calibri" panose="020F0502020204030204" pitchFamily="34" charset="0"/>
                 <a:cs typeface="Calibri" panose="020F0502020204030204" pitchFamily="34" charset="0"/>
               </a:rPr>
               <a:t>	</a:t>
             </a:r>
-            <a:r>
-              <a:rPr lang="de-DE" altLang="de-DE" sz="2800" dirty="0" err="1" smtClean="0">
-                <a:latin typeface="Calibri" panose="020F0502020204030204" pitchFamily="34" charset="0"/>
-                <a:cs typeface="Calibri" panose="020F0502020204030204" pitchFamily="34" charset="0"/>
-              </a:rPr>
-              <a:t>Normalization</a:t>
-            </a:r>
-            <a:endParaRPr lang="de-DE" altLang="de-DE" sz="2800" dirty="0" smtClean="0">
-              <a:latin typeface="Calibri" panose="020F0502020204030204" pitchFamily="34" charset="0"/>
-              <a:cs typeface="Calibri" panose="020F0502020204030204" pitchFamily="34" charset="0"/>
-            </a:endParaRPr>
-          </a:p>
-          <a:p>
-            <a:r>
-              <a:rPr lang="de-DE" altLang="de-DE" sz="2800" dirty="0" smtClean="0">
-                <a:latin typeface="Calibri" panose="020F0502020204030204" pitchFamily="34" charset="0"/>
-                <a:cs typeface="Calibri" panose="020F0502020204030204" pitchFamily="34" charset="0"/>
-              </a:rPr>
-              <a:t>	</a:t>
-            </a:r>
-            <a:r>
-              <a:rPr lang="de-DE" altLang="de-DE" sz="2800" dirty="0" err="1" smtClean="0">
-                <a:latin typeface="Calibri" panose="020F0502020204030204" pitchFamily="34" charset="0"/>
-                <a:cs typeface="Calibri" panose="020F0502020204030204" pitchFamily="34" charset="0"/>
-              </a:rPr>
-              <a:t>Fully</a:t>
-            </a:r>
-            <a:r>
-              <a:rPr lang="de-DE" altLang="de-DE" sz="2800" dirty="0" smtClean="0">
-                <a:latin typeface="Calibri" panose="020F0502020204030204" pitchFamily="34" charset="0"/>
-                <a:cs typeface="Calibri" panose="020F0502020204030204" pitchFamily="34" charset="0"/>
-              </a:rPr>
-              <a:t> </a:t>
-            </a:r>
-            <a:r>
-              <a:rPr lang="de-DE" altLang="de-DE" sz="2800" dirty="0" err="1" smtClean="0">
-                <a:latin typeface="Calibri" panose="020F0502020204030204" pitchFamily="34" charset="0"/>
-                <a:cs typeface="Calibri" panose="020F0502020204030204" pitchFamily="34" charset="0"/>
-              </a:rPr>
-              <a:t>connected</a:t>
-            </a:r>
-            <a:r>
-              <a:rPr lang="de-DE" altLang="de-DE" sz="2800" dirty="0" smtClean="0">
-                <a:latin typeface="Calibri" panose="020F0502020204030204" pitchFamily="34" charset="0"/>
-                <a:cs typeface="Calibri" panose="020F0502020204030204" pitchFamily="34" charset="0"/>
-              </a:rPr>
-              <a:t> </a:t>
-            </a:r>
-            <a:r>
-              <a:rPr lang="de-DE" altLang="de-DE" sz="2800" dirty="0" err="1" smtClean="0">
-                <a:latin typeface="Calibri" panose="020F0502020204030204" pitchFamily="34" charset="0"/>
-                <a:cs typeface="Calibri" panose="020F0502020204030204" pitchFamily="34" charset="0"/>
-              </a:rPr>
-              <a:t>leyer</a:t>
-            </a:r>
-            <a:endParaRPr lang="de-DE" altLang="de-DE" sz="2800" dirty="0" smtClean="0">
-              <a:latin typeface="Calibri" panose="020F0502020204030204" pitchFamily="34" charset="0"/>
-              <a:cs typeface="Calibri" panose="020F0502020204030204" pitchFamily="34" charset="0"/>
-            </a:endParaRPr>
-          </a:p>
-          <a:p>
-            <a:r>
-              <a:rPr lang="de-DE" altLang="de-DE" sz="2800" dirty="0" err="1" smtClean="0">
-                <a:latin typeface="Calibri" panose="020F0502020204030204" pitchFamily="34" charset="0"/>
-                <a:cs typeface="Calibri" panose="020F0502020204030204" pitchFamily="34" charset="0"/>
-              </a:rPr>
-              <a:t>Using</a:t>
-            </a:r>
-            <a:r>
-              <a:rPr lang="de-DE" altLang="de-DE" sz="2800" dirty="0" smtClean="0">
-                <a:latin typeface="Calibri" panose="020F0502020204030204" pitchFamily="34" charset="0"/>
-                <a:cs typeface="Calibri" panose="020F0502020204030204" pitchFamily="34" charset="0"/>
-              </a:rPr>
-              <a:t> </a:t>
-            </a:r>
-            <a:r>
-              <a:rPr lang="de-DE" altLang="de-DE" sz="2800" dirty="0" err="1" smtClean="0">
-                <a:latin typeface="Calibri" panose="020F0502020204030204" pitchFamily="34" charset="0"/>
-                <a:cs typeface="Calibri" panose="020F0502020204030204" pitchFamily="34" charset="0"/>
-              </a:rPr>
-              <a:t>TensorFlow</a:t>
-            </a:r>
-            <a:r>
-              <a:rPr lang="de-DE" altLang="de-DE" sz="2800" dirty="0" smtClean="0">
-                <a:latin typeface="Calibri" panose="020F0502020204030204" pitchFamily="34" charset="0"/>
-                <a:cs typeface="Calibri" panose="020F0502020204030204" pitchFamily="34" charset="0"/>
-              </a:rPr>
-              <a:t> (TF) </a:t>
-            </a:r>
-            <a:r>
-              <a:rPr lang="de-DE" altLang="de-DE" sz="2800" dirty="0" err="1" smtClean="0">
-                <a:latin typeface="Calibri" panose="020F0502020204030204" pitchFamily="34" charset="0"/>
-                <a:cs typeface="Calibri" panose="020F0502020204030204" pitchFamily="34" charset="0"/>
-              </a:rPr>
-              <a:t>libary</a:t>
-            </a:r>
-            <a:endParaRPr lang="de-DE" altLang="de-DE" sz="2800" dirty="0" smtClean="0">
-              <a:latin typeface="Calibri" panose="020F0502020204030204" pitchFamily="34" charset="0"/>
-              <a:cs typeface="Calibri" panose="020F0502020204030204" pitchFamily="34" charset="0"/>
-            </a:endParaRPr>
-          </a:p>
-          <a:p>
-            <a:pPr marL="0" lvl="1"/>
-            <a:r>
-              <a:rPr lang="de-DE" altLang="de-DE" sz="2800" dirty="0" smtClean="0">
-                <a:latin typeface="Calibri" panose="020F0502020204030204" pitchFamily="34" charset="0"/>
-                <a:cs typeface="Calibri" panose="020F0502020204030204" pitchFamily="34" charset="0"/>
-              </a:rPr>
-              <a:t>	</a:t>
-            </a:r>
-            <a:r>
-              <a:rPr lang="en-US" altLang="de-DE" sz="2800" dirty="0" smtClean="0">
-                <a:latin typeface="Calibri" panose="020F0502020204030204" pitchFamily="34" charset="0"/>
-                <a:cs typeface="Calibri" panose="020F0502020204030204" pitchFamily="34" charset="0"/>
-              </a:rPr>
-              <a:t>Detailed documentation</a:t>
-            </a:r>
-          </a:p>
-          <a:p>
-            <a:pPr marL="0" lvl="1"/>
-            <a:r>
-              <a:rPr lang="en-US" altLang="de-DE" sz="2800" dirty="0" smtClean="0">
-                <a:latin typeface="Calibri" panose="020F0502020204030204" pitchFamily="34" charset="0"/>
-                <a:cs typeface="Calibri" panose="020F0502020204030204" pitchFamily="34" charset="0"/>
-              </a:rPr>
-              <a:t>	Create layers</a:t>
-            </a:r>
-          </a:p>
-          <a:p>
-            <a:pPr marL="0" lvl="1"/>
-            <a:r>
-              <a:rPr lang="en-US" altLang="de-DE" sz="2800" dirty="0" smtClean="0">
-                <a:latin typeface="Calibri" panose="020F0502020204030204" pitchFamily="34" charset="0"/>
-                <a:cs typeface="Calibri" panose="020F0502020204030204" pitchFamily="34" charset="0"/>
-              </a:rPr>
-              <a:t>	Possibility of composite layers</a:t>
-            </a:r>
-            <a:endParaRPr lang="de-DE" altLang="de-DE" sz="2800" dirty="0" smtClean="0">
-              <a:latin typeface="Calibri" panose="020F0502020204030204" pitchFamily="34" charset="0"/>
-              <a:cs typeface="Calibri" panose="020F0502020204030204" pitchFamily="34" charset="0"/>
-            </a:endParaRPr>
-          </a:p>
-          <a:p>
-            <a:r>
-              <a:rPr lang="de-DE" altLang="de-DE" sz="2800" dirty="0" smtClean="0">
-                <a:latin typeface="Calibri" panose="020F0502020204030204" pitchFamily="34" charset="0"/>
-                <a:cs typeface="Calibri" panose="020F0502020204030204" pitchFamily="34" charset="0"/>
-              </a:rPr>
-              <a:t>	</a:t>
-            </a:r>
-          </a:p>
-          <a:p>
-            <a:endParaRPr lang="de-DE" altLang="de-DE" sz="2800" dirty="0" smtClean="0">
+          </a:p>
+          <a:p>
+            <a:endParaRPr lang="en-US" altLang="de-DE" sz="2800" dirty="0" smtClean="0">
               <a:latin typeface="Calibri" panose="020F0502020204030204" pitchFamily="34" charset="0"/>
               <a:cs typeface="Calibri" panose="020F0502020204030204" pitchFamily="34" charset="0"/>
             </a:endParaRPr>
@@ -6511,15 +6411,7 @@
             <a:pPr algn="ctr"/>
             <a:r>
               <a:rPr lang="en-GB" sz="1000" dirty="0" smtClean="0"/>
-              <a:t>Init. Phi </a:t>
-            </a:r>
-            <a:r>
-              <a:rPr lang="en-GB" sz="1000" dirty="0" smtClean="0"/>
-              <a:t>f</a:t>
-            </a:r>
-            <a:r>
-              <a:rPr lang="en-GB" sz="1000" dirty="0" smtClean="0"/>
-              <a:t>unction</a:t>
+              <a:t>Init. Phi function</a:t>
             </a:r>
             <a:endParaRPr lang="en-GB" sz="1000" dirty="0"/>
           </a:p>
@@ -6607,11 +6499,7 @@
             <a:pPr algn="ctr"/>
             <a:r>
               <a:rPr lang="en-GB" sz="1000" dirty="0" smtClean="0"/>
-              <a:t>Restart </a:t>
-            </a:r>
-            <a:r>
-              <a:rPr lang="en-GB" sz="1000" dirty="0" smtClean="0"/>
-              <a:t>Game</a:t>
+              <a:t>Restart Game</a:t>
             </a:r>
             <a:endParaRPr lang="en-GB" sz="1000" dirty="0"/>
           </a:p>
@@ -7944,7 +7832,7 @@
                             </p:stCondLst>
                             <p:childTnLst>
                               <p:par>
-                                <p:cTn id="9" presetID="6" presetClass="emph" presetSubtype="0" fill="hold" grpId="0" nodeType="clickEffect">
+                                <p:cTn id="9" presetID="6" presetClass="emph" presetSubtype="0" fill="hold" nodeType="clickEffect">
                                   <p:stCondLst>
                                     <p:cond delay="0"/>
                                   </p:stCondLst>
@@ -8363,78 +8251,6 @@
                       </p:childTnLst>
                     </p:cTn>
                   </p:par>
-                  <p:par>
-                    <p:cTn id="55" fill="hold">
-                      <p:stCondLst>
-                        <p:cond delay="indefinite"/>
-                      </p:stCondLst>
-                      <p:childTnLst>
-                        <p:par>
-                          <p:cTn id="56" fill="hold">
-                            <p:stCondLst>
-                              <p:cond delay="0"/>
-                            </p:stCondLst>
-                            <p:childTnLst>
-                              <p:par>
-                                <p:cTn id="57" presetID="6" presetClass="emph" presetSubtype="0" fill="hold" grpId="0" nodeType="clickEffect">
-                                  <p:stCondLst>
-                                    <p:cond delay="0"/>
-                                  </p:stCondLst>
-                                  <p:childTnLst>
-                                    <p:animScale>
-                                      <p:cBhvr>
-                                        <p:cTn id="58" dur="2000" fill="hold"/>
-                                        <p:tgtEl>
-                                          <p:spTgt spid="25"/>
-                                        </p:tgtEl>
-                                      </p:cBhvr>
-                                      <p:by x="150000" y="150000"/>
-                                    </p:animScale>
-                                  </p:childTnLst>
-                                </p:cTn>
-                              </p:par>
-                            </p:childTnLst>
-                          </p:cTn>
-                        </p:par>
-                      </p:childTnLst>
-                    </p:cTn>
-                  </p:par>
-                  <p:par>
-                    <p:cTn id="59" fill="hold">
-                      <p:stCondLst>
-                        <p:cond delay="indefinite"/>
-                      </p:stCondLst>
-                      <p:childTnLst>
-                        <p:par>
-                          <p:cTn id="60" fill="hold">
-                            <p:stCondLst>
-                              <p:cond delay="0"/>
-                            </p:stCondLst>
-                            <p:childTnLst>
-                              <p:par>
-                                <p:cTn id="61" presetID="6" presetClass="emph" presetSubtype="0" fill="hold" grpId="0" nodeType="clickEffect">
-                                  <p:stCondLst>
-                                    <p:cond delay="0"/>
-                                  </p:stCondLst>
-                                  <p:childTnLst>
-                                    <p:animScale>
-                                      <p:cBhvr>
-                                        <p:cTn id="62" dur="2000" fill="hold"/>
-                                        <p:tgtEl>
-                                          <p:spTgt spid="7"/>
-                                        </p:tgtEl>
-                                      </p:cBhvr>
-                                      <p:by x="150000" y="150000"/>
-                                    </p:animScale>
-                                  </p:childTnLst>
-                                </p:cTn>
-                              </p:par>
-                            </p:childTnLst>
-                          </p:cTn>
-                        </p:par>
-                      </p:childTnLst>
-                    </p:cTn>
-                  </p:par>
                 </p:childTnLst>
               </p:cTn>
               <p:prevCondLst>
@@ -8457,7 +8273,6 @@
       </p:par>
     </p:tnLst>
     <p:bldLst>
-      <p:bldP spid="7" grpId="0" animBg="1"/>
       <p:bldP spid="9" grpId="0" animBg="1"/>
       <p:bldP spid="12" grpId="0" animBg="1"/>
       <p:bldP spid="13" grpId="0" animBg="1"/>
@@ -8470,7 +8285,6 @@
       <p:bldP spid="22" grpId="0" animBg="1"/>
       <p:bldP spid="23" grpId="0" animBg="1"/>
       <p:bldP spid="24" grpId="0" animBg="1"/>
-      <p:bldP spid="25" grpId="0" animBg="1"/>
     </p:bldLst>
   </p:timing>
 </p:sld>
@@ -8572,12 +8386,69 @@
           <a:bodyPr/>
           <a:lstStyle/>
           <a:p>
+            <a:endParaRPr lang="de-DE" altLang="de-DE" sz="2800" dirty="0" smtClean="0">
+              <a:latin typeface="Calibri" panose="020F0502020204030204" pitchFamily="34" charset="0"/>
+              <a:cs typeface="Calibri" panose="020F0502020204030204" pitchFamily="34" charset="0"/>
+            </a:endParaRPr>
+          </a:p>
+          <a:p>
+            <a:endParaRPr lang="de-DE" altLang="de-DE" sz="2800" dirty="0" smtClean="0">
+              <a:latin typeface="Calibri" panose="020F0502020204030204" pitchFamily="34" charset="0"/>
+              <a:cs typeface="Calibri" panose="020F0502020204030204" pitchFamily="34" charset="0"/>
+            </a:endParaRPr>
+          </a:p>
+          <a:p>
+            <a:endParaRPr lang="en-US" sz="2800" spc="-1" dirty="0">
+              <a:solidFill>
+                <a:srgbClr val="000000"/>
+              </a:solidFill>
+              <a:uFill>
+                <a:solidFill>
+                  <a:srgbClr val="FFFFFF"/>
+                </a:solidFill>
+              </a:uFill>
+              <a:latin typeface="Calibri"/>
+              <a:sym typeface="Wingdings" panose="05000000000000000000" pitchFamily="2" charset="2"/>
+            </a:endParaRPr>
+          </a:p>
+        </p:txBody>
+      </p:sp>
+      <p:sp>
+        <p:nvSpPr>
+          <p:cNvPr id="4" name="TextShape 2"/>
+          <p:cNvSpPr txBox="1"/>
+          <p:nvPr/>
+        </p:nvSpPr>
+        <p:spPr>
+          <a:xfrm>
+            <a:off x="780960" y="1556792"/>
+            <a:ext cx="7886520" cy="4772128"/>
+          </a:xfrm>
+          <a:prstGeom prst="rect">
+            <a:avLst/>
+          </a:prstGeom>
+          <a:noFill/>
+          <a:ln>
+            <a:noFill/>
+          </a:ln>
+        </p:spPr>
+        <p:txBody>
+          <a:bodyPr/>
+          <a:lstStyle/>
+          <a:p>
+            <a:r>
+              <a:rPr lang="de-DE" altLang="de-DE" sz="2800" dirty="0" smtClean="0">
+                <a:latin typeface="Calibri" panose="020F0502020204030204" pitchFamily="34" charset="0"/>
+                <a:cs typeface="Calibri" panose="020F0502020204030204" pitchFamily="34" charset="0"/>
+              </a:rPr>
+              <a:t>Last </a:t>
+            </a:r>
             <a:r>
               <a:rPr lang="de-DE" altLang="de-DE" sz="2800" dirty="0" err="1" smtClean="0">
                 <a:latin typeface="Calibri" panose="020F0502020204030204" pitchFamily="34" charset="0"/>
                 <a:cs typeface="Calibri" panose="020F0502020204030204" pitchFamily="34" charset="0"/>
               </a:rPr>
-              <a:t>Algorithm</a:t>
+              <a:t>week</a:t>
             </a:r>
             <a:r>
               <a:rPr lang="de-DE" altLang="de-DE" sz="2800" dirty="0" smtClean="0">
@@ -8591,41 +8462,71 @@
                 <a:latin typeface="Calibri" panose="020F0502020204030204" pitchFamily="34" charset="0"/>
                 <a:cs typeface="Calibri" panose="020F0502020204030204" pitchFamily="34" charset="0"/>
               </a:rPr>
-              <a:t>from</a:t>
+              <a:t>testing</a:t>
             </a:r>
             <a:r>
               <a:rPr lang="de-DE" altLang="de-DE" sz="2800" dirty="0" smtClean="0">
                 <a:latin typeface="Calibri" panose="020F0502020204030204" pitchFamily="34" charset="0"/>
                 <a:cs typeface="Calibri" panose="020F0502020204030204" pitchFamily="34" charset="0"/>
               </a:rPr>
-              <a:t> „</a:t>
+              <a:t> </a:t>
             </a:r>
             <a:r>
               <a:rPr lang="de-DE" altLang="de-DE" sz="2800" dirty="0" err="1" smtClean="0">
                 <a:latin typeface="Calibri" panose="020F0502020204030204" pitchFamily="34" charset="0"/>
                 <a:cs typeface="Calibri" panose="020F0502020204030204" pitchFamily="34" charset="0"/>
               </a:rPr>
-              <a:t>Playing</a:t>
+              <a:t>for</a:t>
             </a:r>
             <a:r>
               <a:rPr lang="de-DE" altLang="de-DE" sz="2800" dirty="0" smtClean="0">
                 <a:latin typeface="Calibri" panose="020F0502020204030204" pitchFamily="34" charset="0"/>
                 <a:cs typeface="Calibri" panose="020F0502020204030204" pitchFamily="34" charset="0"/>
               </a:rPr>
-              <a:t> Atari </a:t>
+              <a:t> a </a:t>
             </a:r>
             <a:r>
               <a:rPr lang="de-DE" altLang="de-DE" sz="2800" dirty="0" err="1" smtClean="0">
                 <a:latin typeface="Calibri" panose="020F0502020204030204" pitchFamily="34" charset="0"/>
                 <a:cs typeface="Calibri" panose="020F0502020204030204" pitchFamily="34" charset="0"/>
               </a:rPr>
-              <a:t>with</a:t>
+              <a:t>short</a:t>
             </a:r>
             <a:r>
               <a:rPr lang="de-DE" altLang="de-DE" sz="2800" dirty="0" smtClean="0">
                 <a:latin typeface="Calibri" panose="020F0502020204030204" pitchFamily="34" charset="0"/>
                 <a:cs typeface="Calibri" panose="020F0502020204030204" pitchFamily="34" charset="0"/>
               </a:rPr>
+              <a:t> time</a:t>
+            </a:r>
+          </a:p>
+          <a:p>
+            <a:r>
+              <a:rPr lang="de-DE" altLang="de-DE" sz="2800" dirty="0" smtClean="0">
+                <a:latin typeface="Calibri" panose="020F0502020204030204" pitchFamily="34" charset="0"/>
+                <a:cs typeface="Calibri" panose="020F0502020204030204" pitchFamily="34" charset="0"/>
+              </a:rPr>
+              <a:t>	</a:t>
+            </a:r>
+            <a:r>
+              <a:rPr lang="de-DE" altLang="de-DE" sz="2800" dirty="0" smtClean="0">
+                <a:latin typeface="Calibri" panose="020F0502020204030204" pitchFamily="34" charset="0"/>
+                <a:cs typeface="Calibri" panose="020F0502020204030204" pitchFamily="34" charset="0"/>
+              </a:rPr>
+              <a:t>-&gt; </a:t>
+            </a:r>
+            <a:r>
+              <a:rPr lang="de-DE" altLang="de-DE" sz="2800" dirty="0" err="1" smtClean="0">
+                <a:latin typeface="Calibri" panose="020F0502020204030204" pitchFamily="34" charset="0"/>
+                <a:cs typeface="Calibri" panose="020F0502020204030204" pitchFamily="34" charset="0"/>
+              </a:rPr>
+              <a:t>no</a:t>
+            </a:r>
+            <a:r>
+              <a:rPr lang="de-DE" altLang="de-DE" sz="2800" dirty="0" smtClean="0">
+                <a:latin typeface="Calibri" panose="020F0502020204030204" pitchFamily="34" charset="0"/>
+                <a:cs typeface="Calibri" panose="020F0502020204030204" pitchFamily="34" charset="0"/>
+              </a:rPr>
               <a:t> </a:t>
             </a:r>
             <a:r>
@@ -8633,14 +8534,450 @@
                 <a:latin typeface="Calibri" panose="020F0502020204030204" pitchFamily="34" charset="0"/>
                 <a:cs typeface="Calibri" panose="020F0502020204030204" pitchFamily="34" charset="0"/>
               </a:rPr>
-              <a:t>Deep</a:t>
+              <a:t>good</a:t>
             </a:r>
             <a:r>
               <a:rPr lang="de-DE" altLang="de-DE" sz="2800" dirty="0" smtClean="0">
                 <a:latin typeface="Calibri" panose="020F0502020204030204" pitchFamily="34" charset="0"/>
                 <a:cs typeface="Calibri" panose="020F0502020204030204" pitchFamily="34" charset="0"/>
               </a:rPr>
-              <a:t> Reinforcement Learning“:</a:t>
+              <a:t> </a:t>
+            </a:r>
+            <a:r>
+              <a:rPr lang="de-DE" altLang="de-DE" sz="2800" dirty="0" err="1" smtClean="0">
+                <a:latin typeface="Calibri" panose="020F0502020204030204" pitchFamily="34" charset="0"/>
+                <a:cs typeface="Calibri" panose="020F0502020204030204" pitchFamily="34" charset="0"/>
+              </a:rPr>
+              <a:t>results</a:t>
+            </a:r>
+            <a:endParaRPr lang="de-DE" altLang="de-DE" sz="2800" dirty="0" smtClean="0">
+              <a:latin typeface="Calibri" panose="020F0502020204030204" pitchFamily="34" charset="0"/>
+              <a:cs typeface="Calibri" panose="020F0502020204030204" pitchFamily="34" charset="0"/>
+            </a:endParaRPr>
+          </a:p>
+          <a:p>
+            <a:r>
+              <a:rPr lang="de-DE" altLang="de-DE" sz="2800" dirty="0" err="1" smtClean="0">
+                <a:latin typeface="Calibri" panose="020F0502020204030204" pitchFamily="34" charset="0"/>
+                <a:cs typeface="Calibri" panose="020F0502020204030204" pitchFamily="34" charset="0"/>
+              </a:rPr>
+              <a:t>This</a:t>
+            </a:r>
+            <a:r>
+              <a:rPr lang="de-DE" altLang="de-DE" sz="2800" dirty="0" smtClean="0">
+                <a:latin typeface="Calibri" panose="020F0502020204030204" pitchFamily="34" charset="0"/>
+                <a:cs typeface="Calibri" panose="020F0502020204030204" pitchFamily="34" charset="0"/>
+              </a:rPr>
+              <a:t> </a:t>
+            </a:r>
+            <a:r>
+              <a:rPr lang="de-DE" altLang="de-DE" sz="2800" dirty="0" err="1" smtClean="0">
+                <a:latin typeface="Calibri" panose="020F0502020204030204" pitchFamily="34" charset="0"/>
+                <a:cs typeface="Calibri" panose="020F0502020204030204" pitchFamily="34" charset="0"/>
+              </a:rPr>
+              <a:t>week</a:t>
+            </a:r>
+            <a:r>
+              <a:rPr lang="de-DE" altLang="de-DE" sz="2800" dirty="0" smtClean="0">
+                <a:latin typeface="Calibri" panose="020F0502020204030204" pitchFamily="34" charset="0"/>
+                <a:cs typeface="Calibri" panose="020F0502020204030204" pitchFamily="34" charset="0"/>
+              </a:rPr>
+              <a:t> </a:t>
+            </a:r>
+            <a:r>
+              <a:rPr lang="de-DE" altLang="de-DE" sz="2800" dirty="0" err="1" smtClean="0">
+                <a:latin typeface="Calibri" panose="020F0502020204030204" pitchFamily="34" charset="0"/>
+                <a:cs typeface="Calibri" panose="020F0502020204030204" pitchFamily="34" charset="0"/>
+              </a:rPr>
+              <a:t>testing</a:t>
+            </a:r>
+            <a:r>
+              <a:rPr lang="de-DE" altLang="de-DE" sz="2800" dirty="0" smtClean="0">
+                <a:latin typeface="Calibri" panose="020F0502020204030204" pitchFamily="34" charset="0"/>
+                <a:cs typeface="Calibri" panose="020F0502020204030204" pitchFamily="34" charset="0"/>
+              </a:rPr>
+              <a:t> </a:t>
+            </a:r>
+            <a:r>
+              <a:rPr lang="de-DE" altLang="de-DE" sz="2800" dirty="0" err="1" smtClean="0">
+                <a:latin typeface="Calibri" panose="020F0502020204030204" pitchFamily="34" charset="0"/>
+                <a:cs typeface="Calibri" panose="020F0502020204030204" pitchFamily="34" charset="0"/>
+              </a:rPr>
+              <a:t>for</a:t>
+            </a:r>
+            <a:r>
+              <a:rPr lang="de-DE" altLang="de-DE" sz="2800" dirty="0" smtClean="0">
+                <a:latin typeface="Calibri" panose="020F0502020204030204" pitchFamily="34" charset="0"/>
+                <a:cs typeface="Calibri" panose="020F0502020204030204" pitchFamily="34" charset="0"/>
+              </a:rPr>
+              <a:t> </a:t>
+            </a:r>
+            <a:r>
+              <a:rPr lang="de-DE" altLang="de-DE" sz="2800" dirty="0" err="1" smtClean="0">
+                <a:latin typeface="Calibri" panose="020F0502020204030204" pitchFamily="34" charset="0"/>
+                <a:cs typeface="Calibri" panose="020F0502020204030204" pitchFamily="34" charset="0"/>
+              </a:rPr>
+              <a:t>longer</a:t>
+            </a:r>
+            <a:r>
+              <a:rPr lang="de-DE" altLang="de-DE" sz="2800" dirty="0" smtClean="0">
+                <a:latin typeface="Calibri" panose="020F0502020204030204" pitchFamily="34" charset="0"/>
+                <a:cs typeface="Calibri" panose="020F0502020204030204" pitchFamily="34" charset="0"/>
+              </a:rPr>
+              <a:t> time</a:t>
+            </a:r>
+          </a:p>
+          <a:p>
+            <a:r>
+              <a:rPr lang="de-DE" altLang="de-DE" sz="2800" dirty="0" smtClean="0">
+                <a:latin typeface="Calibri" panose="020F0502020204030204" pitchFamily="34" charset="0"/>
+                <a:cs typeface="Calibri" panose="020F0502020204030204" pitchFamily="34" charset="0"/>
+              </a:rPr>
+              <a:t>	</a:t>
+            </a:r>
+            <a:r>
+              <a:rPr lang="de-DE" altLang="de-DE" sz="2800" dirty="0" smtClean="0">
+                <a:latin typeface="Calibri" panose="020F0502020204030204" pitchFamily="34" charset="0"/>
+                <a:cs typeface="Calibri" panose="020F0502020204030204" pitchFamily="34" charset="0"/>
+              </a:rPr>
+              <a:t>-&gt; still </a:t>
+            </a:r>
+            <a:r>
+              <a:rPr lang="de-DE" altLang="de-DE" sz="2800" dirty="0" err="1" smtClean="0">
+                <a:latin typeface="Calibri" panose="020F0502020204030204" pitchFamily="34" charset="0"/>
+                <a:cs typeface="Calibri" panose="020F0502020204030204" pitchFamily="34" charset="0"/>
+              </a:rPr>
+              <a:t>no</a:t>
+            </a:r>
+            <a:r>
+              <a:rPr lang="de-DE" altLang="de-DE" sz="2800" dirty="0" smtClean="0">
+                <a:latin typeface="Calibri" panose="020F0502020204030204" pitchFamily="34" charset="0"/>
+                <a:cs typeface="Calibri" panose="020F0502020204030204" pitchFamily="34" charset="0"/>
+              </a:rPr>
+              <a:t> </a:t>
+            </a:r>
+            <a:r>
+              <a:rPr lang="de-DE" altLang="de-DE" sz="2800" dirty="0" err="1" smtClean="0">
+                <a:latin typeface="Calibri" panose="020F0502020204030204" pitchFamily="34" charset="0"/>
+                <a:cs typeface="Calibri" panose="020F0502020204030204" pitchFamily="34" charset="0"/>
+              </a:rPr>
+              <a:t>good</a:t>
+            </a:r>
+            <a:r>
+              <a:rPr lang="de-DE" altLang="de-DE" sz="2800" dirty="0" smtClean="0">
+                <a:latin typeface="Calibri" panose="020F0502020204030204" pitchFamily="34" charset="0"/>
+                <a:cs typeface="Calibri" panose="020F0502020204030204" pitchFamily="34" charset="0"/>
+              </a:rPr>
+              <a:t> </a:t>
+            </a:r>
+            <a:r>
+              <a:rPr lang="de-DE" altLang="de-DE" sz="2800" dirty="0" err="1" smtClean="0">
+                <a:latin typeface="Calibri" panose="020F0502020204030204" pitchFamily="34" charset="0"/>
+                <a:cs typeface="Calibri" panose="020F0502020204030204" pitchFamily="34" charset="0"/>
+              </a:rPr>
+              <a:t>results</a:t>
+            </a:r>
+            <a:endParaRPr lang="de-DE" altLang="de-DE" sz="2800" dirty="0" smtClean="0">
+              <a:latin typeface="Calibri" panose="020F0502020204030204" pitchFamily="34" charset="0"/>
+              <a:cs typeface="Calibri" panose="020F0502020204030204" pitchFamily="34" charset="0"/>
+            </a:endParaRPr>
+          </a:p>
+          <a:p>
+            <a:endParaRPr lang="de-DE" altLang="de-DE" sz="2800" dirty="0" smtClean="0">
+              <a:latin typeface="Calibri" panose="020F0502020204030204" pitchFamily="34" charset="0"/>
+              <a:cs typeface="Calibri" panose="020F0502020204030204" pitchFamily="34" charset="0"/>
+            </a:endParaRPr>
+          </a:p>
+          <a:p>
+            <a:r>
+              <a:rPr lang="de-DE" altLang="de-DE" sz="2800" dirty="0" err="1" smtClean="0">
+                <a:latin typeface="Calibri" panose="020F0502020204030204" pitchFamily="34" charset="0"/>
+                <a:cs typeface="Calibri" panose="020F0502020204030204" pitchFamily="34" charset="0"/>
+              </a:rPr>
+              <a:t>Improvements</a:t>
+            </a:r>
+            <a:endParaRPr lang="de-DE" altLang="de-DE" sz="2800" dirty="0" smtClean="0">
+              <a:latin typeface="Calibri" panose="020F0502020204030204" pitchFamily="34" charset="0"/>
+              <a:cs typeface="Calibri" panose="020F0502020204030204" pitchFamily="34" charset="0"/>
+            </a:endParaRPr>
+          </a:p>
+          <a:p>
+            <a:r>
+              <a:rPr lang="de-DE" altLang="de-DE" sz="2800" dirty="0" smtClean="0">
+                <a:latin typeface="Calibri" panose="020F0502020204030204" pitchFamily="34" charset="0"/>
+                <a:cs typeface="Calibri" panose="020F0502020204030204" pitchFamily="34" charset="0"/>
+              </a:rPr>
+              <a:t>	</a:t>
+            </a:r>
+            <a:r>
+              <a:rPr lang="de-DE" altLang="de-DE" sz="2800" dirty="0" smtClean="0">
+                <a:latin typeface="Calibri" panose="020F0502020204030204" pitchFamily="34" charset="0"/>
+                <a:cs typeface="Calibri" panose="020F0502020204030204" pitchFamily="34" charset="0"/>
+              </a:rPr>
+              <a:t>-&gt; </a:t>
+            </a:r>
+            <a:r>
+              <a:rPr lang="de-DE" altLang="de-DE" sz="2800" dirty="0" err="1" smtClean="0">
+                <a:latin typeface="Calibri" panose="020F0502020204030204" pitchFamily="34" charset="0"/>
+                <a:cs typeface="Calibri" panose="020F0502020204030204" pitchFamily="34" charset="0"/>
+              </a:rPr>
+              <a:t>Debuged</a:t>
+            </a:r>
+            <a:r>
+              <a:rPr lang="de-DE" altLang="de-DE" sz="2800" dirty="0" smtClean="0">
+                <a:latin typeface="Calibri" panose="020F0502020204030204" pitchFamily="34" charset="0"/>
+                <a:cs typeface="Calibri" panose="020F0502020204030204" pitchFamily="34" charset="0"/>
+              </a:rPr>
+              <a:t> </a:t>
+            </a:r>
+            <a:r>
+              <a:rPr lang="de-DE" altLang="de-DE" sz="2800" dirty="0" err="1" smtClean="0">
+                <a:latin typeface="Calibri" panose="020F0502020204030204" pitchFamily="34" charset="0"/>
+                <a:cs typeface="Calibri" panose="020F0502020204030204" pitchFamily="34" charset="0"/>
+              </a:rPr>
+              <a:t>the</a:t>
+            </a:r>
+            <a:r>
+              <a:rPr lang="de-DE" altLang="de-DE" sz="2800" dirty="0" smtClean="0">
+                <a:latin typeface="Calibri" panose="020F0502020204030204" pitchFamily="34" charset="0"/>
+                <a:cs typeface="Calibri" panose="020F0502020204030204" pitchFamily="34" charset="0"/>
+              </a:rPr>
+              <a:t> </a:t>
+            </a:r>
+            <a:r>
+              <a:rPr lang="de-DE" altLang="de-DE" sz="2800" dirty="0" err="1" smtClean="0">
+                <a:latin typeface="Calibri" panose="020F0502020204030204" pitchFamily="34" charset="0"/>
+                <a:cs typeface="Calibri" panose="020F0502020204030204" pitchFamily="34" charset="0"/>
+              </a:rPr>
+              <a:t>code</a:t>
+            </a:r>
+            <a:endParaRPr lang="de-DE" altLang="de-DE" sz="2800" dirty="0" smtClean="0">
+              <a:latin typeface="Calibri" panose="020F0502020204030204" pitchFamily="34" charset="0"/>
+              <a:cs typeface="Calibri" panose="020F0502020204030204" pitchFamily="34" charset="0"/>
+            </a:endParaRPr>
+          </a:p>
+          <a:p>
+            <a:r>
+              <a:rPr lang="de-DE" altLang="de-DE" sz="2800" dirty="0" smtClean="0">
+                <a:latin typeface="Calibri" panose="020F0502020204030204" pitchFamily="34" charset="0"/>
+                <a:cs typeface="Calibri" panose="020F0502020204030204" pitchFamily="34" charset="0"/>
+              </a:rPr>
+              <a:t>	</a:t>
+            </a:r>
+            <a:r>
+              <a:rPr lang="de-DE" altLang="de-DE" sz="2800" dirty="0" smtClean="0">
+                <a:latin typeface="Calibri" panose="020F0502020204030204" pitchFamily="34" charset="0"/>
+                <a:cs typeface="Calibri" panose="020F0502020204030204" pitchFamily="34" charset="0"/>
+              </a:rPr>
+              <a:t>-&gt; Change # </a:t>
+            </a:r>
+            <a:r>
+              <a:rPr lang="de-DE" altLang="de-DE" sz="2800" dirty="0" err="1" smtClean="0">
+                <a:latin typeface="Calibri" panose="020F0502020204030204" pitchFamily="34" charset="0"/>
+                <a:cs typeface="Calibri" panose="020F0502020204030204" pitchFamily="34" charset="0"/>
+              </a:rPr>
+              <a:t>actions</a:t>
+            </a:r>
+            <a:endParaRPr lang="de-DE" altLang="de-DE" sz="2800" dirty="0" smtClean="0">
+              <a:latin typeface="Calibri" panose="020F0502020204030204" pitchFamily="34" charset="0"/>
+              <a:cs typeface="Calibri" panose="020F0502020204030204" pitchFamily="34" charset="0"/>
+            </a:endParaRPr>
+          </a:p>
+          <a:p>
+            <a:r>
+              <a:rPr lang="de-DE" altLang="de-DE" sz="2800" dirty="0" smtClean="0">
+                <a:latin typeface="Calibri" panose="020F0502020204030204" pitchFamily="34" charset="0"/>
+                <a:cs typeface="Calibri" panose="020F0502020204030204" pitchFamily="34" charset="0"/>
+              </a:rPr>
+              <a:t>	</a:t>
+            </a:r>
+            <a:r>
+              <a:rPr lang="de-DE" altLang="de-DE" sz="2800" dirty="0" smtClean="0">
+                <a:latin typeface="Calibri" panose="020F0502020204030204" pitchFamily="34" charset="0"/>
+                <a:cs typeface="Calibri" panose="020F0502020204030204" pitchFamily="34" charset="0"/>
+              </a:rPr>
+              <a:t>-&gt; Change </a:t>
+            </a:r>
+            <a:r>
+              <a:rPr lang="de-DE" altLang="de-DE" sz="2800" dirty="0" err="1" smtClean="0">
+                <a:latin typeface="Calibri" panose="020F0502020204030204" pitchFamily="34" charset="0"/>
+                <a:cs typeface="Calibri" panose="020F0502020204030204" pitchFamily="34" charset="0"/>
+              </a:rPr>
+              <a:t>input</a:t>
+            </a:r>
+            <a:r>
+              <a:rPr lang="de-DE" altLang="de-DE" sz="2800" dirty="0" smtClean="0">
+                <a:latin typeface="Calibri" panose="020F0502020204030204" pitchFamily="34" charset="0"/>
+                <a:cs typeface="Calibri" panose="020F0502020204030204" pitchFamily="34" charset="0"/>
+              </a:rPr>
+              <a:t> </a:t>
+            </a:r>
+            <a:r>
+              <a:rPr lang="de-DE" altLang="de-DE" sz="2800" dirty="0" err="1" smtClean="0">
+                <a:latin typeface="Calibri" panose="020F0502020204030204" pitchFamily="34" charset="0"/>
+                <a:cs typeface="Calibri" panose="020F0502020204030204" pitchFamily="34" charset="0"/>
+              </a:rPr>
+              <a:t>data</a:t>
+            </a:r>
+            <a:r>
+              <a:rPr lang="de-DE" altLang="de-DE" sz="2800" dirty="0" smtClean="0">
+                <a:latin typeface="Calibri" panose="020F0502020204030204" pitchFamily="34" charset="0"/>
+                <a:cs typeface="Calibri" panose="020F0502020204030204" pitchFamily="34" charset="0"/>
+              </a:rPr>
+              <a:t> </a:t>
+            </a:r>
+            <a:r>
+              <a:rPr lang="de-DE" altLang="de-DE" sz="2800" dirty="0" err="1" smtClean="0">
+                <a:latin typeface="Calibri" panose="020F0502020204030204" pitchFamily="34" charset="0"/>
+                <a:cs typeface="Calibri" panose="020F0502020204030204" pitchFamily="34" charset="0"/>
+              </a:rPr>
+              <a:t>for</a:t>
+            </a:r>
+            <a:r>
+              <a:rPr lang="de-DE" altLang="de-DE" sz="2800" dirty="0" smtClean="0">
+                <a:latin typeface="Calibri" panose="020F0502020204030204" pitchFamily="34" charset="0"/>
+                <a:cs typeface="Calibri" panose="020F0502020204030204" pitchFamily="34" charset="0"/>
+              </a:rPr>
+              <a:t> </a:t>
+            </a:r>
+            <a:r>
+              <a:rPr lang="de-DE" altLang="de-DE" sz="2800" dirty="0" err="1" smtClean="0">
+                <a:latin typeface="Calibri" panose="020F0502020204030204" pitchFamily="34" charset="0"/>
+                <a:cs typeface="Calibri" panose="020F0502020204030204" pitchFamily="34" charset="0"/>
+              </a:rPr>
+              <a:t>training</a:t>
+            </a:r>
+            <a:endParaRPr lang="de-DE" altLang="de-DE" sz="2800" dirty="0" smtClean="0">
+              <a:latin typeface="Calibri" panose="020F0502020204030204" pitchFamily="34" charset="0"/>
+              <a:cs typeface="Calibri" panose="020F0502020204030204" pitchFamily="34" charset="0"/>
+            </a:endParaRPr>
+          </a:p>
+          <a:p>
+            <a:r>
+              <a:rPr lang="de-DE" altLang="de-DE" sz="2800" dirty="0" smtClean="0">
+                <a:latin typeface="Calibri" panose="020F0502020204030204" pitchFamily="34" charset="0"/>
+                <a:cs typeface="Calibri" panose="020F0502020204030204" pitchFamily="34" charset="0"/>
+              </a:rPr>
+              <a:t>	</a:t>
+            </a:r>
+            <a:r>
+              <a:rPr lang="de-DE" altLang="de-DE" sz="2800" dirty="0" smtClean="0">
+                <a:latin typeface="Calibri" panose="020F0502020204030204" pitchFamily="34" charset="0"/>
+                <a:cs typeface="Calibri" panose="020F0502020204030204" pitchFamily="34" charset="0"/>
+              </a:rPr>
+              <a:t>-&gt; </a:t>
+            </a:r>
+            <a:r>
+              <a:rPr lang="de-DE" altLang="de-DE" sz="2800" dirty="0" err="1" smtClean="0">
+                <a:latin typeface="Calibri" panose="020F0502020204030204" pitchFamily="34" charset="0"/>
+                <a:cs typeface="Calibri" panose="020F0502020204030204" pitchFamily="34" charset="0"/>
+              </a:rPr>
+              <a:t>Normalized</a:t>
+            </a:r>
+            <a:r>
+              <a:rPr lang="de-DE" altLang="de-DE" sz="2800" dirty="0" smtClean="0">
+                <a:latin typeface="Calibri" panose="020F0502020204030204" pitchFamily="34" charset="0"/>
+                <a:cs typeface="Calibri" panose="020F0502020204030204" pitchFamily="34" charset="0"/>
+              </a:rPr>
+              <a:t> Screen </a:t>
+            </a:r>
+            <a:r>
+              <a:rPr lang="de-DE" altLang="de-DE" sz="2800" dirty="0" err="1" smtClean="0">
+                <a:latin typeface="Calibri" panose="020F0502020204030204" pitchFamily="34" charset="0"/>
+                <a:cs typeface="Calibri" panose="020F0502020204030204" pitchFamily="34" charset="0"/>
+              </a:rPr>
+              <a:t>values</a:t>
+            </a:r>
+            <a:endParaRPr lang="de-DE" altLang="de-DE" sz="2800" dirty="0" smtClean="0">
+              <a:latin typeface="Calibri" panose="020F0502020204030204" pitchFamily="34" charset="0"/>
+              <a:cs typeface="Calibri" panose="020F0502020204030204" pitchFamily="34" charset="0"/>
+            </a:endParaRPr>
+          </a:p>
+          <a:p>
+            <a:r>
+              <a:rPr lang="de-DE" altLang="de-DE" sz="2800" dirty="0" smtClean="0">
+                <a:latin typeface="Calibri" panose="020F0502020204030204" pitchFamily="34" charset="0"/>
+                <a:cs typeface="Calibri" panose="020F0502020204030204" pitchFamily="34" charset="0"/>
+              </a:rPr>
+              <a:t>	</a:t>
+            </a:r>
+            <a:r>
+              <a:rPr lang="de-DE" altLang="de-DE" sz="2800" dirty="0" smtClean="0">
+                <a:latin typeface="Calibri" panose="020F0502020204030204" pitchFamily="34" charset="0"/>
+                <a:cs typeface="Calibri" panose="020F0502020204030204" pitchFamily="34" charset="0"/>
+              </a:rPr>
+              <a:t>-&gt; </a:t>
+            </a:r>
+            <a:r>
+              <a:rPr lang="de-DE" altLang="de-DE" sz="2800" dirty="0" err="1" smtClean="0">
+                <a:latin typeface="Calibri" panose="020F0502020204030204" pitchFamily="34" charset="0"/>
+                <a:cs typeface="Calibri" panose="020F0502020204030204" pitchFamily="34" charset="0"/>
+              </a:rPr>
+              <a:t>Some</a:t>
+            </a:r>
+            <a:r>
+              <a:rPr lang="de-DE" altLang="de-DE" sz="2800" dirty="0" smtClean="0">
+                <a:latin typeface="Calibri" panose="020F0502020204030204" pitchFamily="34" charset="0"/>
+                <a:cs typeface="Calibri" panose="020F0502020204030204" pitchFamily="34" charset="0"/>
+              </a:rPr>
+              <a:t> </a:t>
+            </a:r>
+            <a:r>
+              <a:rPr lang="de-DE" altLang="de-DE" sz="2800" dirty="0" err="1" smtClean="0">
+                <a:latin typeface="Calibri" panose="020F0502020204030204" pitchFamily="34" charset="0"/>
+                <a:cs typeface="Calibri" panose="020F0502020204030204" pitchFamily="34" charset="0"/>
+              </a:rPr>
+              <a:t>changes</a:t>
+            </a:r>
+            <a:r>
+              <a:rPr lang="de-DE" altLang="de-DE" sz="2800" dirty="0" smtClean="0">
+                <a:latin typeface="Calibri" panose="020F0502020204030204" pitchFamily="34" charset="0"/>
+                <a:cs typeface="Calibri" panose="020F0502020204030204" pitchFamily="34" charset="0"/>
+              </a:rPr>
+              <a:t> </a:t>
+            </a:r>
+            <a:r>
+              <a:rPr lang="de-DE" altLang="de-DE" sz="2800" dirty="0" err="1" smtClean="0">
+                <a:latin typeface="Calibri" panose="020F0502020204030204" pitchFamily="34" charset="0"/>
+                <a:cs typeface="Calibri" panose="020F0502020204030204" pitchFamily="34" charset="0"/>
+              </a:rPr>
+              <a:t>throw</a:t>
+            </a:r>
+            <a:r>
+              <a:rPr lang="de-DE" altLang="de-DE" sz="2800" dirty="0" smtClean="0">
+                <a:latin typeface="Calibri" panose="020F0502020204030204" pitchFamily="34" charset="0"/>
+                <a:cs typeface="Calibri" panose="020F0502020204030204" pitchFamily="34" charset="0"/>
+              </a:rPr>
+              <a:t> </a:t>
+            </a:r>
+            <a:r>
+              <a:rPr lang="de-DE" altLang="de-DE" sz="2800" dirty="0" err="1" smtClean="0">
+                <a:latin typeface="Calibri" panose="020F0502020204030204" pitchFamily="34" charset="0"/>
+                <a:cs typeface="Calibri" panose="020F0502020204030204" pitchFamily="34" charset="0"/>
+              </a:rPr>
+              <a:t>exceptions</a:t>
+            </a:r>
+            <a:endParaRPr lang="de-DE" altLang="de-DE" sz="2800" dirty="0" smtClean="0">
+              <a:latin typeface="Calibri" panose="020F0502020204030204" pitchFamily="34" charset="0"/>
+              <a:cs typeface="Calibri" panose="020F0502020204030204" pitchFamily="34" charset="0"/>
+            </a:endParaRPr>
+          </a:p>
+          <a:p>
+            <a:r>
+              <a:rPr lang="de-DE" altLang="de-DE" sz="2800" dirty="0" smtClean="0">
+                <a:latin typeface="Calibri" panose="020F0502020204030204" pitchFamily="34" charset="0"/>
+                <a:cs typeface="Calibri" panose="020F0502020204030204" pitchFamily="34" charset="0"/>
+              </a:rPr>
+              <a:t>	</a:t>
+            </a:r>
+          </a:p>
+          <a:p>
+            <a:r>
+              <a:rPr lang="de-DE" altLang="de-DE" sz="2800" dirty="0" smtClean="0">
+                <a:latin typeface="Calibri" panose="020F0502020204030204" pitchFamily="34" charset="0"/>
+                <a:cs typeface="Calibri" panose="020F0502020204030204" pitchFamily="34" charset="0"/>
+              </a:rPr>
+              <a:t>	</a:t>
             </a:r>
           </a:p>
           <a:p>

</xml_diff>